<commit_message>
work in progress for smartPDF
</commit_message>
<xml_diff>
--- a/powerpoint/SmartPDF/Don't Just PDF.pptx
+++ b/powerpoint/SmartPDF/Don't Just PDF.pptx
@@ -5,10 +5,10 @@
     <p:sldMasterId id="2147483660" r:id="rId2"/>
   </p:sldMasterIdLst>
   <p:notesMasterIdLst>
-    <p:notesMasterId r:id="rId19"/>
+    <p:notesMasterId r:id="rId25"/>
   </p:notesMasterIdLst>
   <p:handoutMasterIdLst>
-    <p:handoutMasterId r:id="rId20"/>
+    <p:handoutMasterId r:id="rId26"/>
   </p:handoutMasterIdLst>
   <p:sldIdLst>
     <p:sldId id="264" r:id="rId3"/>
@@ -19,14 +19,20 @@
     <p:sldId id="283" r:id="rId8"/>
     <p:sldId id="284" r:id="rId9"/>
     <p:sldId id="285" r:id="rId10"/>
-    <p:sldId id="277" r:id="rId11"/>
-    <p:sldId id="278" r:id="rId12"/>
-    <p:sldId id="279" r:id="rId13"/>
-    <p:sldId id="268" r:id="rId14"/>
-    <p:sldId id="269" r:id="rId15"/>
-    <p:sldId id="270" r:id="rId16"/>
-    <p:sldId id="280" r:id="rId17"/>
-    <p:sldId id="274" r:id="rId18"/>
+    <p:sldId id="290" r:id="rId11"/>
+    <p:sldId id="286" r:id="rId12"/>
+    <p:sldId id="287" r:id="rId13"/>
+    <p:sldId id="291" r:id="rId14"/>
+    <p:sldId id="288" r:id="rId15"/>
+    <p:sldId id="289" r:id="rId16"/>
+    <p:sldId id="277" r:id="rId17"/>
+    <p:sldId id="278" r:id="rId18"/>
+    <p:sldId id="279" r:id="rId19"/>
+    <p:sldId id="268" r:id="rId20"/>
+    <p:sldId id="269" r:id="rId21"/>
+    <p:sldId id="270" r:id="rId22"/>
+    <p:sldId id="280" r:id="rId23"/>
+    <p:sldId id="274" r:id="rId24"/>
   </p:sldIdLst>
   <p:sldSz cx="12188825" cy="6858000"/>
   <p:notesSz cx="6858000" cy="9144000"/>
@@ -4038,7 +4044,7 @@
                   <a:schemeClr val="tx2"/>
                 </a:solidFill>
               </a:rPr>
-              <a:t>8/25/2016</a:t>
+              <a:t>8/27/2016</a:t>
             </a:fld>
             <a:endParaRPr>
               <a:solidFill>
@@ -4228,7 +4234,7 @@
             <a:fld id="{F95CF31C-F757-429C-A789-86504F04C3BE}" type="datetimeFigureOut">
               <a:rPr lang="en-US"/>
               <a:pPr/>
-              <a:t>8/25/2016</a:t>
+              <a:t>8/27/2016</a:t>
             </a:fld>
             <a:endParaRPr/>
           </a:p>
@@ -4828,7 +4834,7 @@
           <a:p>
             <a:fld id="{7AECB6C2-1084-4AED-A74A-DF028B0094EA}" type="datetimeFigureOut">
               <a:rPr lang="en-US"/>
-              <a:t>8/25/2016</a:t>
+              <a:t>8/27/2016</a:t>
             </a:fld>
             <a:endParaRPr/>
           </a:p>
@@ -5020,7 +5026,7 @@
           <a:p>
             <a:fld id="{7AECB6C2-1084-4AED-A74A-DF028B0094EA}" type="datetimeFigureOut">
               <a:rPr lang="en-US"/>
-              <a:t>8/25/2016</a:t>
+              <a:t>8/27/2016</a:t>
             </a:fld>
             <a:endParaRPr/>
           </a:p>
@@ -5218,7 +5224,7 @@
           <a:p>
             <a:fld id="{8B5A30F4-0B4E-4E4B-BC36-C30CD13F4E17}" type="datetimeFigureOut">
               <a:rPr lang="en-US"/>
-              <a:t>8/25/2016</a:t>
+              <a:t>8/27/2016</a:t>
             </a:fld>
             <a:endParaRPr/>
           </a:p>
@@ -5734,7 +5740,7 @@
           <a:p>
             <a:fld id="{2DD204D1-F9BD-4643-8480-6EA41EB484F1}" type="datetimeFigureOut">
               <a:rPr lang="en-US"/>
-              <a:t>8/25/2016</a:t>
+              <a:t>8/27/2016</a:t>
             </a:fld>
             <a:endParaRPr/>
           </a:p>
@@ -6182,7 +6188,7 @@
           <a:p>
             <a:fld id="{2DD204D1-F9BD-4643-8480-6EA41EB484F1}" type="datetimeFigureOut">
               <a:rPr lang="en-US"/>
-              <a:t>8/25/2016</a:t>
+              <a:t>8/27/2016</a:t>
             </a:fld>
             <a:endParaRPr/>
           </a:p>
@@ -6312,7 +6318,7 @@
           <a:p>
             <a:fld id="{2DD204D1-F9BD-4643-8480-6EA41EB484F1}" type="datetimeFigureOut">
               <a:rPr lang="en-US"/>
-              <a:t>8/25/2016</a:t>
+              <a:t>8/27/2016</a:t>
             </a:fld>
             <a:endParaRPr/>
           </a:p>
@@ -6419,7 +6425,7 @@
           <a:p>
             <a:fld id="{2DD204D1-F9BD-4643-8480-6EA41EB484F1}" type="datetimeFigureOut">
               <a:rPr lang="en-US"/>
-              <a:t>8/25/2016</a:t>
+              <a:t>8/27/2016</a:t>
             </a:fld>
             <a:endParaRPr/>
           </a:p>
@@ -6776,7 +6782,7 @@
           <a:p>
             <a:fld id="{126BF754-515F-40B9-8D24-D54D5825B3D0}" type="datetimeFigureOut">
               <a:rPr lang="en-US"/>
-              <a:t>8/25/2016</a:t>
+              <a:t>8/27/2016</a:t>
             </a:fld>
             <a:endParaRPr/>
           </a:p>
@@ -7113,7 +7119,7 @@
           <a:p>
             <a:fld id="{126BF754-515F-40B9-8D24-D54D5825B3D0}" type="datetimeFigureOut">
               <a:rPr lang="en-US"/>
-              <a:t>8/25/2016</a:t>
+              <a:t>8/27/2016</a:t>
             </a:fld>
             <a:endParaRPr/>
           </a:p>
@@ -7408,7 +7414,7 @@
             <a:fld id="{2DD204D1-F9BD-4643-8480-6EA41EB484F1}" type="datetimeFigureOut">
               <a:rPr lang="en-US"/>
               <a:pPr/>
-              <a:t>8/25/2016</a:t>
+              <a:t>8/27/2016</a:t>
             </a:fld>
             <a:endParaRPr/>
           </a:p>
@@ -7991,6 +7997,1050 @@
             <p:ph type="title"/>
           </p:nvPr>
         </p:nvSpPr>
+        <p:spPr>
+          <a:xfrm>
+            <a:off x="989012" y="76199"/>
+            <a:ext cx="10157354" cy="1397000"/>
+          </a:xfrm>
+        </p:spPr>
+        <p:txBody>
+          <a:bodyPr>
+            <a:normAutofit/>
+          </a:bodyPr>
+          <a:lstStyle/>
+          <a:p>
+            <a:r>
+              <a:rPr lang="en-US" sz="3600" dirty="0"/>
+              <a:t>Exporting and importing metadata</a:t>
+            </a:r>
+          </a:p>
+        </p:txBody>
+      </p:sp>
+      <p:sp>
+        <p:nvSpPr>
+          <p:cNvPr id="7" name="Content Placeholder 4"/>
+          <p:cNvSpPr>
+            <a:spLocks noGrp="1"/>
+          </p:cNvSpPr>
+          <p:nvPr>
+            <p:ph sz="half" idx="1"/>
+          </p:nvPr>
+        </p:nvSpPr>
+        <p:spPr>
+          <a:xfrm>
+            <a:off x="1002804" y="1905000"/>
+            <a:ext cx="6844208" cy="4724400"/>
+          </a:xfrm>
+        </p:spPr>
+        <p:txBody>
+          <a:bodyPr>
+            <a:normAutofit/>
+          </a:bodyPr>
+          <a:lstStyle/>
+          <a:p>
+            <a:pPr marL="0" indent="0">
+              <a:buNone/>
+            </a:pPr>
+            <a:r>
+              <a:rPr lang="en-US" b="1" dirty="0"/>
+              <a:t>Metadata</a:t>
+            </a:r>
+            <a:br>
+              <a:rPr lang="en-US" dirty="0"/>
+            </a:br>
+            <a:r>
+              <a:rPr lang="en-US" dirty="0"/>
+              <a:t>Includes information about the document and its contents, such as the author’s name, keywords, and copyright information, that can be used by search utilities.</a:t>
+            </a:r>
+          </a:p>
+          <a:p>
+            <a:pPr marL="0" indent="0">
+              <a:buNone/>
+            </a:pPr>
+            <a:r>
+              <a:rPr lang="en-US" b="1" dirty="0"/>
+              <a:t>XMP</a:t>
+            </a:r>
+            <a:br>
+              <a:rPr lang="en-US" dirty="0"/>
+            </a:br>
+            <a:r>
+              <a:rPr lang="en-US" dirty="0"/>
+              <a:t>The Extensible Metadata Platform (XMP) provides Adobe applications with a common XML framework that standardizes the creation, processing, and interchange of document metadata across publishing workflows.</a:t>
+            </a:r>
+            <a:endParaRPr lang="en-US" sz="2000" dirty="0"/>
+          </a:p>
+        </p:txBody>
+      </p:sp>
+      <p:pic>
+        <p:nvPicPr>
+          <p:cNvPr id="3" name="Picture 2"/>
+          <p:cNvPicPr>
+            <a:picLocks noChangeAspect="1"/>
+          </p:cNvPicPr>
+          <p:nvPr/>
+        </p:nvPicPr>
+        <p:blipFill>
+          <a:blip r:embed="rId2"/>
+          <a:stretch>
+            <a:fillRect/>
+          </a:stretch>
+        </p:blipFill>
+        <p:spPr>
+          <a:xfrm>
+            <a:off x="9371012" y="4495800"/>
+            <a:ext cx="1200057" cy="1261598"/>
+          </a:xfrm>
+          <a:prstGeom prst="rect">
+            <a:avLst/>
+          </a:prstGeom>
+        </p:spPr>
+      </p:pic>
+      <p:pic>
+        <p:nvPicPr>
+          <p:cNvPr id="4" name="Picture 3"/>
+          <p:cNvPicPr>
+            <a:picLocks noChangeAspect="1"/>
+          </p:cNvPicPr>
+          <p:nvPr/>
+        </p:nvPicPr>
+        <p:blipFill>
+          <a:blip r:embed="rId3"/>
+          <a:stretch>
+            <a:fillRect/>
+          </a:stretch>
+        </p:blipFill>
+        <p:spPr>
+          <a:xfrm>
+            <a:off x="9194849" y="1981200"/>
+            <a:ext cx="1552381" cy="1666667"/>
+          </a:xfrm>
+          <a:prstGeom prst="rect">
+            <a:avLst/>
+          </a:prstGeom>
+        </p:spPr>
+      </p:pic>
+      <p:sp>
+        <p:nvSpPr>
+          <p:cNvPr id="5" name="Down Arrow 4"/>
+          <p:cNvSpPr/>
+          <p:nvPr/>
+        </p:nvSpPr>
+        <p:spPr>
+          <a:xfrm>
+            <a:off x="9828212" y="3647867"/>
+            <a:ext cx="390572" cy="847932"/>
+          </a:xfrm>
+          <a:prstGeom prst="downArrow">
+            <a:avLst/>
+          </a:prstGeom>
+        </p:spPr>
+        <p:style>
+          <a:lnRef idx="2">
+            <a:schemeClr val="accent1">
+              <a:shade val="50000"/>
+            </a:schemeClr>
+          </a:lnRef>
+          <a:fillRef idx="1">
+            <a:schemeClr val="accent1"/>
+          </a:fillRef>
+          <a:effectRef idx="0">
+            <a:schemeClr val="accent1"/>
+          </a:effectRef>
+          <a:fontRef idx="minor">
+            <a:schemeClr val="lt1"/>
+          </a:fontRef>
+        </p:style>
+        <p:txBody>
+          <a:bodyPr rtlCol="0" anchor="ctr"/>
+          <a:lstStyle/>
+          <a:p>
+            <a:pPr algn="ctr"/>
+            <a:endParaRPr lang="en-US"/>
+          </a:p>
+        </p:txBody>
+      </p:sp>
+    </p:spTree>
+    <p:extLst>
+      <p:ext uri="{BB962C8B-B14F-4D97-AF65-F5344CB8AC3E}">
+        <p14:creationId xmlns:p14="http://schemas.microsoft.com/office/powerpoint/2010/main" val="2577499586"/>
+      </p:ext>
+    </p:extLst>
+  </p:cSld>
+  <p:clrMapOvr>
+    <a:masterClrMapping/>
+  </p:clrMapOvr>
+  <mc:AlternateContent xmlns:mc="http://schemas.openxmlformats.org/markup-compatibility/2006" xmlns:p14="http://schemas.microsoft.com/office/powerpoint/2010/main">
+    <mc:Choice Requires="p14">
+      <p:transition spd="med" p14:dur="700">
+        <p:fade/>
+      </p:transition>
+    </mc:Choice>
+    <mc:Fallback xmlns="">
+      <p:transition spd="med">
+        <p:fade/>
+      </p:transition>
+    </mc:Fallback>
+  </mc:AlternateContent>
+</p:sld>
+</file>
+
+<file path=ppt/slides/slide11.xml><?xml version="1.0" encoding="utf-8"?>
+<p:sld xmlns:a="http://schemas.openxmlformats.org/drawingml/2006/main" xmlns:r="http://schemas.openxmlformats.org/officeDocument/2006/relationships" xmlns:p="http://schemas.openxmlformats.org/presentationml/2006/main">
+  <p:cSld>
+    <p:spTree>
+      <p:nvGrpSpPr>
+        <p:cNvPr id="1" name=""/>
+        <p:cNvGrpSpPr/>
+        <p:nvPr/>
+      </p:nvGrpSpPr>
+      <p:grpSpPr>
+        <a:xfrm>
+          <a:off x="0" y="0"/>
+          <a:ext cx="0" cy="0"/>
+          <a:chOff x="0" y="0"/>
+          <a:chExt cx="0" cy="0"/>
+        </a:xfrm>
+      </p:grpSpPr>
+      <p:sp>
+        <p:nvSpPr>
+          <p:cNvPr id="2" name="Title 1"/>
+          <p:cNvSpPr>
+            <a:spLocks noGrp="1"/>
+          </p:cNvSpPr>
+          <p:nvPr>
+            <p:ph type="title"/>
+          </p:nvPr>
+        </p:nvSpPr>
+        <p:spPr>
+          <a:xfrm>
+            <a:off x="989012" y="76199"/>
+            <a:ext cx="10157354" cy="1397000"/>
+          </a:xfrm>
+        </p:spPr>
+        <p:txBody>
+          <a:bodyPr>
+            <a:normAutofit/>
+          </a:bodyPr>
+          <a:lstStyle/>
+          <a:p>
+            <a:r>
+              <a:rPr lang="en-US" sz="3600" dirty="0"/>
+              <a:t>Exporting and importing metadata</a:t>
+            </a:r>
+          </a:p>
+        </p:txBody>
+      </p:sp>
+      <p:sp>
+        <p:nvSpPr>
+          <p:cNvPr id="7" name="Content Placeholder 4"/>
+          <p:cNvSpPr>
+            <a:spLocks noGrp="1"/>
+          </p:cNvSpPr>
+          <p:nvPr>
+            <p:ph sz="half" idx="1"/>
+          </p:nvPr>
+        </p:nvSpPr>
+        <p:spPr>
+          <a:xfrm>
+            <a:off x="1002804" y="1905000"/>
+            <a:ext cx="10578008" cy="4724400"/>
+          </a:xfrm>
+        </p:spPr>
+        <p:txBody>
+          <a:bodyPr>
+            <a:normAutofit/>
+          </a:bodyPr>
+          <a:lstStyle/>
+          <a:p>
+            <a:pPr marL="0" indent="0">
+              <a:buNone/>
+            </a:pPr>
+            <a:r>
+              <a:rPr lang="en-US" b="1" dirty="0"/>
+              <a:t>Export</a:t>
+            </a:r>
+            <a:br>
+              <a:rPr lang="en-US" dirty="0"/>
+            </a:br>
+            <a:r>
+              <a:rPr lang="en-US" dirty="0"/>
+              <a:t>Specify the source of the PDF and destination of the XMP file.</a:t>
+            </a:r>
+          </a:p>
+          <a:p>
+            <a:pPr marL="0" indent="0">
+              <a:buNone/>
+            </a:pPr>
+            <a:r>
+              <a:rPr lang="en-US" sz="2000" dirty="0"/>
+              <a:t>&lt;</a:t>
+            </a:r>
+            <a:r>
+              <a:rPr lang="en-US" sz="2000" dirty="0" err="1"/>
+              <a:t>cfpdf</a:t>
+            </a:r>
+            <a:r>
+              <a:rPr lang="en-US" sz="2000" dirty="0"/>
+              <a:t> action=“export” type=“metadata” source = “file.pdf” </a:t>
+            </a:r>
+            <a:r>
+              <a:rPr lang="en-US" sz="2000" dirty="0" err="1"/>
+              <a:t>exportTo</a:t>
+            </a:r>
+            <a:r>
+              <a:rPr lang="en-US" sz="2000" dirty="0"/>
+              <a:t> =“</a:t>
+            </a:r>
+            <a:r>
+              <a:rPr lang="en-US" sz="2000" dirty="0" err="1"/>
+              <a:t>file.xmp</a:t>
+            </a:r>
+            <a:r>
+              <a:rPr lang="en-US" sz="2000" dirty="0"/>
+              <a:t>”/&gt;</a:t>
+            </a:r>
+          </a:p>
+          <a:p>
+            <a:pPr marL="0" indent="0">
+              <a:buNone/>
+            </a:pPr>
+            <a:r>
+              <a:rPr lang="en-US" b="1" dirty="0"/>
+              <a:t>Import</a:t>
+            </a:r>
+            <a:br>
+              <a:rPr lang="en-US" dirty="0"/>
+            </a:br>
+            <a:r>
+              <a:rPr lang="en-US" dirty="0"/>
+              <a:t>Specify the source of the PDF, the source of XMP file and the destination for the file to be placed.</a:t>
+            </a:r>
+          </a:p>
+          <a:p>
+            <a:pPr marL="0" indent="0">
+              <a:buNone/>
+            </a:pPr>
+            <a:r>
+              <a:rPr lang="en-US" sz="2000" dirty="0"/>
+              <a:t>&lt;</a:t>
+            </a:r>
+            <a:r>
+              <a:rPr lang="en-US" sz="2000" dirty="0" err="1"/>
+              <a:t>cfpdf</a:t>
+            </a:r>
+            <a:r>
+              <a:rPr lang="en-US" sz="2000" dirty="0"/>
+              <a:t> action=“import” type=“metadata” source=“file.pdf” </a:t>
+            </a:r>
+            <a:r>
+              <a:rPr lang="en-US" sz="2000" dirty="0" err="1"/>
+              <a:t>importFrom</a:t>
+            </a:r>
+            <a:r>
+              <a:rPr lang="en-US" sz="2000" dirty="0"/>
+              <a:t>=“</a:t>
+            </a:r>
+            <a:r>
+              <a:rPr lang="en-US" sz="2000" dirty="0" err="1"/>
+              <a:t>file.xmp</a:t>
+            </a:r>
+            <a:r>
+              <a:rPr lang="en-US" sz="2000" dirty="0"/>
+              <a:t>” destination=“PDF output file pathname” </a:t>
+            </a:r>
+            <a:r>
+              <a:rPr lang="en-US" sz="1800" dirty="0"/>
+              <a:t>/or </a:t>
+            </a:r>
+            <a:r>
+              <a:rPr lang="en-US" sz="2000" dirty="0"/>
+              <a:t>name=“PDF document variable name”/&gt;</a:t>
+            </a:r>
+            <a:endParaRPr lang="en-US" sz="1800" dirty="0"/>
+          </a:p>
+        </p:txBody>
+      </p:sp>
+    </p:spTree>
+    <p:extLst>
+      <p:ext uri="{BB962C8B-B14F-4D97-AF65-F5344CB8AC3E}">
+        <p14:creationId xmlns:p14="http://schemas.microsoft.com/office/powerpoint/2010/main" val="2025164487"/>
+      </p:ext>
+    </p:extLst>
+  </p:cSld>
+  <p:clrMapOvr>
+    <a:masterClrMapping/>
+  </p:clrMapOvr>
+  <mc:AlternateContent xmlns:mc="http://schemas.openxmlformats.org/markup-compatibility/2006" xmlns:p14="http://schemas.microsoft.com/office/powerpoint/2010/main">
+    <mc:Choice Requires="p14">
+      <p:transition spd="med" p14:dur="700">
+        <p:fade/>
+      </p:transition>
+    </mc:Choice>
+    <mc:Fallback xmlns="">
+      <p:transition spd="med">
+        <p:fade/>
+      </p:transition>
+    </mc:Fallback>
+  </mc:AlternateContent>
+</p:sld>
+</file>
+
+<file path=ppt/slides/slide12.xml><?xml version="1.0" encoding="utf-8"?>
+<p:sld xmlns:a="http://schemas.openxmlformats.org/drawingml/2006/main" xmlns:r="http://schemas.openxmlformats.org/officeDocument/2006/relationships" xmlns:p="http://schemas.openxmlformats.org/presentationml/2006/main">
+  <p:cSld>
+    <p:spTree>
+      <p:nvGrpSpPr>
+        <p:cNvPr id="1" name=""/>
+        <p:cNvGrpSpPr/>
+        <p:nvPr/>
+      </p:nvGrpSpPr>
+      <p:grpSpPr>
+        <a:xfrm>
+          <a:off x="0" y="0"/>
+          <a:ext cx="0" cy="0"/>
+          <a:chOff x="0" y="0"/>
+          <a:chExt cx="0" cy="0"/>
+        </a:xfrm>
+      </p:grpSpPr>
+      <p:sp>
+        <p:nvSpPr>
+          <p:cNvPr id="4" name="Rectangle 3"/>
+          <p:cNvSpPr/>
+          <p:nvPr/>
+        </p:nvSpPr>
+        <p:spPr>
+          <a:xfrm>
+            <a:off x="4494212" y="2667000"/>
+            <a:ext cx="3276600" cy="1200329"/>
+          </a:xfrm>
+          <a:prstGeom prst="rect">
+            <a:avLst/>
+          </a:prstGeom>
+          <a:noFill/>
+        </p:spPr>
+        <p:txBody>
+          <a:bodyPr wrap="square" lIns="91440" tIns="45720" rIns="91440" bIns="45720">
+            <a:spAutoFit/>
+          </a:bodyPr>
+          <a:lstStyle/>
+          <a:p>
+            <a:pPr algn="ctr"/>
+            <a:r>
+              <a:rPr lang="en-US" sz="7200" b="1" cap="none" spc="0" dirty="0">
+                <a:ln w="9525">
+                  <a:solidFill>
+                    <a:schemeClr val="bg1"/>
+                  </a:solidFill>
+                  <a:prstDash val="solid"/>
+                </a:ln>
+                <a:solidFill>
+                  <a:schemeClr val="tx1"/>
+                </a:solidFill>
+                <a:effectLst>
+                  <a:outerShdw blurRad="12700" dist="38100" dir="2700000" algn="tl" rotWithShape="0">
+                    <a:schemeClr val="bg1">
+                      <a:lumMod val="50000"/>
+                    </a:schemeClr>
+                  </a:outerShdw>
+                </a:effectLst>
+              </a:rPr>
+              <a:t>DEMO</a:t>
+            </a:r>
+          </a:p>
+        </p:txBody>
+      </p:sp>
+    </p:spTree>
+    <p:extLst>
+      <p:ext uri="{BB962C8B-B14F-4D97-AF65-F5344CB8AC3E}">
+        <p14:creationId xmlns:p14="http://schemas.microsoft.com/office/powerpoint/2010/main" val="534639588"/>
+      </p:ext>
+    </p:extLst>
+  </p:cSld>
+  <p:clrMapOvr>
+    <a:masterClrMapping/>
+  </p:clrMapOvr>
+  <mc:AlternateContent xmlns:mc="http://schemas.openxmlformats.org/markup-compatibility/2006" xmlns:p14="http://schemas.microsoft.com/office/powerpoint/2010/main">
+    <mc:Choice Requires="p14">
+      <p:transition spd="med" p14:dur="700">
+        <p:fade/>
+      </p:transition>
+    </mc:Choice>
+    <mc:Fallback xmlns="">
+      <p:transition spd="med">
+        <p:fade/>
+      </p:transition>
+    </mc:Fallback>
+  </mc:AlternateContent>
+</p:sld>
+</file>
+
+<file path=ppt/slides/slide13.xml><?xml version="1.0" encoding="utf-8"?>
+<p:sld xmlns:a="http://schemas.openxmlformats.org/drawingml/2006/main" xmlns:r="http://schemas.openxmlformats.org/officeDocument/2006/relationships" xmlns:p="http://schemas.openxmlformats.org/presentationml/2006/main">
+  <p:cSld>
+    <p:spTree>
+      <p:nvGrpSpPr>
+        <p:cNvPr id="1" name=""/>
+        <p:cNvGrpSpPr/>
+        <p:nvPr/>
+      </p:nvGrpSpPr>
+      <p:grpSpPr>
+        <a:xfrm>
+          <a:off x="0" y="0"/>
+          <a:ext cx="0" cy="0"/>
+          <a:chOff x="0" y="0"/>
+          <a:chExt cx="0" cy="0"/>
+        </a:xfrm>
+      </p:grpSpPr>
+      <p:sp>
+        <p:nvSpPr>
+          <p:cNvPr id="2" name="Title 1"/>
+          <p:cNvSpPr>
+            <a:spLocks noGrp="1"/>
+          </p:cNvSpPr>
+          <p:nvPr>
+            <p:ph type="title"/>
+          </p:nvPr>
+        </p:nvSpPr>
+        <p:spPr>
+          <a:xfrm>
+            <a:off x="989012" y="76199"/>
+            <a:ext cx="10157354" cy="1397000"/>
+          </a:xfrm>
+        </p:spPr>
+        <p:txBody>
+          <a:bodyPr>
+            <a:normAutofit/>
+          </a:bodyPr>
+          <a:lstStyle/>
+          <a:p>
+            <a:r>
+              <a:rPr lang="en-US" sz="3600" dirty="0"/>
+              <a:t>Sanitization</a:t>
+            </a:r>
+          </a:p>
+        </p:txBody>
+      </p:sp>
+      <p:sp>
+        <p:nvSpPr>
+          <p:cNvPr id="7" name="Content Placeholder 4"/>
+          <p:cNvSpPr>
+            <a:spLocks noGrp="1"/>
+          </p:cNvSpPr>
+          <p:nvPr>
+            <p:ph sz="half" idx="1"/>
+          </p:nvPr>
+        </p:nvSpPr>
+        <p:spPr>
+          <a:xfrm>
+            <a:off x="989012" y="1752600"/>
+            <a:ext cx="10896600" cy="2514600"/>
+          </a:xfrm>
+        </p:spPr>
+        <p:txBody>
+          <a:bodyPr>
+            <a:normAutofit/>
+          </a:bodyPr>
+          <a:lstStyle/>
+          <a:p>
+            <a:pPr marL="0" indent="0">
+              <a:buNone/>
+            </a:pPr>
+            <a:r>
+              <a:rPr lang="en-US" b="1" dirty="0"/>
+              <a:t>Sanitize</a:t>
+            </a:r>
+            <a:br>
+              <a:rPr lang="en-US" dirty="0"/>
+            </a:br>
+            <a:r>
+              <a:rPr lang="en-US" dirty="0"/>
+              <a:t>Removes metadata from your PDF </a:t>
+            </a:r>
+            <a:br>
+              <a:rPr lang="en-US" dirty="0"/>
+            </a:br>
+            <a:r>
+              <a:rPr lang="en-US" dirty="0"/>
+              <a:t>document so that sensitive information </a:t>
+            </a:r>
+            <a:br>
+              <a:rPr lang="en-US" dirty="0"/>
+            </a:br>
+            <a:r>
+              <a:rPr lang="en-US" dirty="0"/>
+              <a:t>is not inadvertently passed along when </a:t>
+            </a:r>
+            <a:br>
+              <a:rPr lang="en-US" dirty="0"/>
+            </a:br>
+            <a:r>
+              <a:rPr lang="en-US" dirty="0"/>
+              <a:t>you publish your PDF.</a:t>
+            </a:r>
+            <a:br>
+              <a:rPr lang="en-US" dirty="0"/>
+            </a:br>
+            <a:r>
+              <a:rPr lang="en-US" dirty="0"/>
+              <a:t>Sanitize removes the following:</a:t>
+            </a:r>
+          </a:p>
+          <a:p>
+            <a:pPr marL="0" indent="0">
+              <a:buNone/>
+            </a:pPr>
+            <a:endParaRPr lang="en-US" sz="1800" dirty="0"/>
+          </a:p>
+        </p:txBody>
+      </p:sp>
+      <p:sp>
+        <p:nvSpPr>
+          <p:cNvPr id="3" name="TextBox 2"/>
+          <p:cNvSpPr txBox="1"/>
+          <p:nvPr/>
+        </p:nvSpPr>
+        <p:spPr>
+          <a:xfrm>
+            <a:off x="989012" y="4114800"/>
+            <a:ext cx="4676280" cy="2677656"/>
+          </a:xfrm>
+          <a:prstGeom prst="rect">
+            <a:avLst/>
+          </a:prstGeom>
+          <a:noFill/>
+        </p:spPr>
+        <p:txBody>
+          <a:bodyPr wrap="none" rtlCol="0">
+            <a:spAutoFit/>
+          </a:bodyPr>
+          <a:lstStyle/>
+          <a:p>
+            <a:pPr marL="342900" indent="-342900">
+              <a:buFont typeface="Arial" panose="020B0604020202020204" pitchFamily="34" charset="0"/>
+              <a:buChar char="•"/>
+            </a:pPr>
+            <a:r>
+              <a:rPr lang="en-US" dirty="0"/>
+              <a:t>Metadata</a:t>
+            </a:r>
+          </a:p>
+          <a:p>
+            <a:pPr marL="342900" indent="-342900">
+              <a:buFont typeface="Arial" panose="020B0604020202020204" pitchFamily="34" charset="0"/>
+              <a:buChar char="•"/>
+            </a:pPr>
+            <a:r>
+              <a:rPr lang="en-US" dirty="0"/>
+              <a:t>Attached files</a:t>
+            </a:r>
+          </a:p>
+          <a:p>
+            <a:pPr marL="342900" indent="-342900">
+              <a:buFont typeface="Arial" panose="020B0604020202020204" pitchFamily="34" charset="0"/>
+              <a:buChar char="•"/>
+            </a:pPr>
+            <a:r>
+              <a:rPr lang="en-US" dirty="0"/>
+              <a:t>Scripts</a:t>
+            </a:r>
+          </a:p>
+          <a:p>
+            <a:pPr marL="342900" indent="-342900">
+              <a:buFont typeface="Arial" panose="020B0604020202020204" pitchFamily="34" charset="0"/>
+              <a:buChar char="•"/>
+            </a:pPr>
+            <a:r>
+              <a:rPr lang="en-US" dirty="0"/>
+              <a:t>Search indexes</a:t>
+            </a:r>
+          </a:p>
+          <a:p>
+            <a:pPr marL="342900" indent="-342900">
+              <a:buFont typeface="Arial" panose="020B0604020202020204" pitchFamily="34" charset="0"/>
+              <a:buChar char="•"/>
+            </a:pPr>
+            <a:r>
+              <a:rPr lang="en-US" dirty="0"/>
+              <a:t>Form data</a:t>
+            </a:r>
+          </a:p>
+          <a:p>
+            <a:pPr marL="342900" indent="-342900">
+              <a:buFont typeface="Arial" panose="020B0604020202020204" pitchFamily="34" charset="0"/>
+              <a:buChar char="•"/>
+            </a:pPr>
+            <a:r>
+              <a:rPr lang="en-US" dirty="0"/>
+              <a:t>Review and comment data</a:t>
+            </a:r>
+          </a:p>
+          <a:p>
+            <a:endParaRPr lang="en-US" dirty="0"/>
+          </a:p>
+        </p:txBody>
+      </p:sp>
+      <p:sp>
+        <p:nvSpPr>
+          <p:cNvPr id="6" name="TextBox 5"/>
+          <p:cNvSpPr txBox="1"/>
+          <p:nvPr/>
+        </p:nvSpPr>
+        <p:spPr>
+          <a:xfrm>
+            <a:off x="7237412" y="4267200"/>
+            <a:ext cx="4527201" cy="2308324"/>
+          </a:xfrm>
+          <a:prstGeom prst="rect">
+            <a:avLst/>
+          </a:prstGeom>
+          <a:noFill/>
+        </p:spPr>
+        <p:txBody>
+          <a:bodyPr wrap="none" rtlCol="0">
+            <a:spAutoFit/>
+          </a:bodyPr>
+          <a:lstStyle/>
+          <a:p>
+            <a:pPr marL="342900" indent="-342900">
+              <a:buFont typeface="Arial" panose="020B0604020202020204" pitchFamily="34" charset="0"/>
+              <a:buChar char="•"/>
+            </a:pPr>
+            <a:r>
+              <a:rPr lang="en-US" dirty="0"/>
+              <a:t>Obscured text and images</a:t>
+            </a:r>
+          </a:p>
+          <a:p>
+            <a:pPr marL="342900" indent="-342900">
+              <a:buFont typeface="Arial" panose="020B0604020202020204" pitchFamily="34" charset="0"/>
+              <a:buChar char="•"/>
+            </a:pPr>
+            <a:r>
+              <a:rPr lang="en-US" dirty="0"/>
+              <a:t>Unreferenced data</a:t>
+            </a:r>
+          </a:p>
+          <a:p>
+            <a:pPr marL="342900" indent="-342900">
+              <a:buFont typeface="Arial" panose="020B0604020202020204" pitchFamily="34" charset="0"/>
+              <a:buChar char="•"/>
+            </a:pPr>
+            <a:r>
+              <a:rPr lang="en-US" dirty="0"/>
+              <a:t>Links</a:t>
+            </a:r>
+          </a:p>
+          <a:p>
+            <a:pPr marL="342900" indent="-342900">
+              <a:buFont typeface="Arial" panose="020B0604020202020204" pitchFamily="34" charset="0"/>
+              <a:buChar char="•"/>
+            </a:pPr>
+            <a:r>
+              <a:rPr lang="en-US" dirty="0"/>
+              <a:t>Actions and </a:t>
+            </a:r>
+            <a:r>
+              <a:rPr lang="en-US" dirty="0" err="1"/>
+              <a:t>javascripts</a:t>
+            </a:r>
+            <a:endParaRPr lang="en-US" dirty="0"/>
+          </a:p>
+          <a:p>
+            <a:pPr marL="342900" indent="-342900">
+              <a:buFont typeface="Arial" panose="020B0604020202020204" pitchFamily="34" charset="0"/>
+              <a:buChar char="•"/>
+            </a:pPr>
+            <a:r>
+              <a:rPr lang="en-US" dirty="0"/>
+              <a:t>Overlapping objects</a:t>
+            </a:r>
+          </a:p>
+          <a:p>
+            <a:endParaRPr lang="en-US" dirty="0"/>
+          </a:p>
+        </p:txBody>
+      </p:sp>
+      <p:pic>
+        <p:nvPicPr>
+          <p:cNvPr id="5" name="Picture 4"/>
+          <p:cNvPicPr>
+            <a:picLocks noChangeAspect="1"/>
+          </p:cNvPicPr>
+          <p:nvPr/>
+        </p:nvPicPr>
+        <p:blipFill>
+          <a:blip r:embed="rId2"/>
+          <a:stretch>
+            <a:fillRect/>
+          </a:stretch>
+        </p:blipFill>
+        <p:spPr>
+          <a:xfrm>
+            <a:off x="8153359" y="1326392"/>
+            <a:ext cx="2695305" cy="2612190"/>
+          </a:xfrm>
+          <a:prstGeom prst="rect">
+            <a:avLst/>
+          </a:prstGeom>
+          <a:ln w="190500" cap="sq">
+            <a:solidFill>
+              <a:srgbClr val="C8C6BD"/>
+            </a:solidFill>
+            <a:prstDash val="solid"/>
+            <a:miter lim="800000"/>
+          </a:ln>
+          <a:effectLst>
+            <a:outerShdw blurRad="254000" algn="bl" rotWithShape="0">
+              <a:srgbClr val="000000">
+                <a:alpha val="43000"/>
+              </a:srgbClr>
+            </a:outerShdw>
+          </a:effectLst>
+          <a:scene3d>
+            <a:camera prst="perspectiveFront" fov="5400000"/>
+            <a:lightRig rig="threePt" dir="t">
+              <a:rot lat="0" lon="0" rev="2100000"/>
+            </a:lightRig>
+          </a:scene3d>
+          <a:sp3d extrusionH="25400">
+            <a:bevelT w="304800" h="152400" prst="hardEdge"/>
+            <a:extrusionClr>
+              <a:srgbClr val="000000"/>
+            </a:extrusionClr>
+          </a:sp3d>
+        </p:spPr>
+      </p:pic>
+    </p:spTree>
+    <p:extLst>
+      <p:ext uri="{BB962C8B-B14F-4D97-AF65-F5344CB8AC3E}">
+        <p14:creationId xmlns:p14="http://schemas.microsoft.com/office/powerpoint/2010/main" val="1669832632"/>
+      </p:ext>
+    </p:extLst>
+  </p:cSld>
+  <p:clrMapOvr>
+    <a:masterClrMapping/>
+  </p:clrMapOvr>
+  <mc:AlternateContent xmlns:mc="http://schemas.openxmlformats.org/markup-compatibility/2006" xmlns:p14="http://schemas.microsoft.com/office/powerpoint/2010/main">
+    <mc:Choice Requires="p14">
+      <p:transition spd="med" p14:dur="700">
+        <p:fade/>
+      </p:transition>
+    </mc:Choice>
+    <mc:Fallback xmlns="">
+      <p:transition spd="med">
+        <p:fade/>
+      </p:transition>
+    </mc:Fallback>
+  </mc:AlternateContent>
+</p:sld>
+</file>
+
+<file path=ppt/slides/slide14.xml><?xml version="1.0" encoding="utf-8"?>
+<p:sld xmlns:a="http://schemas.openxmlformats.org/drawingml/2006/main" xmlns:r="http://schemas.openxmlformats.org/officeDocument/2006/relationships" xmlns:p="http://schemas.openxmlformats.org/presentationml/2006/main">
+  <p:cSld>
+    <p:spTree>
+      <p:nvGrpSpPr>
+        <p:cNvPr id="1" name=""/>
+        <p:cNvGrpSpPr/>
+        <p:nvPr/>
+      </p:nvGrpSpPr>
+      <p:grpSpPr>
+        <a:xfrm>
+          <a:off x="0" y="0"/>
+          <a:ext cx="0" cy="0"/>
+          <a:chOff x="0" y="0"/>
+          <a:chExt cx="0" cy="0"/>
+        </a:xfrm>
+      </p:grpSpPr>
+      <p:sp>
+        <p:nvSpPr>
+          <p:cNvPr id="4" name="Rectangle 3"/>
+          <p:cNvSpPr/>
+          <p:nvPr/>
+        </p:nvSpPr>
+        <p:spPr>
+          <a:xfrm>
+            <a:off x="4494212" y="2667000"/>
+            <a:ext cx="3276600" cy="1200329"/>
+          </a:xfrm>
+          <a:prstGeom prst="rect">
+            <a:avLst/>
+          </a:prstGeom>
+          <a:noFill/>
+        </p:spPr>
+        <p:txBody>
+          <a:bodyPr wrap="square" lIns="91440" tIns="45720" rIns="91440" bIns="45720">
+            <a:spAutoFit/>
+          </a:bodyPr>
+          <a:lstStyle/>
+          <a:p>
+            <a:pPr algn="ctr"/>
+            <a:r>
+              <a:rPr lang="en-US" sz="7200" b="1" cap="none" spc="0" dirty="0">
+                <a:ln w="9525">
+                  <a:solidFill>
+                    <a:schemeClr val="bg1"/>
+                  </a:solidFill>
+                  <a:prstDash val="solid"/>
+                </a:ln>
+                <a:solidFill>
+                  <a:schemeClr val="tx1"/>
+                </a:solidFill>
+                <a:effectLst>
+                  <a:outerShdw blurRad="12700" dist="38100" dir="2700000" algn="tl" rotWithShape="0">
+                    <a:schemeClr val="bg1">
+                      <a:lumMod val="50000"/>
+                    </a:schemeClr>
+                  </a:outerShdw>
+                </a:effectLst>
+              </a:rPr>
+              <a:t>DEMO</a:t>
+            </a:r>
+          </a:p>
+        </p:txBody>
+      </p:sp>
+    </p:spTree>
+    <p:extLst>
+      <p:ext uri="{BB962C8B-B14F-4D97-AF65-F5344CB8AC3E}">
+        <p14:creationId xmlns:p14="http://schemas.microsoft.com/office/powerpoint/2010/main" val="3768639824"/>
+      </p:ext>
+    </p:extLst>
+  </p:cSld>
+  <p:clrMapOvr>
+    <a:masterClrMapping/>
+  </p:clrMapOvr>
+  <mc:AlternateContent xmlns:mc="http://schemas.openxmlformats.org/markup-compatibility/2006" xmlns:p14="http://schemas.microsoft.com/office/powerpoint/2010/main">
+    <mc:Choice Requires="p14">
+      <p:transition spd="med" p14:dur="700">
+        <p:fade/>
+      </p:transition>
+    </mc:Choice>
+    <mc:Fallback xmlns="">
+      <p:transition spd="med">
+        <p:fade/>
+      </p:transition>
+    </mc:Fallback>
+  </mc:AlternateContent>
+</p:sld>
+</file>
+
+<file path=ppt/slides/slide15.xml><?xml version="1.0" encoding="utf-8"?>
+<p:sld xmlns:a="http://schemas.openxmlformats.org/drawingml/2006/main" xmlns:r="http://schemas.openxmlformats.org/officeDocument/2006/relationships" xmlns:p="http://schemas.openxmlformats.org/presentationml/2006/main">
+  <p:cSld>
+    <p:spTree>
+      <p:nvGrpSpPr>
+        <p:cNvPr id="1" name=""/>
+        <p:cNvGrpSpPr/>
+        <p:nvPr/>
+      </p:nvGrpSpPr>
+      <p:grpSpPr>
+        <a:xfrm>
+          <a:off x="0" y="0"/>
+          <a:ext cx="0" cy="0"/>
+          <a:chOff x="0" y="0"/>
+          <a:chExt cx="0" cy="0"/>
+        </a:xfrm>
+      </p:grpSpPr>
+      <p:sp>
+        <p:nvSpPr>
+          <p:cNvPr id="2" name="Title 1"/>
+          <p:cNvSpPr>
+            <a:spLocks noGrp="1"/>
+          </p:cNvSpPr>
+          <p:nvPr>
+            <p:ph type="title"/>
+          </p:nvPr>
+        </p:nvSpPr>
+        <p:spPr/>
+        <p:txBody>
+          <a:bodyPr/>
+          <a:lstStyle/>
+          <a:p>
+            <a:r>
+              <a:rPr lang="en-US" dirty="0"/>
+              <a:t>Title and Content Layout with Chart </a:t>
+            </a:r>
+          </a:p>
+        </p:txBody>
+      </p:sp>
+      <p:graphicFrame>
+        <p:nvGraphicFramePr>
+          <p:cNvPr id="7" name="Content Placeholder 6" descr="Line" title="Chart"/>
+          <p:cNvGraphicFramePr>
+            <a:graphicFrameLocks noGrp="1"/>
+          </p:cNvGraphicFramePr>
+          <p:nvPr>
+            <p:ph idx="1"/>
+            <p:extLst>
+              <p:ext uri="{D42A27DB-BD31-4B8C-83A1-F6EECF244321}">
+                <p14:modId xmlns:p14="http://schemas.microsoft.com/office/powerpoint/2010/main" val="2432020898"/>
+              </p:ext>
+            </p:extLst>
+          </p:nvPr>
+        </p:nvGraphicFramePr>
+        <p:xfrm>
+          <a:off x="1117600" y="1701800"/>
+          <a:ext cx="10156825" cy="4470400"/>
+        </p:xfrm>
+        <a:graphic>
+          <a:graphicData uri="http://schemas.openxmlformats.org/drawingml/2006/chart">
+            <c:chart xmlns:c="http://schemas.openxmlformats.org/drawingml/2006/chart" xmlns:r="http://schemas.openxmlformats.org/officeDocument/2006/relationships" r:id="rId2"/>
+          </a:graphicData>
+        </a:graphic>
+      </p:graphicFrame>
+    </p:spTree>
+    <p:extLst>
+      <p:ext uri="{BB962C8B-B14F-4D97-AF65-F5344CB8AC3E}">
+        <p14:creationId xmlns:p14="http://schemas.microsoft.com/office/powerpoint/2010/main" val="2474917317"/>
+      </p:ext>
+    </p:extLst>
+  </p:cSld>
+  <p:clrMapOvr>
+    <a:masterClrMapping/>
+  </p:clrMapOvr>
+  <mc:AlternateContent xmlns:mc="http://schemas.openxmlformats.org/markup-compatibility/2006" xmlns:p14="http://schemas.microsoft.com/office/powerpoint/2010/main">
+    <mc:Choice Requires="p14">
+      <p:transition spd="med" p14:dur="700">
+        <p:fade/>
+      </p:transition>
+    </mc:Choice>
+    <mc:Fallback xmlns="">
+      <p:transition spd="med">
+        <p:fade/>
+      </p:transition>
+    </mc:Fallback>
+  </mc:AlternateContent>
+</p:sld>
+</file>
+
+<file path=ppt/slides/slide16.xml><?xml version="1.0" encoding="utf-8"?>
+<p:sld xmlns:a="http://schemas.openxmlformats.org/drawingml/2006/main" xmlns:r="http://schemas.openxmlformats.org/officeDocument/2006/relationships" xmlns:p="http://schemas.openxmlformats.org/presentationml/2006/main">
+  <p:cSld>
+    <p:spTree>
+      <p:nvGrpSpPr>
+        <p:cNvPr id="1" name=""/>
+        <p:cNvGrpSpPr/>
+        <p:nvPr/>
+      </p:nvGrpSpPr>
+      <p:grpSpPr>
+        <a:xfrm>
+          <a:off x="0" y="0"/>
+          <a:ext cx="0" cy="0"/>
+          <a:chOff x="0" y="0"/>
+          <a:chExt cx="0" cy="0"/>
+        </a:xfrm>
+      </p:grpSpPr>
+      <p:sp>
+        <p:nvSpPr>
+          <p:cNvPr id="2" name="Title 1"/>
+          <p:cNvSpPr>
+            <a:spLocks noGrp="1"/>
+          </p:cNvSpPr>
+          <p:nvPr>
+            <p:ph type="title"/>
+          </p:nvPr>
+        </p:nvSpPr>
         <p:spPr/>
         <p:txBody>
           <a:bodyPr/>
@@ -8304,7 +9354,7 @@
 </p:sld>
 </file>
 
-<file path=ppt/slides/slide11.xml><?xml version="1.0" encoding="utf-8"?>
+<file path=ppt/slides/slide17.xml><?xml version="1.0" encoding="utf-8"?>
 <p:sld xmlns:a="http://schemas.openxmlformats.org/drawingml/2006/main" xmlns:r="http://schemas.openxmlformats.org/officeDocument/2006/relationships" xmlns:p="http://schemas.openxmlformats.org/presentationml/2006/main">
   <p:cSld>
     <p:spTree>
@@ -8429,7 +9479,7 @@
 </p:sld>
 </file>
 
-<file path=ppt/slides/slide12.xml><?xml version="1.0" encoding="utf-8"?>
+<file path=ppt/slides/slide18.xml><?xml version="1.0" encoding="utf-8"?>
 <p:sld xmlns:a="http://schemas.openxmlformats.org/drawingml/2006/main" xmlns:r="http://schemas.openxmlformats.org/officeDocument/2006/relationships" xmlns:p="http://schemas.openxmlformats.org/presentationml/2006/main">
   <p:cSld>
     <p:spTree>
@@ -8566,7 +9616,7 @@
 </p:sld>
 </file>
 
-<file path=ppt/slides/slide13.xml><?xml version="1.0" encoding="utf-8"?>
+<file path=ppt/slides/slide19.xml><?xml version="1.0" encoding="utf-8"?>
 <p:sld xmlns:a="http://schemas.openxmlformats.org/drawingml/2006/main" xmlns:r="http://schemas.openxmlformats.org/officeDocument/2006/relationships" xmlns:p="http://schemas.openxmlformats.org/presentationml/2006/main">
   <p:cSld>
     <p:spTree>
@@ -8606,239 +9656,6 @@
     <p:extLst>
       <p:ext uri="{BB962C8B-B14F-4D97-AF65-F5344CB8AC3E}">
         <p14:creationId xmlns:p14="http://schemas.microsoft.com/office/powerpoint/2010/main" val="1653943558"/>
-      </p:ext>
-    </p:extLst>
-  </p:cSld>
-  <p:clrMapOvr>
-    <a:masterClrMapping/>
-  </p:clrMapOvr>
-  <mc:AlternateContent xmlns:mc="http://schemas.openxmlformats.org/markup-compatibility/2006" xmlns:p14="http://schemas.microsoft.com/office/powerpoint/2010/main">
-    <mc:Choice Requires="p14">
-      <p:transition spd="med" p14:dur="700">
-        <p:fade/>
-      </p:transition>
-    </mc:Choice>
-    <mc:Fallback xmlns="">
-      <p:transition spd="med">
-        <p:fade/>
-      </p:transition>
-    </mc:Fallback>
-  </mc:AlternateContent>
-</p:sld>
-</file>
-
-<file path=ppt/slides/slide14.xml><?xml version="1.0" encoding="utf-8"?>
-<p:sld xmlns:a="http://schemas.openxmlformats.org/drawingml/2006/main" xmlns:r="http://schemas.openxmlformats.org/officeDocument/2006/relationships" xmlns:p="http://schemas.openxmlformats.org/presentationml/2006/main">
-  <p:cSld>
-    <p:spTree>
-      <p:nvGrpSpPr>
-        <p:cNvPr id="1" name=""/>
-        <p:cNvGrpSpPr/>
-        <p:nvPr/>
-      </p:nvGrpSpPr>
-      <p:grpSpPr>
-        <a:xfrm>
-          <a:off x="0" y="0"/>
-          <a:ext cx="0" cy="0"/>
-          <a:chOff x="0" y="0"/>
-          <a:chExt cx="0" cy="0"/>
-        </a:xfrm>
-      </p:grpSpPr>
-    </p:spTree>
-    <p:extLst>
-      <p:ext uri="{BB962C8B-B14F-4D97-AF65-F5344CB8AC3E}">
-        <p14:creationId xmlns:p14="http://schemas.microsoft.com/office/powerpoint/2010/main" val="3030984589"/>
-      </p:ext>
-    </p:extLst>
-  </p:cSld>
-  <p:clrMapOvr>
-    <a:masterClrMapping/>
-  </p:clrMapOvr>
-  <mc:AlternateContent xmlns:mc="http://schemas.openxmlformats.org/markup-compatibility/2006" xmlns:p14="http://schemas.microsoft.com/office/powerpoint/2010/main">
-    <mc:Choice Requires="p14">
-      <p:transition spd="med" p14:dur="700">
-        <p:fade/>
-      </p:transition>
-    </mc:Choice>
-    <mc:Fallback xmlns="">
-      <p:transition spd="med">
-        <p:fade/>
-      </p:transition>
-    </mc:Fallback>
-  </mc:AlternateContent>
-</p:sld>
-</file>
-
-<file path=ppt/slides/slide15.xml><?xml version="1.0" encoding="utf-8"?>
-<p:sld xmlns:a="http://schemas.openxmlformats.org/drawingml/2006/main" xmlns:r="http://schemas.openxmlformats.org/officeDocument/2006/relationships" xmlns:p="http://schemas.openxmlformats.org/presentationml/2006/main">
-  <p:cSld>
-    <p:spTree>
-      <p:nvGrpSpPr>
-        <p:cNvPr id="1" name=""/>
-        <p:cNvGrpSpPr/>
-        <p:nvPr/>
-      </p:nvGrpSpPr>
-      <p:grpSpPr>
-        <a:xfrm>
-          <a:off x="0" y="0"/>
-          <a:ext cx="0" cy="0"/>
-          <a:chOff x="0" y="0"/>
-          <a:chExt cx="0" cy="0"/>
-        </a:xfrm>
-      </p:grpSpPr>
-      <p:sp>
-        <p:nvSpPr>
-          <p:cNvPr id="2" name="Title 1"/>
-          <p:cNvSpPr>
-            <a:spLocks noGrp="1"/>
-          </p:cNvSpPr>
-          <p:nvPr>
-            <p:ph type="title"/>
-          </p:nvPr>
-        </p:nvSpPr>
-        <p:spPr/>
-        <p:txBody>
-          <a:bodyPr/>
-          <a:lstStyle/>
-          <a:p>
-            <a:endParaRPr lang="en-US"/>
-          </a:p>
-        </p:txBody>
-      </p:sp>
-      <p:sp>
-        <p:nvSpPr>
-          <p:cNvPr id="3" name="Content Placeholder 2"/>
-          <p:cNvSpPr>
-            <a:spLocks noGrp="1"/>
-          </p:cNvSpPr>
-          <p:nvPr>
-            <p:ph idx="1"/>
-          </p:nvPr>
-        </p:nvSpPr>
-        <p:spPr/>
-        <p:txBody>
-          <a:bodyPr/>
-          <a:lstStyle/>
-          <a:p>
-            <a:endParaRPr lang="en-US"/>
-          </a:p>
-        </p:txBody>
-      </p:sp>
-      <p:sp>
-        <p:nvSpPr>
-          <p:cNvPr id="4" name="Text Placeholder 3"/>
-          <p:cNvSpPr>
-            <a:spLocks noGrp="1"/>
-          </p:cNvSpPr>
-          <p:nvPr>
-            <p:ph type="body" sz="half" idx="2"/>
-          </p:nvPr>
-        </p:nvSpPr>
-        <p:spPr/>
-        <p:txBody>
-          <a:bodyPr/>
-          <a:lstStyle/>
-          <a:p>
-            <a:endParaRPr lang="en-US"/>
-          </a:p>
-        </p:txBody>
-      </p:sp>
-    </p:spTree>
-    <p:extLst>
-      <p:ext uri="{BB962C8B-B14F-4D97-AF65-F5344CB8AC3E}">
-        <p14:creationId xmlns:p14="http://schemas.microsoft.com/office/powerpoint/2010/main" val="1750688946"/>
-      </p:ext>
-    </p:extLst>
-  </p:cSld>
-  <p:clrMapOvr>
-    <a:masterClrMapping/>
-  </p:clrMapOvr>
-  <mc:AlternateContent xmlns:mc="http://schemas.openxmlformats.org/markup-compatibility/2006" xmlns:p14="http://schemas.microsoft.com/office/powerpoint/2010/main">
-    <mc:Choice Requires="p14">
-      <p:transition spd="med" p14:dur="700">
-        <p:fade/>
-      </p:transition>
-    </mc:Choice>
-    <mc:Fallback xmlns="">
-      <p:transition spd="med">
-        <p:fade/>
-      </p:transition>
-    </mc:Fallback>
-  </mc:AlternateContent>
-</p:sld>
-</file>
-
-<file path=ppt/slides/slide16.xml><?xml version="1.0" encoding="utf-8"?>
-<p:sld xmlns:a="http://schemas.openxmlformats.org/drawingml/2006/main" xmlns:r="http://schemas.openxmlformats.org/officeDocument/2006/relationships" xmlns:p="http://schemas.openxmlformats.org/presentationml/2006/main">
-  <p:cSld>
-    <p:spTree>
-      <p:nvGrpSpPr>
-        <p:cNvPr id="1" name=""/>
-        <p:cNvGrpSpPr/>
-        <p:nvPr/>
-      </p:nvGrpSpPr>
-      <p:grpSpPr>
-        <a:xfrm>
-          <a:off x="0" y="0"/>
-          <a:ext cx="0" cy="0"/>
-          <a:chOff x="0" y="0"/>
-          <a:chExt cx="0" cy="0"/>
-        </a:xfrm>
-      </p:grpSpPr>
-      <p:sp>
-        <p:nvSpPr>
-          <p:cNvPr id="2" name="Title 1"/>
-          <p:cNvSpPr>
-            <a:spLocks noGrp="1"/>
-          </p:cNvSpPr>
-          <p:nvPr>
-            <p:ph type="title"/>
-          </p:nvPr>
-        </p:nvSpPr>
-        <p:spPr/>
-        <p:txBody>
-          <a:bodyPr/>
-          <a:lstStyle/>
-          <a:p>
-            <a:endParaRPr lang="en-US" dirty="0"/>
-          </a:p>
-        </p:txBody>
-      </p:sp>
-      <p:sp>
-        <p:nvSpPr>
-          <p:cNvPr id="4" name="Text Placeholder 3"/>
-          <p:cNvSpPr>
-            <a:spLocks noGrp="1"/>
-          </p:cNvSpPr>
-          <p:nvPr>
-            <p:ph type="body" sz="half" idx="2"/>
-          </p:nvPr>
-        </p:nvSpPr>
-        <p:spPr/>
-        <p:txBody>
-          <a:bodyPr/>
-          <a:lstStyle/>
-          <a:p>
-            <a:endParaRPr lang="en-US" dirty="0"/>
-          </a:p>
-        </p:txBody>
-      </p:sp>
-      <p:sp>
-        <p:nvSpPr>
-          <p:cNvPr id="3" name="Picture Placeholder 2"/>
-          <p:cNvSpPr>
-            <a:spLocks noGrp="1"/>
-          </p:cNvSpPr>
-          <p:nvPr>
-            <p:ph type="pic" idx="1"/>
-          </p:nvPr>
-        </p:nvSpPr>
-        <p:spPr/>
-      </p:sp>
-    </p:spTree>
-    <p:extLst>
-      <p:ext uri="{BB962C8B-B14F-4D97-AF65-F5344CB8AC3E}">
-        <p14:creationId xmlns:p14="http://schemas.microsoft.com/office/powerpoint/2010/main" val="3761302454"/>
       </p:ext>
     </p:extLst>
   </p:cSld>
@@ -9010,6 +9827,246 @@
     <p:extLst>
       <p:ext uri="{BB962C8B-B14F-4D97-AF65-F5344CB8AC3E}">
         <p14:creationId xmlns:p14="http://schemas.microsoft.com/office/powerpoint/2010/main" val="711182959"/>
+      </p:ext>
+    </p:extLst>
+  </p:cSld>
+  <p:clrMapOvr>
+    <a:masterClrMapping/>
+  </p:clrMapOvr>
+  <mc:AlternateContent xmlns:mc="http://schemas.openxmlformats.org/markup-compatibility/2006" xmlns:p14="http://schemas.microsoft.com/office/powerpoint/2010/main">
+    <mc:Choice Requires="p14">
+      <p:transition spd="med" p14:dur="700">
+        <p:fade/>
+      </p:transition>
+    </mc:Choice>
+    <mc:Fallback xmlns="">
+      <p:transition spd="med">
+        <p:fade/>
+      </p:transition>
+    </mc:Fallback>
+  </mc:AlternateContent>
+</p:sld>
+</file>
+
+<file path=ppt/slides/slide20.xml><?xml version="1.0" encoding="utf-8"?>
+<p:sld xmlns:a="http://schemas.openxmlformats.org/drawingml/2006/main" xmlns:r="http://schemas.openxmlformats.org/officeDocument/2006/relationships" xmlns:p="http://schemas.openxmlformats.org/presentationml/2006/main">
+  <p:cSld>
+    <p:spTree>
+      <p:nvGrpSpPr>
+        <p:cNvPr id="1" name=""/>
+        <p:cNvGrpSpPr/>
+        <p:nvPr/>
+      </p:nvGrpSpPr>
+      <p:grpSpPr>
+        <a:xfrm>
+          <a:off x="0" y="0"/>
+          <a:ext cx="0" cy="0"/>
+          <a:chOff x="0" y="0"/>
+          <a:chExt cx="0" cy="0"/>
+        </a:xfrm>
+      </p:grpSpPr>
+    </p:spTree>
+    <p:extLst>
+      <p:ext uri="{BB962C8B-B14F-4D97-AF65-F5344CB8AC3E}">
+        <p14:creationId xmlns:p14="http://schemas.microsoft.com/office/powerpoint/2010/main" val="3030984589"/>
+      </p:ext>
+    </p:extLst>
+  </p:cSld>
+  <p:clrMapOvr>
+    <a:masterClrMapping/>
+  </p:clrMapOvr>
+  <mc:AlternateContent xmlns:mc="http://schemas.openxmlformats.org/markup-compatibility/2006" xmlns:p14="http://schemas.microsoft.com/office/powerpoint/2010/main">
+    <mc:Choice Requires="p14">
+      <p:transition spd="med" p14:dur="700">
+        <p:fade/>
+      </p:transition>
+    </mc:Choice>
+    <mc:Fallback xmlns="">
+      <p:transition spd="med">
+        <p:fade/>
+      </p:transition>
+    </mc:Fallback>
+  </mc:AlternateContent>
+</p:sld>
+</file>
+
+<file path=ppt/slides/slide21.xml><?xml version="1.0" encoding="utf-8"?>
+<p:sld xmlns:a="http://schemas.openxmlformats.org/drawingml/2006/main" xmlns:r="http://schemas.openxmlformats.org/officeDocument/2006/relationships" xmlns:p="http://schemas.openxmlformats.org/presentationml/2006/main">
+  <p:cSld>
+    <p:spTree>
+      <p:nvGrpSpPr>
+        <p:cNvPr id="1" name=""/>
+        <p:cNvGrpSpPr/>
+        <p:nvPr/>
+      </p:nvGrpSpPr>
+      <p:grpSpPr>
+        <a:xfrm>
+          <a:off x="0" y="0"/>
+          <a:ext cx="0" cy="0"/>
+          <a:chOff x="0" y="0"/>
+          <a:chExt cx="0" cy="0"/>
+        </a:xfrm>
+      </p:grpSpPr>
+      <p:sp>
+        <p:nvSpPr>
+          <p:cNvPr id="2" name="Title 1"/>
+          <p:cNvSpPr>
+            <a:spLocks noGrp="1"/>
+          </p:cNvSpPr>
+          <p:nvPr>
+            <p:ph type="title"/>
+          </p:nvPr>
+        </p:nvSpPr>
+        <p:spPr/>
+        <p:txBody>
+          <a:bodyPr/>
+          <a:lstStyle/>
+          <a:p>
+            <a:endParaRPr lang="en-US"/>
+          </a:p>
+        </p:txBody>
+      </p:sp>
+      <p:sp>
+        <p:nvSpPr>
+          <p:cNvPr id="3" name="Content Placeholder 2"/>
+          <p:cNvSpPr>
+            <a:spLocks noGrp="1"/>
+          </p:cNvSpPr>
+          <p:nvPr>
+            <p:ph idx="1"/>
+          </p:nvPr>
+        </p:nvSpPr>
+        <p:spPr/>
+        <p:txBody>
+          <a:bodyPr/>
+          <a:lstStyle/>
+          <a:p>
+            <a:endParaRPr lang="en-US"/>
+          </a:p>
+        </p:txBody>
+      </p:sp>
+      <p:sp>
+        <p:nvSpPr>
+          <p:cNvPr id="4" name="Text Placeholder 3"/>
+          <p:cNvSpPr>
+            <a:spLocks noGrp="1"/>
+          </p:cNvSpPr>
+          <p:nvPr>
+            <p:ph type="body" sz="half" idx="2"/>
+          </p:nvPr>
+        </p:nvSpPr>
+        <p:spPr/>
+        <p:txBody>
+          <a:bodyPr/>
+          <a:lstStyle/>
+          <a:p>
+            <a:endParaRPr lang="en-US"/>
+          </a:p>
+        </p:txBody>
+      </p:sp>
+    </p:spTree>
+    <p:extLst>
+      <p:ext uri="{BB962C8B-B14F-4D97-AF65-F5344CB8AC3E}">
+        <p14:creationId xmlns:p14="http://schemas.microsoft.com/office/powerpoint/2010/main" val="1750688946"/>
+      </p:ext>
+    </p:extLst>
+  </p:cSld>
+  <p:clrMapOvr>
+    <a:masterClrMapping/>
+  </p:clrMapOvr>
+  <mc:AlternateContent xmlns:mc="http://schemas.openxmlformats.org/markup-compatibility/2006" xmlns:p14="http://schemas.microsoft.com/office/powerpoint/2010/main">
+    <mc:Choice Requires="p14">
+      <p:transition spd="med" p14:dur="700">
+        <p:fade/>
+      </p:transition>
+    </mc:Choice>
+    <mc:Fallback xmlns="">
+      <p:transition spd="med">
+        <p:fade/>
+      </p:transition>
+    </mc:Fallback>
+  </mc:AlternateContent>
+</p:sld>
+</file>
+
+<file path=ppt/slides/slide22.xml><?xml version="1.0" encoding="utf-8"?>
+<p:sld xmlns:a="http://schemas.openxmlformats.org/drawingml/2006/main" xmlns:r="http://schemas.openxmlformats.org/officeDocument/2006/relationships" xmlns:p="http://schemas.openxmlformats.org/presentationml/2006/main">
+  <p:cSld>
+    <p:spTree>
+      <p:nvGrpSpPr>
+        <p:cNvPr id="1" name=""/>
+        <p:cNvGrpSpPr/>
+        <p:nvPr/>
+      </p:nvGrpSpPr>
+      <p:grpSpPr>
+        <a:xfrm>
+          <a:off x="0" y="0"/>
+          <a:ext cx="0" cy="0"/>
+          <a:chOff x="0" y="0"/>
+          <a:chExt cx="0" cy="0"/>
+        </a:xfrm>
+      </p:grpSpPr>
+      <p:sp>
+        <p:nvSpPr>
+          <p:cNvPr id="2" name="Title 1"/>
+          <p:cNvSpPr>
+            <a:spLocks noGrp="1"/>
+          </p:cNvSpPr>
+          <p:nvPr>
+            <p:ph type="title"/>
+          </p:nvPr>
+        </p:nvSpPr>
+        <p:spPr/>
+        <p:txBody>
+          <a:bodyPr/>
+          <a:lstStyle/>
+          <a:p>
+            <a:r>
+              <a:rPr lang="en-US" dirty="0"/>
+              <a:t>+</a:t>
+            </a:r>
+            <a:br>
+              <a:rPr lang="en-US" dirty="0"/>
+            </a:br>
+            <a:endParaRPr lang="en-US" dirty="0"/>
+          </a:p>
+        </p:txBody>
+      </p:sp>
+      <p:sp>
+        <p:nvSpPr>
+          <p:cNvPr id="4" name="Text Placeholder 3"/>
+          <p:cNvSpPr>
+            <a:spLocks noGrp="1"/>
+          </p:cNvSpPr>
+          <p:nvPr>
+            <p:ph type="body" sz="half" idx="2"/>
+          </p:nvPr>
+        </p:nvSpPr>
+        <p:spPr/>
+        <p:txBody>
+          <a:bodyPr/>
+          <a:lstStyle/>
+          <a:p>
+            <a:endParaRPr lang="en-US" dirty="0"/>
+          </a:p>
+        </p:txBody>
+      </p:sp>
+      <p:sp>
+        <p:nvSpPr>
+          <p:cNvPr id="3" name="Picture Placeholder 2"/>
+          <p:cNvSpPr>
+            <a:spLocks noGrp="1"/>
+          </p:cNvSpPr>
+          <p:nvPr>
+            <p:ph type="pic" idx="1"/>
+          </p:nvPr>
+        </p:nvSpPr>
+        <p:spPr/>
+      </p:sp>
+    </p:spTree>
+    <p:extLst>
+      <p:ext uri="{BB962C8B-B14F-4D97-AF65-F5344CB8AC3E}">
+        <p14:creationId xmlns:p14="http://schemas.microsoft.com/office/powerpoint/2010/main" val="3761302454"/>
       </p:ext>
     </p:extLst>
   </p:cSld>
@@ -9851,7 +10908,7 @@
         <p:spPr>
           <a:xfrm>
             <a:off x="1827212" y="3581400"/>
-            <a:ext cx="6248400" cy="1143000"/>
+            <a:ext cx="6248400" cy="2743200"/>
           </a:xfrm>
         </p:spPr>
         <p:txBody>
@@ -9867,8 +10924,26 @@
           </a:p>
           <a:p>
             <a:r>
+              <a:rPr lang="en-US" dirty="0"/>
+              <a:t>Exporting and importing metadata</a:t>
+            </a:r>
+          </a:p>
+          <a:p>
+            <a:r>
+              <a:rPr lang="en-US" sz="2000" dirty="0"/>
+              <a:t>Sanitization</a:t>
+            </a:r>
+          </a:p>
+          <a:p>
+            <a:r>
               <a:rPr lang="en-US" sz="2000" dirty="0"/>
               <a:t>Barcode</a:t>
+            </a:r>
+          </a:p>
+          <a:p>
+            <a:r>
+              <a:rPr lang="en-US" sz="2000" dirty="0"/>
+              <a:t>All together to create PDF workflow</a:t>
             </a:r>
           </a:p>
         </p:txBody>
@@ -9985,7 +11060,7 @@
         <p:spPr>
           <a:xfrm>
             <a:off x="1002804" y="1905000"/>
-            <a:ext cx="8520608" cy="2590800"/>
+            <a:ext cx="6006008" cy="3505200"/>
           </a:xfrm>
         </p:spPr>
         <p:txBody>
@@ -10030,53 +11105,56 @@
           </a:p>
         </p:txBody>
       </p:sp>
-      <p:sp>
-        <p:nvSpPr>
-          <p:cNvPr id="3" name="Rectangle 2"/>
-          <p:cNvSpPr/>
+      <p:pic>
+        <p:nvPicPr>
+          <p:cNvPr id="5" name="Picture 4"/>
+          <p:cNvPicPr>
+            <a:picLocks noChangeAspect="1"/>
+          </p:cNvPicPr>
           <p:nvPr/>
-        </p:nvSpPr>
+        </p:nvPicPr>
+        <p:blipFill>
+          <a:blip r:embed="rId2"/>
+          <a:stretch>
+            <a:fillRect/>
+          </a:stretch>
+        </p:blipFill>
         <p:spPr>
           <a:xfrm>
-            <a:off x="4341812" y="4648200"/>
-            <a:ext cx="3276600" cy="1200329"/>
+            <a:off x="7618412" y="2053572"/>
+            <a:ext cx="3733800" cy="2800350"/>
           </a:xfrm>
           <a:prstGeom prst="rect">
             <a:avLst/>
           </a:prstGeom>
-          <a:noFill/>
+          <a:ln w="190500" cap="sq">
+            <a:solidFill>
+              <a:srgbClr val="C8C6BD"/>
+            </a:solidFill>
+            <a:prstDash val="solid"/>
+            <a:miter lim="800000"/>
+          </a:ln>
+          <a:effectLst>
+            <a:outerShdw blurRad="254000" algn="bl" rotWithShape="0">
+              <a:srgbClr val="000000">
+                <a:alpha val="43000"/>
+              </a:srgbClr>
+            </a:outerShdw>
+          </a:effectLst>
+          <a:scene3d>
+            <a:camera prst="perspectiveFront" fov="5400000"/>
+            <a:lightRig rig="threePt" dir="t">
+              <a:rot lat="0" lon="0" rev="2100000"/>
+            </a:lightRig>
+          </a:scene3d>
+          <a:sp3d extrusionH="25400">
+            <a:bevelT w="304800" h="152400" prst="hardEdge"/>
+            <a:extrusionClr>
+              <a:srgbClr val="000000"/>
+            </a:extrusionClr>
+          </a:sp3d>
         </p:spPr>
-        <p:txBody>
-          <a:bodyPr wrap="square" lIns="91440" tIns="45720" rIns="91440" bIns="45720">
-            <a:spAutoFit/>
-          </a:bodyPr>
-          <a:lstStyle/>
-          <a:p>
-            <a:pPr algn="ctr"/>
-            <a:r>
-              <a:rPr lang="en-US" sz="7200" b="1" cap="none" spc="0" dirty="0">
-                <a:ln w="9525">
-                  <a:solidFill>
-                    <a:schemeClr val="bg1"/>
-                  </a:solidFill>
-                  <a:prstDash val="solid"/>
-                </a:ln>
-                <a:solidFill>
-                  <a:schemeClr val="tx1"/>
-                </a:solidFill>
-                <a:effectLst>
-                  <a:outerShdw blurRad="12700" dist="38100" dir="2700000" algn="tl" rotWithShape="0">
-                    <a:schemeClr val="bg1">
-                      <a:lumMod val="50000"/>
-                    </a:schemeClr>
-                  </a:outerShdw>
-                </a:effectLst>
-              </a:rPr>
-              <a:t>DEMO</a:t>
-            </a:r>
-          </a:p>
-        </p:txBody>
-      </p:sp>
+      </p:pic>
     </p:spTree>
     <p:extLst>
       <p:ext uri="{BB962C8B-B14F-4D97-AF65-F5344CB8AC3E}">
@@ -10121,55 +11199,55 @@
       </p:grpSpPr>
       <p:sp>
         <p:nvSpPr>
-          <p:cNvPr id="2" name="Title 1"/>
-          <p:cNvSpPr>
-            <a:spLocks noGrp="1"/>
-          </p:cNvSpPr>
-          <p:nvPr>
-            <p:ph type="title"/>
-          </p:nvPr>
+          <p:cNvPr id="4" name="Rectangle 3"/>
+          <p:cNvSpPr/>
+          <p:nvPr/>
         </p:nvSpPr>
-        <p:spPr/>
+        <p:spPr>
+          <a:xfrm>
+            <a:off x="4494212" y="2667000"/>
+            <a:ext cx="3276600" cy="1200329"/>
+          </a:xfrm>
+          <a:prstGeom prst="rect">
+            <a:avLst/>
+          </a:prstGeom>
+          <a:noFill/>
+        </p:spPr>
         <p:txBody>
-          <a:bodyPr/>
+          <a:bodyPr wrap="square" lIns="91440" tIns="45720" rIns="91440" bIns="45720">
+            <a:spAutoFit/>
+          </a:bodyPr>
           <a:lstStyle/>
           <a:p>
-            <a:r>
-              <a:rPr lang="en-US" dirty="0"/>
-              <a:t>Title and Content Layout with Chart </a:t>
+            <a:pPr algn="ctr"/>
+            <a:r>
+              <a:rPr lang="en-US" sz="7200" b="1" cap="none" spc="0" dirty="0">
+                <a:ln w="9525">
+                  <a:solidFill>
+                    <a:schemeClr val="bg1"/>
+                  </a:solidFill>
+                  <a:prstDash val="solid"/>
+                </a:ln>
+                <a:solidFill>
+                  <a:schemeClr val="tx1"/>
+                </a:solidFill>
+                <a:effectLst>
+                  <a:outerShdw blurRad="12700" dist="38100" dir="2700000" algn="tl" rotWithShape="0">
+                    <a:schemeClr val="bg1">
+                      <a:lumMod val="50000"/>
+                    </a:schemeClr>
+                  </a:outerShdw>
+                </a:effectLst>
+              </a:rPr>
+              <a:t>DEMO</a:t>
             </a:r>
           </a:p>
         </p:txBody>
       </p:sp>
-      <p:graphicFrame>
-        <p:nvGraphicFramePr>
-          <p:cNvPr id="7" name="Content Placeholder 6" descr="Line" title="Chart"/>
-          <p:cNvGraphicFramePr>
-            <a:graphicFrameLocks noGrp="1"/>
-          </p:cNvGraphicFramePr>
-          <p:nvPr>
-            <p:ph idx="1"/>
-            <p:extLst>
-              <p:ext uri="{D42A27DB-BD31-4B8C-83A1-F6EECF244321}">
-                <p14:modId xmlns:p14="http://schemas.microsoft.com/office/powerpoint/2010/main" val="2432020898"/>
-              </p:ext>
-            </p:extLst>
-          </p:nvPr>
-        </p:nvGraphicFramePr>
-        <p:xfrm>
-          <a:off x="1117600" y="1701800"/>
-          <a:ext cx="10156825" cy="4470400"/>
-        </p:xfrm>
-        <a:graphic>
-          <a:graphicData uri="http://schemas.openxmlformats.org/drawingml/2006/chart">
-            <c:chart xmlns:c="http://schemas.openxmlformats.org/drawingml/2006/chart" xmlns:r="http://schemas.openxmlformats.org/officeDocument/2006/relationships" r:id="rId2"/>
-          </a:graphicData>
-        </a:graphic>
-      </p:graphicFrame>
     </p:spTree>
     <p:extLst>
       <p:ext uri="{BB962C8B-B14F-4D97-AF65-F5344CB8AC3E}">
-        <p14:creationId xmlns:p14="http://schemas.microsoft.com/office/powerpoint/2010/main" val="2474917317"/>
+        <p14:creationId xmlns:p14="http://schemas.microsoft.com/office/powerpoint/2010/main" val="2715543706"/>
       </p:ext>
     </p:extLst>
   </p:cSld>

</xml_diff>

<commit_message>
index added to custom properties and import/export
</commit_message>
<xml_diff>
--- a/powerpoint/SmartPDF/Don't Just PDF.pptx
+++ b/powerpoint/SmartPDF/Don't Just PDF.pptx
@@ -3975,7 +3975,7 @@
                   <a:schemeClr val="tx2"/>
                 </a:solidFill>
               </a:rPr>
-              <a:t>9/6/2016</a:t>
+              <a:t>9/7/2016</a:t>
             </a:fld>
             <a:endParaRPr>
               <a:solidFill>
@@ -4165,7 +4165,7 @@
             <a:fld id="{F95CF31C-F757-429C-A789-86504F04C3BE}" type="datetimeFigureOut">
               <a:rPr lang="en-US"/>
               <a:pPr/>
-              <a:t>9/6/2016</a:t>
+              <a:t>9/7/2016</a:t>
             </a:fld>
             <a:endParaRPr/>
           </a:p>
@@ -4765,7 +4765,7 @@
           <a:p>
             <a:fld id="{7AECB6C2-1084-4AED-A74A-DF028B0094EA}" type="datetimeFigureOut">
               <a:rPr lang="en-US"/>
-              <a:t>9/6/2016</a:t>
+              <a:t>9/7/2016</a:t>
             </a:fld>
             <a:endParaRPr/>
           </a:p>
@@ -4957,7 +4957,7 @@
           <a:p>
             <a:fld id="{7AECB6C2-1084-4AED-A74A-DF028B0094EA}" type="datetimeFigureOut">
               <a:rPr lang="en-US"/>
-              <a:t>9/6/2016</a:t>
+              <a:t>9/7/2016</a:t>
             </a:fld>
             <a:endParaRPr/>
           </a:p>
@@ -5155,7 +5155,7 @@
           <a:p>
             <a:fld id="{8B5A30F4-0B4E-4E4B-BC36-C30CD13F4E17}" type="datetimeFigureOut">
               <a:rPr lang="en-US"/>
-              <a:t>9/6/2016</a:t>
+              <a:t>9/7/2016</a:t>
             </a:fld>
             <a:endParaRPr/>
           </a:p>
@@ -5671,7 +5671,7 @@
           <a:p>
             <a:fld id="{2DD204D1-F9BD-4643-8480-6EA41EB484F1}" type="datetimeFigureOut">
               <a:rPr lang="en-US"/>
-              <a:t>9/6/2016</a:t>
+              <a:t>9/7/2016</a:t>
             </a:fld>
             <a:endParaRPr/>
           </a:p>
@@ -6119,7 +6119,7 @@
           <a:p>
             <a:fld id="{2DD204D1-F9BD-4643-8480-6EA41EB484F1}" type="datetimeFigureOut">
               <a:rPr lang="en-US"/>
-              <a:t>9/6/2016</a:t>
+              <a:t>9/7/2016</a:t>
             </a:fld>
             <a:endParaRPr/>
           </a:p>
@@ -6249,7 +6249,7 @@
           <a:p>
             <a:fld id="{2DD204D1-F9BD-4643-8480-6EA41EB484F1}" type="datetimeFigureOut">
               <a:rPr lang="en-US"/>
-              <a:t>9/6/2016</a:t>
+              <a:t>9/7/2016</a:t>
             </a:fld>
             <a:endParaRPr/>
           </a:p>
@@ -6356,7 +6356,7 @@
           <a:p>
             <a:fld id="{2DD204D1-F9BD-4643-8480-6EA41EB484F1}" type="datetimeFigureOut">
               <a:rPr lang="en-US"/>
-              <a:t>9/6/2016</a:t>
+              <a:t>9/7/2016</a:t>
             </a:fld>
             <a:endParaRPr/>
           </a:p>
@@ -6713,7 +6713,7 @@
           <a:p>
             <a:fld id="{126BF754-515F-40B9-8D24-D54D5825B3D0}" type="datetimeFigureOut">
               <a:rPr lang="en-US"/>
-              <a:t>9/6/2016</a:t>
+              <a:t>9/7/2016</a:t>
             </a:fld>
             <a:endParaRPr/>
           </a:p>
@@ -7050,7 +7050,7 @@
           <a:p>
             <a:fld id="{126BF754-515F-40B9-8D24-D54D5825B3D0}" type="datetimeFigureOut">
               <a:rPr lang="en-US"/>
-              <a:t>9/6/2016</a:t>
+              <a:t>9/7/2016</a:t>
             </a:fld>
             <a:endParaRPr/>
           </a:p>
@@ -7345,7 +7345,7 @@
             <a:fld id="{2DD204D1-F9BD-4643-8480-6EA41EB484F1}" type="datetimeFigureOut">
               <a:rPr lang="en-US"/>
               <a:pPr/>
-              <a:t>9/6/2016</a:t>
+              <a:t>9/7/2016</a:t>
             </a:fld>
             <a:endParaRPr/>
           </a:p>

</xml_diff>

<commit_message>
powerpoint slide updated with new layout
</commit_message>
<xml_diff>
--- a/powerpoint/SmartPDF/Don't Just PDF.pptx
+++ b/powerpoint/SmartPDF/Don't Just PDF.pptx
@@ -4140,7 +4140,7 @@
                   <a:schemeClr val="tx2"/>
                 </a:solidFill>
               </a:rPr>
-              <a:t>9/7/2016</a:t>
+              <a:t>9/13/2016</a:t>
             </a:fld>
             <a:endParaRPr>
               <a:solidFill>
@@ -4330,7 +4330,7 @@
             <a:fld id="{F95CF31C-F757-429C-A789-86504F04C3BE}" type="datetimeFigureOut">
               <a:rPr lang="en-US"/>
               <a:pPr/>
-              <a:t>9/7/2016</a:t>
+              <a:t>9/13/2016</a:t>
             </a:fld>
             <a:endParaRPr/>
           </a:p>
@@ -4751,7 +4751,7 @@
           <a:p>
             <a:fld id="{43BAF7D2-47D3-439E-B818-706FF392AEFA}" type="datetimeFigureOut">
               <a:rPr lang="en-IN" smtClean="0"/>
-              <a:t>07-09-2016</a:t>
+              <a:t>13-09-2016</a:t>
             </a:fld>
             <a:endParaRPr lang="en-IN"/>
           </a:p>
@@ -4921,7 +4921,7 @@
           <a:p>
             <a:fld id="{43BAF7D2-47D3-439E-B818-706FF392AEFA}" type="datetimeFigureOut">
               <a:rPr lang="en-IN" smtClean="0"/>
-              <a:t>07-09-2016</a:t>
+              <a:t>13-09-2016</a:t>
             </a:fld>
             <a:endParaRPr lang="en-IN"/>
           </a:p>
@@ -5101,7 +5101,7 @@
           <a:p>
             <a:fld id="{43BAF7D2-47D3-439E-B818-706FF392AEFA}" type="datetimeFigureOut">
               <a:rPr lang="en-IN" smtClean="0"/>
-              <a:t>07-09-2016</a:t>
+              <a:t>13-09-2016</a:t>
             </a:fld>
             <a:endParaRPr lang="en-IN"/>
           </a:p>
@@ -5407,7 +5407,7 @@
           <a:p>
             <a:fld id="{43BAF7D2-47D3-439E-B818-706FF392AEFA}" type="datetimeFigureOut">
               <a:rPr lang="en-IN" smtClean="0"/>
-              <a:t>07-09-2016</a:t>
+              <a:t>13-09-2016</a:t>
             </a:fld>
             <a:endParaRPr lang="en-IN"/>
           </a:p>
@@ -5774,7 +5774,7 @@
           <a:p>
             <a:fld id="{43BAF7D2-47D3-439E-B818-706FF392AEFA}" type="datetimeFigureOut">
               <a:rPr lang="en-IN" smtClean="0"/>
-              <a:t>07-09-2016</a:t>
+              <a:t>13-09-2016</a:t>
             </a:fld>
             <a:endParaRPr lang="en-IN"/>
           </a:p>
@@ -5892,7 +5892,7 @@
           <a:p>
             <a:fld id="{43BAF7D2-47D3-439E-B818-706FF392AEFA}" type="datetimeFigureOut">
               <a:rPr lang="en-IN" smtClean="0"/>
-              <a:t>07-09-2016</a:t>
+              <a:t>13-09-2016</a:t>
             </a:fld>
             <a:endParaRPr lang="en-IN"/>
           </a:p>
@@ -5987,7 +5987,7 @@
           <a:p>
             <a:fld id="{43BAF7D2-47D3-439E-B818-706FF392AEFA}" type="datetimeFigureOut">
               <a:rPr lang="en-IN" smtClean="0"/>
-              <a:t>07-09-2016</a:t>
+              <a:t>13-09-2016</a:t>
             </a:fld>
             <a:endParaRPr lang="en-IN"/>
           </a:p>
@@ -6264,7 +6264,7 @@
           <a:p>
             <a:fld id="{43BAF7D2-47D3-439E-B818-706FF392AEFA}" type="datetimeFigureOut">
               <a:rPr lang="en-IN" smtClean="0"/>
-              <a:t>07-09-2016</a:t>
+              <a:t>13-09-2016</a:t>
             </a:fld>
             <a:endParaRPr lang="en-IN"/>
           </a:p>
@@ -6521,7 +6521,7 @@
           <a:p>
             <a:fld id="{43BAF7D2-47D3-439E-B818-706FF392AEFA}" type="datetimeFigureOut">
               <a:rPr lang="en-IN" smtClean="0"/>
-              <a:t>07-09-2016</a:t>
+              <a:t>13-09-2016</a:t>
             </a:fld>
             <a:endParaRPr lang="en-IN"/>
           </a:p>
@@ -6743,7 +6743,7 @@
           <a:p>
             <a:fld id="{43BAF7D2-47D3-439E-B818-706FF392AEFA}" type="datetimeFigureOut">
               <a:rPr lang="en-IN" smtClean="0"/>
-              <a:t>07-09-2016</a:t>
+              <a:t>13-09-2016</a:t>
             </a:fld>
             <a:endParaRPr lang="en-IN"/>
           </a:p>
@@ -20398,14 +20398,20 @@
           <a:p>
             <a:pPr algn="l" defTabSz="914126"/>
             <a:r>
-              <a:rPr lang="en-IN" sz="4999" b="1" dirty="0">
+              <a:rPr lang="en-IN" sz="4999" b="1">
                 <a:solidFill>
                   <a:srgbClr val="FFFF00"/>
                 </a:solidFill>
                 <a:latin typeface="Adobe Clean" panose="020B0503020404020204" pitchFamily="34" charset="0"/>
               </a:rPr>
-              <a:t>Questions?</a:t>
+              <a:t>Thank you</a:t>
             </a:r>
+            <a:endParaRPr lang="en-IN" sz="4999" b="1" dirty="0">
+              <a:solidFill>
+                <a:srgbClr val="FFFF00"/>
+              </a:solidFill>
+              <a:latin typeface="Adobe Clean" panose="020B0503020404020204" pitchFamily="34" charset="0"/>
+            </a:endParaRPr>
           </a:p>
         </p:txBody>
       </p:sp>
@@ -20417,7 +20423,7 @@
         </p:nvSpPr>
         <p:spPr>
           <a:xfrm>
-            <a:off x="455612" y="1534538"/>
+            <a:off x="455612" y="2660126"/>
             <a:ext cx="2514600" cy="523220"/>
           </a:xfrm>
           <a:prstGeom prst="rect">
@@ -20438,183 +20444,6 @@
           </a:p>
         </p:txBody>
       </p:sp>
-      <p:pic>
-        <p:nvPicPr>
-          <p:cNvPr id="7" name="Picture 6"/>
-          <p:cNvPicPr>
-            <a:picLocks noChangeAspect="1"/>
-          </p:cNvPicPr>
-          <p:nvPr/>
-        </p:nvPicPr>
-        <p:blipFill>
-          <a:blip r:embed="rId2"/>
-          <a:stretch>
-            <a:fillRect/>
-          </a:stretch>
-        </p:blipFill>
-        <p:spPr>
-          <a:xfrm>
-            <a:off x="8685212" y="1752600"/>
-            <a:ext cx="2623543" cy="4522720"/>
-          </a:xfrm>
-          <a:prstGeom prst="roundRect">
-            <a:avLst>
-              <a:gd name="adj" fmla="val 11111"/>
-            </a:avLst>
-          </a:prstGeom>
-          <a:ln w="190500" cap="rnd">
-            <a:solidFill>
-              <a:srgbClr val="C8C6BD"/>
-            </a:solidFill>
-            <a:prstDash val="solid"/>
-          </a:ln>
-          <a:effectLst>
-            <a:outerShdw blurRad="101600" dist="50800" dir="7200000" algn="tl" rotWithShape="0">
-              <a:srgbClr val="000000">
-                <a:alpha val="45000"/>
-              </a:srgbClr>
-            </a:outerShdw>
-          </a:effectLst>
-          <a:scene3d>
-            <a:camera prst="perspectiveFront" fov="5400000"/>
-            <a:lightRig rig="threePt" dir="t">
-              <a:rot lat="0" lon="0" rev="19200000"/>
-            </a:lightRig>
-          </a:scene3d>
-          <a:sp3d extrusionH="25400">
-            <a:bevelT w="304800" h="152400" prst="hardEdge"/>
-            <a:extrusionClr>
-              <a:srgbClr val="FFFFFF"/>
-            </a:extrusionClr>
-          </a:sp3d>
-        </p:spPr>
-      </p:pic>
-      <p:pic>
-        <p:nvPicPr>
-          <p:cNvPr id="8" name="Picture 7"/>
-          <p:cNvPicPr>
-            <a:picLocks noChangeAspect="1"/>
-          </p:cNvPicPr>
-          <p:nvPr/>
-        </p:nvPicPr>
-        <p:blipFill>
-          <a:blip r:embed="rId3">
-            <a:extLst>
-              <a:ext uri="{28A0092B-C50C-407E-A947-70E740481C1C}">
-                <a14:useLocalDpi xmlns:a14="http://schemas.microsoft.com/office/drawing/2010/main" val="0"/>
-              </a:ext>
-            </a:extLst>
-          </a:blip>
-          <a:stretch>
-            <a:fillRect/>
-          </a:stretch>
-        </p:blipFill>
-        <p:spPr>
-          <a:xfrm>
-            <a:off x="6627812" y="1748340"/>
-            <a:ext cx="1554158" cy="1554158"/>
-          </a:xfrm>
-          <a:prstGeom prst="rect">
-            <a:avLst/>
-          </a:prstGeom>
-        </p:spPr>
-      </p:pic>
-      <p:pic>
-        <p:nvPicPr>
-          <p:cNvPr id="9" name="Picture 8"/>
-          <p:cNvPicPr>
-            <a:picLocks noChangeAspect="1"/>
-          </p:cNvPicPr>
-          <p:nvPr/>
-        </p:nvPicPr>
-        <p:blipFill>
-          <a:blip r:embed="rId3">
-            <a:extLst>
-              <a:ext uri="{28A0092B-C50C-407E-A947-70E740481C1C}">
-                <a14:useLocalDpi xmlns:a14="http://schemas.microsoft.com/office/drawing/2010/main" val="0"/>
-              </a:ext>
-            </a:extLst>
-          </a:blip>
-          <a:stretch>
-            <a:fillRect/>
-          </a:stretch>
-        </p:blipFill>
-        <p:spPr>
-          <a:xfrm>
-            <a:off x="6780212" y="1900740"/>
-            <a:ext cx="1554158" cy="1554158"/>
-          </a:xfrm>
-          <a:prstGeom prst="rect">
-            <a:avLst/>
-          </a:prstGeom>
-        </p:spPr>
-      </p:pic>
-      <p:pic>
-        <p:nvPicPr>
-          <p:cNvPr id="10" name="Picture 9"/>
-          <p:cNvPicPr>
-            <a:picLocks noChangeAspect="1"/>
-          </p:cNvPicPr>
-          <p:nvPr/>
-        </p:nvPicPr>
-        <p:blipFill>
-          <a:blip r:embed="rId3">
-            <a:extLst>
-              <a:ext uri="{28A0092B-C50C-407E-A947-70E740481C1C}">
-                <a14:useLocalDpi xmlns:a14="http://schemas.microsoft.com/office/drawing/2010/main" val="0"/>
-              </a:ext>
-            </a:extLst>
-          </a:blip>
-          <a:stretch>
-            <a:fillRect/>
-          </a:stretch>
-        </p:blipFill>
-        <p:spPr>
-          <a:xfrm>
-            <a:off x="6932612" y="2053140"/>
-            <a:ext cx="1554158" cy="1554158"/>
-          </a:xfrm>
-          <a:prstGeom prst="rect">
-            <a:avLst/>
-          </a:prstGeom>
-        </p:spPr>
-      </p:pic>
-      <p:cxnSp>
-        <p:nvCxnSpPr>
-          <p:cNvPr id="3" name="Curved Connector 2"/>
-          <p:cNvCxnSpPr>
-            <a:stCxn id="7" idx="1"/>
-            <a:endCxn id="10" idx="2"/>
-          </p:cNvCxnSpPr>
-          <p:nvPr/>
-        </p:nvCxnSpPr>
-        <p:spPr>
-          <a:xfrm rot="10800000">
-            <a:off x="7709692" y="3607298"/>
-            <a:ext cx="975521" cy="406662"/>
-          </a:xfrm>
-          <a:prstGeom prst="curvedConnector2">
-            <a:avLst/>
-          </a:prstGeom>
-          <a:ln>
-            <a:tailEnd type="triangle"/>
-          </a:ln>
-        </p:spPr>
-        <p:style>
-          <a:lnRef idx="3">
-            <a:schemeClr val="dk1"/>
-          </a:lnRef>
-          <a:fillRef idx="0">
-            <a:schemeClr val="dk1"/>
-          </a:fillRef>
-          <a:effectRef idx="2">
-            <a:schemeClr val="dk1"/>
-          </a:effectRef>
-          <a:fontRef idx="minor">
-            <a:schemeClr val="tx1"/>
-          </a:fontRef>
-        </p:style>
-      </p:cxnSp>
       <p:sp>
         <p:nvSpPr>
           <p:cNvPr id="13" name="TextBox 12"/>
@@ -20623,7 +20452,7 @@
         </p:nvSpPr>
         <p:spPr>
           <a:xfrm>
-            <a:off x="455612" y="1961417"/>
+            <a:off x="455612" y="3087005"/>
             <a:ext cx="4388702" cy="1200329"/>
           </a:xfrm>
           <a:prstGeom prst="rect">
@@ -20643,7 +20472,7 @@
             </a:pPr>
             <a:r>
               <a:rPr lang="en-US" dirty="0">
-                <a:hlinkClick r:id="rId4"/>
+                <a:hlinkClick r:id="rId2"/>
               </a:rPr>
               <a:t>https://acrobat.adobe.com</a:t>
             </a:r>
@@ -20656,7 +20485,7 @@
             </a:pPr>
             <a:r>
               <a:rPr lang="en-US" dirty="0">
-                <a:hlinkClick r:id="rId5"/>
+                <a:hlinkClick r:id="rId3"/>
               </a:rPr>
               <a:t>http://www.scandit.com/</a:t>
             </a:r>
@@ -20669,7 +20498,7 @@
             </a:pPr>
             <a:r>
               <a:rPr lang="en-US" dirty="0">
-                <a:hlinkClick r:id="rId6"/>
+                <a:hlinkClick r:id="rId4"/>
               </a:rPr>
               <a:t>http://developers.itextpdf.com</a:t>
             </a:r>
@@ -20685,7 +20514,7 @@
         </p:nvSpPr>
         <p:spPr>
           <a:xfrm>
-            <a:off x="451247" y="3210565"/>
+            <a:off x="455612" y="5004871"/>
             <a:ext cx="6092825" cy="892552"/>
           </a:xfrm>
           <a:prstGeom prst="rect">
@@ -20708,52 +20537,11 @@
             </a:r>
             <a:r>
               <a:rPr lang="en-US" dirty="0">
-                <a:hlinkClick r:id="rId7"/>
+                <a:hlinkClick r:id="rId5"/>
               </a:rPr>
               <a:t>https://github.com/cfclick/CFSummit2016</a:t>
             </a:r>
             <a:endParaRPr lang="en-US" dirty="0"/>
-          </a:p>
-        </p:txBody>
-      </p:sp>
-      <p:sp>
-        <p:nvSpPr>
-          <p:cNvPr id="15" name="TextBox 14"/>
-          <p:cNvSpPr txBox="1"/>
-          <p:nvPr/>
-        </p:nvSpPr>
-        <p:spPr>
-          <a:xfrm>
-            <a:off x="451247" y="4379683"/>
-            <a:ext cx="7542899" cy="1200329"/>
-          </a:xfrm>
-          <a:prstGeom prst="rect">
-            <a:avLst/>
-          </a:prstGeom>
-          <a:noFill/>
-        </p:spPr>
-        <p:txBody>
-          <a:bodyPr wrap="none" rtlCol="0">
-            <a:spAutoFit/>
-          </a:bodyPr>
-          <a:lstStyle/>
-          <a:p>
-            <a:r>
-              <a:rPr lang="en-US" dirty="0"/>
-              <a:t>Don’t leave hold of your common sense. Think about what </a:t>
-            </a:r>
-          </a:p>
-          <a:p>
-            <a:r>
-              <a:rPr lang="en-US" dirty="0"/>
-              <a:t>you’re doing and how the technology can enhance it. </a:t>
-            </a:r>
-          </a:p>
-          <a:p>
-            <a:r>
-              <a:rPr lang="en-US" dirty="0"/>
-              <a:t>Don’t think about technology first.</a:t>
-            </a:r>
           </a:p>
         </p:txBody>
       </p:sp>
@@ -20765,8 +20553,8 @@
         </p:nvSpPr>
         <p:spPr>
           <a:xfrm>
-            <a:off x="449659" y="5856578"/>
-            <a:ext cx="3536674" cy="923330"/>
+            <a:off x="338429" y="1602089"/>
+            <a:ext cx="3014223" cy="923330"/>
           </a:xfrm>
           <a:prstGeom prst="rect">
             <a:avLst/>
@@ -20794,8 +20582,63 @@
                   </a:outerShdw>
                 </a:effectLst>
               </a:rPr>
-              <a:t>THANK YOU</a:t>
+              <a:t>Questions</a:t>
             </a:r>
+          </a:p>
+        </p:txBody>
+      </p:sp>
+      <p:sp>
+        <p:nvSpPr>
+          <p:cNvPr id="17" name="TextBox 16"/>
+          <p:cNvSpPr txBox="1"/>
+          <p:nvPr/>
+        </p:nvSpPr>
+        <p:spPr>
+          <a:xfrm>
+            <a:off x="5484812" y="2931387"/>
+            <a:ext cx="6416249" cy="2092881"/>
+          </a:xfrm>
+          <a:prstGeom prst="rect">
+            <a:avLst/>
+          </a:prstGeom>
+        </p:spPr>
+        <p:style>
+          <a:lnRef idx="0">
+            <a:schemeClr val="accent2"/>
+          </a:lnRef>
+          <a:fillRef idx="3">
+            <a:schemeClr val="accent2"/>
+          </a:fillRef>
+          <a:effectRef idx="3">
+            <a:schemeClr val="accent2"/>
+          </a:effectRef>
+          <a:fontRef idx="minor">
+            <a:schemeClr val="lt1"/>
+          </a:fontRef>
+        </p:style>
+        <p:txBody>
+          <a:bodyPr wrap="square" rtlCol="0">
+            <a:spAutoFit/>
+          </a:bodyPr>
+          <a:lstStyle/>
+          <a:p>
+            <a:r>
+              <a:rPr lang="en-US" sz="2800" dirty="0"/>
+              <a:t>Don’t leave hold of your common sense. Think about what you’re doing and how the technology can enhance it. </a:t>
+            </a:r>
+          </a:p>
+          <a:p>
+            <a:r>
+              <a:rPr lang="en-US" sz="2800" dirty="0"/>
+              <a:t>Don’t think about technology first.</a:t>
+            </a:r>
+          </a:p>
+          <a:p>
+            <a:r>
+              <a:rPr lang="en-US" dirty="0"/>
+              <a:t>(Esther Dyson)</a:t>
+            </a:r>
+            <a:endParaRPr lang="en-US" sz="2800" dirty="0"/>
           </a:p>
         </p:txBody>
       </p:sp>

</xml_diff>

<commit_message>
# WARNING: head commit changed in the meantime
updating architect 5
</commit_message>
<xml_diff>
--- a/powerpoint/SmartPDF/Don't Just PDF.pptx
+++ b/powerpoint/SmartPDF/Don't Just PDF.pptx
@@ -4140,7 +4140,7 @@
                   <a:schemeClr val="tx2"/>
                 </a:solidFill>
               </a:rPr>
-              <a:t>9/28/2016</a:t>
+              <a:t>10/1/2016</a:t>
             </a:fld>
             <a:endParaRPr>
               <a:solidFill>
@@ -4330,7 +4330,7 @@
             <a:fld id="{F95CF31C-F757-429C-A789-86504F04C3BE}" type="datetimeFigureOut">
               <a:rPr lang="en-US"/>
               <a:pPr/>
-              <a:t>9/28/2016</a:t>
+              <a:t>10/1/2016</a:t>
             </a:fld>
             <a:endParaRPr/>
           </a:p>
@@ -4751,7 +4751,7 @@
           <a:p>
             <a:fld id="{43BAF7D2-47D3-439E-B818-706FF392AEFA}" type="datetimeFigureOut">
               <a:rPr lang="en-IN" smtClean="0"/>
-              <a:t>28-09-2016</a:t>
+              <a:t>01-10-2016</a:t>
             </a:fld>
             <a:endParaRPr lang="en-IN"/>
           </a:p>
@@ -4921,7 +4921,7 @@
           <a:p>
             <a:fld id="{43BAF7D2-47D3-439E-B818-706FF392AEFA}" type="datetimeFigureOut">
               <a:rPr lang="en-IN" smtClean="0"/>
-              <a:t>28-09-2016</a:t>
+              <a:t>01-10-2016</a:t>
             </a:fld>
             <a:endParaRPr lang="en-IN"/>
           </a:p>
@@ -5101,7 +5101,7 @@
           <a:p>
             <a:fld id="{43BAF7D2-47D3-439E-B818-706FF392AEFA}" type="datetimeFigureOut">
               <a:rPr lang="en-IN" smtClean="0"/>
-              <a:t>28-09-2016</a:t>
+              <a:t>01-10-2016</a:t>
             </a:fld>
             <a:endParaRPr lang="en-IN"/>
           </a:p>
@@ -5407,7 +5407,7 @@
           <a:p>
             <a:fld id="{43BAF7D2-47D3-439E-B818-706FF392AEFA}" type="datetimeFigureOut">
               <a:rPr lang="en-IN" smtClean="0"/>
-              <a:t>28-09-2016</a:t>
+              <a:t>01-10-2016</a:t>
             </a:fld>
             <a:endParaRPr lang="en-IN"/>
           </a:p>
@@ -5774,7 +5774,7 @@
           <a:p>
             <a:fld id="{43BAF7D2-47D3-439E-B818-706FF392AEFA}" type="datetimeFigureOut">
               <a:rPr lang="en-IN" smtClean="0"/>
-              <a:t>28-09-2016</a:t>
+              <a:t>01-10-2016</a:t>
             </a:fld>
             <a:endParaRPr lang="en-IN"/>
           </a:p>
@@ -5892,7 +5892,7 @@
           <a:p>
             <a:fld id="{43BAF7D2-47D3-439E-B818-706FF392AEFA}" type="datetimeFigureOut">
               <a:rPr lang="en-IN" smtClean="0"/>
-              <a:t>28-09-2016</a:t>
+              <a:t>01-10-2016</a:t>
             </a:fld>
             <a:endParaRPr lang="en-IN"/>
           </a:p>
@@ -5987,7 +5987,7 @@
           <a:p>
             <a:fld id="{43BAF7D2-47D3-439E-B818-706FF392AEFA}" type="datetimeFigureOut">
               <a:rPr lang="en-IN" smtClean="0"/>
-              <a:t>28-09-2016</a:t>
+              <a:t>01-10-2016</a:t>
             </a:fld>
             <a:endParaRPr lang="en-IN"/>
           </a:p>
@@ -6264,7 +6264,7 @@
           <a:p>
             <a:fld id="{43BAF7D2-47D3-439E-B818-706FF392AEFA}" type="datetimeFigureOut">
               <a:rPr lang="en-IN" smtClean="0"/>
-              <a:t>28-09-2016</a:t>
+              <a:t>01-10-2016</a:t>
             </a:fld>
             <a:endParaRPr lang="en-IN"/>
           </a:p>
@@ -6521,7 +6521,7 @@
           <a:p>
             <a:fld id="{43BAF7D2-47D3-439E-B818-706FF392AEFA}" type="datetimeFigureOut">
               <a:rPr lang="en-IN" smtClean="0"/>
-              <a:t>28-09-2016</a:t>
+              <a:t>01-10-2016</a:t>
             </a:fld>
             <a:endParaRPr lang="en-IN"/>
           </a:p>
@@ -6743,7 +6743,7 @@
           <a:p>
             <a:fld id="{43BAF7D2-47D3-439E-B818-706FF392AEFA}" type="datetimeFigureOut">
               <a:rPr lang="en-IN" smtClean="0"/>
-              <a:t>28-09-2016</a:t>
+              <a:t>01-10-2016</a:t>
             </a:fld>
             <a:endParaRPr lang="en-IN"/>
           </a:p>
@@ -7233,6 +7233,9 @@
   <p:clrMapOvr>
     <a:masterClrMapping/>
   </p:clrMapOvr>
+  <p:transition spd="slow">
+    <p:push dir="u"/>
+  </p:transition>
 </p:sld>
 </file>
 
@@ -7624,18 +7627,9 @@
   <p:clrMapOvr>
     <a:masterClrMapping/>
   </p:clrMapOvr>
-  <mc:AlternateContent xmlns:mc="http://schemas.openxmlformats.org/markup-compatibility/2006" xmlns:p15="http://schemas.microsoft.com/office/powerpoint/2012/main">
-    <mc:Choice Requires="p15">
-      <p:transition xmlns:p14="http://schemas.microsoft.com/office/powerpoint/2010/main" spd="slow" p14:dur="2000">
-        <p15:prstTrans prst="fallOver"/>
-      </p:transition>
-    </mc:Choice>
-    <mc:Fallback xmlns="">
-      <p:transition spd="slow">
-        <p:fade/>
-      </p:transition>
-    </mc:Fallback>
-  </mc:AlternateContent>
+  <p:transition spd="slow">
+    <p:push dir="u"/>
+  </p:transition>
   <p:timing>
     <p:tnLst>
       <p:par>
@@ -8530,18 +8524,9 @@
   <p:clrMapOvr>
     <a:masterClrMapping/>
   </p:clrMapOvr>
-  <mc:AlternateContent xmlns:mc="http://schemas.openxmlformats.org/markup-compatibility/2006" xmlns:p15="http://schemas.microsoft.com/office/powerpoint/2012/main">
-    <mc:Choice Requires="p15">
-      <p:transition xmlns:p14="http://schemas.microsoft.com/office/powerpoint/2010/main" spd="slow" p14:dur="2000">
-        <p15:prstTrans prst="fallOver"/>
-      </p:transition>
-    </mc:Choice>
-    <mc:Fallback xmlns="">
-      <p:transition spd="slow">
-        <p:fade/>
-      </p:transition>
-    </mc:Fallback>
-  </mc:AlternateContent>
+  <p:transition spd="slow">
+    <p:push dir="u"/>
+  </p:transition>
   <p:timing>
     <p:tnLst>
       <p:par>
@@ -9088,18 +9073,9 @@
   <p:clrMapOvr>
     <a:masterClrMapping/>
   </p:clrMapOvr>
-  <mc:AlternateContent xmlns:mc="http://schemas.openxmlformats.org/markup-compatibility/2006" xmlns:p15="http://schemas.microsoft.com/office/powerpoint/2012/main">
-    <mc:Choice Requires="p15">
-      <p:transition xmlns:p14="http://schemas.microsoft.com/office/powerpoint/2010/main" spd="slow" p14:dur="2000">
-        <p15:prstTrans prst="fallOver"/>
-      </p:transition>
-    </mc:Choice>
-    <mc:Fallback xmlns="">
-      <p:transition spd="slow">
-        <p:fade/>
-      </p:transition>
-    </mc:Fallback>
-  </mc:AlternateContent>
+  <p:transition spd="slow">
+    <p:push dir="u"/>
+  </p:transition>
 </p:sld>
 </file>
 
@@ -9642,18 +9618,9 @@
   <p:clrMapOvr>
     <a:masterClrMapping/>
   </p:clrMapOvr>
-  <mc:AlternateContent xmlns:mc="http://schemas.openxmlformats.org/markup-compatibility/2006" xmlns:p15="http://schemas.microsoft.com/office/powerpoint/2012/main">
-    <mc:Choice Requires="p15">
-      <p:transition xmlns:p14="http://schemas.microsoft.com/office/powerpoint/2010/main" spd="slow" p14:dur="2000">
-        <p15:prstTrans prst="fallOver"/>
-      </p:transition>
-    </mc:Choice>
-    <mc:Fallback xmlns="">
-      <p:transition spd="slow">
-        <p:fade/>
-      </p:transition>
-    </mc:Fallback>
-  </mc:AlternateContent>
+  <p:transition spd="slow">
+    <p:push dir="u"/>
+  </p:transition>
   <p:timing>
     <p:tnLst>
       <p:par>
@@ -10293,18 +10260,9 @@
   <p:clrMapOvr>
     <a:masterClrMapping/>
   </p:clrMapOvr>
-  <mc:AlternateContent xmlns:mc="http://schemas.openxmlformats.org/markup-compatibility/2006" xmlns:p15="http://schemas.microsoft.com/office/powerpoint/2012/main">
-    <mc:Choice Requires="p15">
-      <p:transition xmlns:p14="http://schemas.microsoft.com/office/powerpoint/2010/main" spd="slow" p14:dur="2000">
-        <p15:prstTrans prst="fallOver"/>
-      </p:transition>
-    </mc:Choice>
-    <mc:Fallback xmlns="">
-      <p:transition spd="slow">
-        <p:fade/>
-      </p:transition>
-    </mc:Fallback>
-  </mc:AlternateContent>
+  <p:transition spd="slow">
+    <p:push dir="u"/>
+  </p:transition>
 </p:sld>
 </file>
 
@@ -10828,18 +10786,9 @@
   <p:clrMapOvr>
     <a:masterClrMapping/>
   </p:clrMapOvr>
-  <mc:AlternateContent xmlns:mc="http://schemas.openxmlformats.org/markup-compatibility/2006" xmlns:p15="http://schemas.microsoft.com/office/powerpoint/2012/main">
-    <mc:Choice Requires="p15">
-      <p:transition xmlns:p14="http://schemas.microsoft.com/office/powerpoint/2010/main" spd="slow" p14:dur="2000">
-        <p15:prstTrans prst="fallOver"/>
-      </p:transition>
-    </mc:Choice>
-    <mc:Fallback xmlns="">
-      <p:transition spd="slow">
-        <p:fade/>
-      </p:transition>
-    </mc:Fallback>
-  </mc:AlternateContent>
+  <p:transition spd="slow">
+    <p:push dir="u"/>
+  </p:transition>
   <p:timing>
     <p:tnLst>
       <p:par>
@@ -12147,18 +12096,9 @@
   <p:clrMapOvr>
     <a:masterClrMapping/>
   </p:clrMapOvr>
-  <mc:AlternateContent xmlns:mc="http://schemas.openxmlformats.org/markup-compatibility/2006" xmlns:p15="http://schemas.microsoft.com/office/powerpoint/2012/main">
-    <mc:Choice Requires="p15">
-      <p:transition xmlns:p14="http://schemas.microsoft.com/office/powerpoint/2010/main" spd="slow" p14:dur="2000">
-        <p15:prstTrans prst="fallOver"/>
-      </p:transition>
-    </mc:Choice>
-    <mc:Fallback xmlns="">
-      <p:transition spd="slow">
-        <p:fade/>
-      </p:transition>
-    </mc:Fallback>
-  </mc:AlternateContent>
+  <p:transition spd="slow">
+    <p:push dir="u"/>
+  </p:transition>
   <p:timing>
     <p:tnLst>
       <p:par>
@@ -14470,18 +14410,9 @@
   <p:clrMapOvr>
     <a:masterClrMapping/>
   </p:clrMapOvr>
-  <mc:AlternateContent xmlns:mc="http://schemas.openxmlformats.org/markup-compatibility/2006" xmlns:p15="http://schemas.microsoft.com/office/powerpoint/2012/main">
-    <mc:Choice Requires="p15">
-      <p:transition xmlns:p14="http://schemas.microsoft.com/office/powerpoint/2010/main" spd="slow" p14:dur="2000">
-        <p15:prstTrans prst="fallOver"/>
-      </p:transition>
-    </mc:Choice>
-    <mc:Fallback xmlns="">
-      <p:transition spd="slow">
-        <p:fade/>
-      </p:transition>
-    </mc:Fallback>
-  </mc:AlternateContent>
+  <p:transition spd="slow">
+    <p:push dir="u"/>
+  </p:transition>
   <p:timing>
     <p:tnLst>
       <p:par>
@@ -15616,18 +15547,9 @@
   <p:clrMapOvr>
     <a:masterClrMapping/>
   </p:clrMapOvr>
-  <mc:AlternateContent xmlns:mc="http://schemas.openxmlformats.org/markup-compatibility/2006" xmlns:p15="http://schemas.microsoft.com/office/powerpoint/2012/main">
-    <mc:Choice Requires="p15">
-      <p:transition xmlns:p14="http://schemas.microsoft.com/office/powerpoint/2010/main" spd="slow" p14:dur="2000">
-        <p15:prstTrans prst="fallOver"/>
-      </p:transition>
-    </mc:Choice>
-    <mc:Fallback xmlns="">
-      <p:transition spd="slow">
-        <p:fade/>
-      </p:transition>
-    </mc:Fallback>
-  </mc:AlternateContent>
+  <p:transition spd="slow">
+    <p:push dir="u"/>
+  </p:transition>
   <p:timing>
     <p:tnLst>
       <p:par>
@@ -16296,18 +16218,9 @@
   <p:clrMapOvr>
     <a:masterClrMapping/>
   </p:clrMapOvr>
-  <mc:AlternateContent xmlns:mc="http://schemas.openxmlformats.org/markup-compatibility/2006" xmlns:p15="http://schemas.microsoft.com/office/powerpoint/2012/main">
-    <mc:Choice Requires="p15">
-      <p:transition xmlns:p14="http://schemas.microsoft.com/office/powerpoint/2010/main" spd="slow" p14:dur="2000">
-        <p15:prstTrans prst="fallOver"/>
-      </p:transition>
-    </mc:Choice>
-    <mc:Fallback xmlns="">
-      <p:transition spd="slow">
-        <p:fade/>
-      </p:transition>
-    </mc:Fallback>
-  </mc:AlternateContent>
+  <p:transition spd="slow">
+    <p:push dir="u"/>
+  </p:transition>
 </p:sld>
 </file>
 
@@ -16703,18 +16616,9 @@
   <p:clrMapOvr>
     <a:masterClrMapping/>
   </p:clrMapOvr>
-  <mc:AlternateContent xmlns:mc="http://schemas.openxmlformats.org/markup-compatibility/2006" xmlns:p15="http://schemas.microsoft.com/office/powerpoint/2012/main">
-    <mc:Choice Requires="p15">
-      <p:transition xmlns:p14="http://schemas.microsoft.com/office/powerpoint/2010/main" spd="slow" p14:dur="2000">
-        <p15:prstTrans prst="fallOver"/>
-      </p:transition>
-    </mc:Choice>
-    <mc:Fallback xmlns="">
-      <p:transition spd="slow">
-        <p:fade/>
-      </p:transition>
-    </mc:Fallback>
-  </mc:AlternateContent>
+  <p:transition spd="slow">
+    <p:push dir="u"/>
+  </p:transition>
 </p:sld>
 </file>
 
@@ -16851,18 +16755,9 @@
   <p:clrMapOvr>
     <a:masterClrMapping/>
   </p:clrMapOvr>
-  <mc:AlternateContent xmlns:mc="http://schemas.openxmlformats.org/markup-compatibility/2006" xmlns:p15="http://schemas.microsoft.com/office/powerpoint/2012/main">
-    <mc:Choice Requires="p15">
-      <p:transition xmlns:p14="http://schemas.microsoft.com/office/powerpoint/2010/main" spd="slow" p14:dur="2000">
-        <p15:prstTrans prst="fallOver"/>
-      </p:transition>
-    </mc:Choice>
-    <mc:Fallback xmlns="">
-      <p:transition spd="slow">
-        <p:fade/>
-      </p:transition>
-    </mc:Fallback>
-  </mc:AlternateContent>
+  <p:transition spd="slow">
+    <p:push dir="u"/>
+  </p:transition>
   <p:timing>
     <p:tnLst>
       <p:par>
@@ -17186,18 +17081,9 @@
   <p:clrMapOvr>
     <a:masterClrMapping/>
   </p:clrMapOvr>
-  <mc:AlternateContent xmlns:mc="http://schemas.openxmlformats.org/markup-compatibility/2006" xmlns:p15="http://schemas.microsoft.com/office/powerpoint/2012/main">
-    <mc:Choice Requires="p15">
-      <p:transition xmlns:p14="http://schemas.microsoft.com/office/powerpoint/2010/main" spd="slow" p14:dur="2000">
-        <p15:prstTrans prst="fallOver"/>
-      </p:transition>
-    </mc:Choice>
-    <mc:Fallback xmlns="">
-      <p:transition spd="slow">
-        <p:fade/>
-      </p:transition>
-    </mc:Fallback>
-  </mc:AlternateContent>
+  <p:transition spd="slow">
+    <p:push dir="u"/>
+  </p:transition>
 </p:sld>
 </file>
 
@@ -17403,18 +17289,9 @@
   <p:clrMapOvr>
     <a:masterClrMapping/>
   </p:clrMapOvr>
-  <mc:AlternateContent xmlns:mc="http://schemas.openxmlformats.org/markup-compatibility/2006" xmlns:p15="http://schemas.microsoft.com/office/powerpoint/2012/main">
-    <mc:Choice Requires="p15">
-      <p:transition xmlns:p14="http://schemas.microsoft.com/office/powerpoint/2010/main" spd="slow" p14:dur="2000">
-        <p15:prstTrans prst="fallOver"/>
-      </p:transition>
-    </mc:Choice>
-    <mc:Fallback xmlns="">
-      <p:transition spd="slow">
-        <p:fade/>
-      </p:transition>
-    </mc:Fallback>
-  </mc:AlternateContent>
+  <p:transition spd="slow">
+    <p:push dir="u"/>
+  </p:transition>
   <p:timing>
     <p:tnLst>
       <p:par>
@@ -18329,18 +18206,9 @@
   <p:clrMapOvr>
     <a:masterClrMapping/>
   </p:clrMapOvr>
-  <mc:AlternateContent xmlns:mc="http://schemas.openxmlformats.org/markup-compatibility/2006" xmlns:p15="http://schemas.microsoft.com/office/powerpoint/2012/main">
-    <mc:Choice Requires="p15">
-      <p:transition xmlns:p14="http://schemas.microsoft.com/office/powerpoint/2010/main" spd="slow" p14:dur="2000">
-        <p15:prstTrans prst="fallOver"/>
-      </p:transition>
-    </mc:Choice>
-    <mc:Fallback xmlns="">
-      <p:transition spd="slow">
-        <p:fade/>
-      </p:transition>
-    </mc:Fallback>
-  </mc:AlternateContent>
+  <p:transition spd="slow">
+    <p:push dir="u"/>
+  </p:transition>
   <p:timing>
     <p:tnLst>
       <p:par>
@@ -19567,18 +19435,9 @@
   <p:clrMapOvr>
     <a:masterClrMapping/>
   </p:clrMapOvr>
-  <mc:AlternateContent xmlns:mc="http://schemas.openxmlformats.org/markup-compatibility/2006" xmlns:p15="http://schemas.microsoft.com/office/powerpoint/2012/main">
-    <mc:Choice Requires="p15">
-      <p:transition xmlns:p14="http://schemas.microsoft.com/office/powerpoint/2010/main" spd="slow" p14:dur="2000">
-        <p15:prstTrans prst="fallOver"/>
-      </p:transition>
-    </mc:Choice>
-    <mc:Fallback xmlns="">
-      <p:transition spd="slow">
-        <p:fade/>
-      </p:transition>
-    </mc:Fallback>
-  </mc:AlternateContent>
+  <p:transition spd="slow">
+    <p:push dir="u"/>
+  </p:transition>
 </p:sld>
 </file>
 
@@ -19896,150 +19755,9 @@
   <p:clrMapOvr>
     <a:masterClrMapping/>
   </p:clrMapOvr>
-  <mc:AlternateContent xmlns:mc="http://schemas.openxmlformats.org/markup-compatibility/2006" xmlns:p15="http://schemas.microsoft.com/office/powerpoint/2012/main">
-    <mc:Choice Requires="p15">
-      <p:transition xmlns:p14="http://schemas.microsoft.com/office/powerpoint/2010/main" spd="slow" p14:dur="2000">
-        <p15:prstTrans prst="fallOver"/>
-      </p:transition>
-    </mc:Choice>
-    <mc:Fallback xmlns="">
-      <p:transition spd="slow">
-        <p:fade/>
-      </p:transition>
-    </mc:Fallback>
-  </mc:AlternateContent>
-  <p:timing>
-    <p:tnLst>
-      <p:par>
-        <p:cTn id="1" dur="indefinite" restart="never" nodeType="tmRoot">
-          <p:childTnLst>
-            <p:seq concurrent="1" nextAc="seek">
-              <p:cTn id="2" dur="indefinite" nodeType="mainSeq">
-                <p:childTnLst>
-                  <p:par>
-                    <p:cTn id="3" fill="hold">
-                      <p:stCondLst>
-                        <p:cond delay="indefinite"/>
-                      </p:stCondLst>
-                      <p:childTnLst>
-                        <p:par>
-                          <p:cTn id="4" fill="hold">
-                            <p:stCondLst>
-                              <p:cond delay="0"/>
-                            </p:stCondLst>
-                            <p:childTnLst>
-                              <p:par>
-                                <p:cTn id="5" presetID="42" presetClass="entr" presetSubtype="0" fill="hold" grpId="0" nodeType="clickEffect">
-                                  <p:stCondLst>
-                                    <p:cond delay="0"/>
-                                  </p:stCondLst>
-                                  <p:childTnLst>
-                                    <p:set>
-                                      <p:cBhvr>
-                                        <p:cTn id="6" dur="1" fill="hold">
-                                          <p:stCondLst>
-                                            <p:cond delay="0"/>
-                                          </p:stCondLst>
-                                        </p:cTn>
-                                        <p:tgtEl>
-                                          <p:spTgt spid="6"/>
-                                        </p:tgtEl>
-                                        <p:attrNameLst>
-                                          <p:attrName>style.visibility</p:attrName>
-                                        </p:attrNameLst>
-                                      </p:cBhvr>
-                                      <p:to>
-                                        <p:strVal val="visible"/>
-                                      </p:to>
-                                    </p:set>
-                                    <p:animEffect transition="in" filter="fade">
-                                      <p:cBhvr>
-                                        <p:cTn id="7" dur="1000"/>
-                                        <p:tgtEl>
-                                          <p:spTgt spid="6"/>
-                                        </p:tgtEl>
-                                      </p:cBhvr>
-                                    </p:animEffect>
-                                    <p:anim calcmode="lin" valueType="num">
-                                      <p:cBhvr>
-                                        <p:cTn id="8" dur="1000" fill="hold"/>
-                                        <p:tgtEl>
-                                          <p:spTgt spid="6"/>
-                                        </p:tgtEl>
-                                        <p:attrNameLst>
-                                          <p:attrName>ppt_x</p:attrName>
-                                        </p:attrNameLst>
-                                      </p:cBhvr>
-                                      <p:tavLst>
-                                        <p:tav tm="0">
-                                          <p:val>
-                                            <p:strVal val="#ppt_x"/>
-                                          </p:val>
-                                        </p:tav>
-                                        <p:tav tm="100000">
-                                          <p:val>
-                                            <p:strVal val="#ppt_x"/>
-                                          </p:val>
-                                        </p:tav>
-                                      </p:tavLst>
-                                    </p:anim>
-                                    <p:anim calcmode="lin" valueType="num">
-                                      <p:cBhvr>
-                                        <p:cTn id="9" dur="1000" fill="hold"/>
-                                        <p:tgtEl>
-                                          <p:spTgt spid="6"/>
-                                        </p:tgtEl>
-                                        <p:attrNameLst>
-                                          <p:attrName>ppt_y</p:attrName>
-                                        </p:attrNameLst>
-                                      </p:cBhvr>
-                                      <p:tavLst>
-                                        <p:tav tm="0">
-                                          <p:val>
-                                            <p:strVal val="#ppt_y+.1"/>
-                                          </p:val>
-                                        </p:tav>
-                                        <p:tav tm="100000">
-                                          <p:val>
-                                            <p:strVal val="#ppt_y"/>
-                                          </p:val>
-                                        </p:tav>
-                                      </p:tavLst>
-                                    </p:anim>
-                                  </p:childTnLst>
-                                </p:cTn>
-                              </p:par>
-                            </p:childTnLst>
-                          </p:cTn>
-                        </p:par>
-                      </p:childTnLst>
-                    </p:cTn>
-                  </p:par>
-                </p:childTnLst>
-              </p:cTn>
-              <p:prevCondLst>
-                <p:cond evt="onPrev" delay="0">
-                  <p:tgtEl>
-                    <p:sldTgt/>
-                  </p:tgtEl>
-                </p:cond>
-              </p:prevCondLst>
-              <p:nextCondLst>
-                <p:cond evt="onNext" delay="0">
-                  <p:tgtEl>
-                    <p:sldTgt/>
-                  </p:tgtEl>
-                </p:cond>
-              </p:nextCondLst>
-            </p:seq>
-          </p:childTnLst>
-        </p:cTn>
-      </p:par>
-    </p:tnLst>
-    <p:bldLst>
-      <p:bldP spid="6" grpId="0"/>
-    </p:bldLst>
-  </p:timing>
+  <p:transition spd="slow">
+    <p:push dir="u"/>
+  </p:transition>
 </p:sld>
 </file>
 
@@ -20378,18 +20096,9 @@
   <p:clrMapOvr>
     <a:masterClrMapping/>
   </p:clrMapOvr>
-  <mc:AlternateContent xmlns:mc="http://schemas.openxmlformats.org/markup-compatibility/2006" xmlns:p15="http://schemas.microsoft.com/office/powerpoint/2012/main">
-    <mc:Choice Requires="p15">
-      <p:transition xmlns:p14="http://schemas.microsoft.com/office/powerpoint/2010/main" spd="slow" p14:dur="2000">
-        <p15:prstTrans prst="fallOver"/>
-      </p:transition>
-    </mc:Choice>
-    <mc:Fallback xmlns="">
-      <p:transition spd="slow">
-        <p:fade/>
-      </p:transition>
-    </mc:Fallback>
-  </mc:AlternateContent>
+  <p:transition spd="slow">
+    <p:push dir="u"/>
+  </p:transition>
   <p:timing>
     <p:tnLst>
       <p:par>
@@ -21662,18 +21371,9 @@
   <p:clrMapOvr>
     <a:masterClrMapping/>
   </p:clrMapOvr>
-  <mc:AlternateContent xmlns:mc="http://schemas.openxmlformats.org/markup-compatibility/2006" xmlns:p15="http://schemas.microsoft.com/office/powerpoint/2012/main">
-    <mc:Choice Requires="p15">
-      <p:transition xmlns:p14="http://schemas.microsoft.com/office/powerpoint/2010/main" spd="slow" p14:dur="2000">
-        <p15:prstTrans prst="fallOver"/>
-      </p:transition>
-    </mc:Choice>
-    <mc:Fallback xmlns="">
-      <p:transition spd="slow">
-        <p:fade/>
-      </p:transition>
-    </mc:Fallback>
-  </mc:AlternateContent>
+  <p:transition spd="slow">
+    <p:push dir="u"/>
+  </p:transition>
   <p:timing>
     <p:tnLst>
       <p:par>
@@ -22490,18 +22190,9 @@
   <p:clrMapOvr>
     <a:masterClrMapping/>
   </p:clrMapOvr>
-  <mc:AlternateContent xmlns:mc="http://schemas.openxmlformats.org/markup-compatibility/2006" xmlns:p15="http://schemas.microsoft.com/office/powerpoint/2012/main">
-    <mc:Choice Requires="p15">
-      <p:transition xmlns:p14="http://schemas.microsoft.com/office/powerpoint/2010/main" spd="slow" p14:dur="2000">
-        <p15:prstTrans prst="fallOver"/>
-      </p:transition>
-    </mc:Choice>
-    <mc:Fallback xmlns="">
-      <p:transition spd="slow">
-        <p:fade/>
-      </p:transition>
-    </mc:Fallback>
-  </mc:AlternateContent>
+  <p:transition spd="slow">
+    <p:push dir="u"/>
+  </p:transition>
   <p:timing>
     <p:tnLst>
       <p:par>
@@ -23498,18 +23189,9 @@
   <p:clrMapOvr>
     <a:masterClrMapping/>
   </p:clrMapOvr>
-  <mc:AlternateContent xmlns:mc="http://schemas.openxmlformats.org/markup-compatibility/2006" xmlns:p15="http://schemas.microsoft.com/office/powerpoint/2012/main">
-    <mc:Choice Requires="p15">
-      <p:transition xmlns:p14="http://schemas.microsoft.com/office/powerpoint/2010/main" spd="slow" p14:dur="2000">
-        <p15:prstTrans prst="fallOver"/>
-      </p:transition>
-    </mc:Choice>
-    <mc:Fallback xmlns="">
-      <p:transition spd="slow">
-        <p:fade/>
-      </p:transition>
-    </mc:Fallback>
-  </mc:AlternateContent>
+  <p:transition spd="slow">
+    <p:push dir="u"/>
+  </p:transition>
   <p:timing>
     <p:tnLst>
       <p:par>
@@ -24584,18 +24266,9 @@
   <p:clrMapOvr>
     <a:masterClrMapping/>
   </p:clrMapOvr>
-  <mc:AlternateContent xmlns:mc="http://schemas.openxmlformats.org/markup-compatibility/2006" xmlns:p15="http://schemas.microsoft.com/office/powerpoint/2012/main">
-    <mc:Choice Requires="p15">
-      <p:transition xmlns:p14="http://schemas.microsoft.com/office/powerpoint/2010/main" spd="slow" p14:dur="2000">
-        <p15:prstTrans prst="fallOver"/>
-      </p:transition>
-    </mc:Choice>
-    <mc:Fallback xmlns="">
-      <p:transition spd="slow">
-        <p:fade/>
-      </p:transition>
-    </mc:Fallback>
-  </mc:AlternateContent>
+  <p:transition spd="slow">
+    <p:push dir="u"/>
+  </p:transition>
   <p:timing>
     <p:tnLst>
       <p:par>
@@ -25574,18 +25247,9 @@
   <p:clrMapOvr>
     <a:masterClrMapping/>
   </p:clrMapOvr>
-  <mc:AlternateContent xmlns:mc="http://schemas.openxmlformats.org/markup-compatibility/2006" xmlns:p15="http://schemas.microsoft.com/office/powerpoint/2012/main">
-    <mc:Choice Requires="p15">
-      <p:transition xmlns:p14="http://schemas.microsoft.com/office/powerpoint/2010/main" spd="slow" p14:dur="2000">
-        <p15:prstTrans prst="fallOver"/>
-      </p:transition>
-    </mc:Choice>
-    <mc:Fallback xmlns="">
-      <p:transition spd="slow">
-        <p:fade/>
-      </p:transition>
-    </mc:Fallback>
-  </mc:AlternateContent>
+  <p:transition spd="slow">
+    <p:push dir="u"/>
+  </p:transition>
   <p:timing>
     <p:tnLst>
       <p:par>
@@ -26273,18 +25937,9 @@
   <p:clrMapOvr>
     <a:masterClrMapping/>
   </p:clrMapOvr>
-  <mc:AlternateContent xmlns:mc="http://schemas.openxmlformats.org/markup-compatibility/2006" xmlns:p15="http://schemas.microsoft.com/office/powerpoint/2012/main">
-    <mc:Choice Requires="p15">
-      <p:transition xmlns:p14="http://schemas.microsoft.com/office/powerpoint/2010/main" spd="slow" p14:dur="2000">
-        <p15:prstTrans prst="fallOver"/>
-      </p:transition>
-    </mc:Choice>
-    <mc:Fallback xmlns="">
-      <p:transition spd="slow">
-        <p:fade/>
-      </p:transition>
-    </mc:Fallback>
-  </mc:AlternateContent>
+  <p:transition spd="slow">
+    <p:push dir="u"/>
+  </p:transition>
 </p:sld>
 </file>
 

</xml_diff>

<commit_message>
final touches and clean up
</commit_message>
<xml_diff>
--- a/powerpoint/SmartPDF/Don't Just PDF.pptx
+++ b/powerpoint/SmartPDF/Don't Just PDF.pptx
@@ -5,10 +5,10 @@
     <p:sldMasterId id="2147483680" r:id="rId2"/>
   </p:sldMasterIdLst>
   <p:notesMasterIdLst>
-    <p:notesMasterId r:id="rId28"/>
+    <p:notesMasterId r:id="rId27"/>
   </p:notesMasterIdLst>
   <p:handoutMasterIdLst>
-    <p:handoutMasterId r:id="rId29"/>
+    <p:handoutMasterId r:id="rId28"/>
   </p:handoutMasterIdLst>
   <p:sldIdLst>
     <p:sldId id="302" r:id="rId3"/>
@@ -29,13 +29,12 @@
     <p:sldId id="317" r:id="rId18"/>
     <p:sldId id="318" r:id="rId19"/>
     <p:sldId id="319" r:id="rId20"/>
-    <p:sldId id="320" r:id="rId21"/>
-    <p:sldId id="321" r:id="rId22"/>
-    <p:sldId id="322" r:id="rId23"/>
-    <p:sldId id="323" r:id="rId24"/>
-    <p:sldId id="324" r:id="rId25"/>
-    <p:sldId id="325" r:id="rId26"/>
-    <p:sldId id="326" r:id="rId27"/>
+    <p:sldId id="321" r:id="rId21"/>
+    <p:sldId id="320" r:id="rId22"/>
+    <p:sldId id="323" r:id="rId23"/>
+    <p:sldId id="324" r:id="rId24"/>
+    <p:sldId id="325" r:id="rId25"/>
+    <p:sldId id="326" r:id="rId26"/>
   </p:sldIdLst>
   <p:sldSz cx="12188825" cy="6858000"/>
   <p:notesSz cx="6858000" cy="9144000"/>
@@ -4140,7 +4139,7 @@
                   <a:schemeClr val="tx2"/>
                 </a:solidFill>
               </a:rPr>
-              <a:t>10/1/2016</a:t>
+              <a:t>10/5/2016</a:t>
             </a:fld>
             <a:endParaRPr>
               <a:solidFill>
@@ -4330,7 +4329,7 @@
             <a:fld id="{F95CF31C-F757-429C-A789-86504F04C3BE}" type="datetimeFigureOut">
               <a:rPr lang="en-US"/>
               <a:pPr/>
-              <a:t>10/1/2016</a:t>
+              <a:t>10/5/2016</a:t>
             </a:fld>
             <a:endParaRPr/>
           </a:p>
@@ -4751,7 +4750,7 @@
           <a:p>
             <a:fld id="{43BAF7D2-47D3-439E-B818-706FF392AEFA}" type="datetimeFigureOut">
               <a:rPr lang="en-IN" smtClean="0"/>
-              <a:t>01-10-2016</a:t>
+              <a:t>05-10-2016</a:t>
             </a:fld>
             <a:endParaRPr lang="en-IN"/>
           </a:p>
@@ -4921,7 +4920,7 @@
           <a:p>
             <a:fld id="{43BAF7D2-47D3-439E-B818-706FF392AEFA}" type="datetimeFigureOut">
               <a:rPr lang="en-IN" smtClean="0"/>
-              <a:t>01-10-2016</a:t>
+              <a:t>05-10-2016</a:t>
             </a:fld>
             <a:endParaRPr lang="en-IN"/>
           </a:p>
@@ -5101,7 +5100,7 @@
           <a:p>
             <a:fld id="{43BAF7D2-47D3-439E-B818-706FF392AEFA}" type="datetimeFigureOut">
               <a:rPr lang="en-IN" smtClean="0"/>
-              <a:t>01-10-2016</a:t>
+              <a:t>05-10-2016</a:t>
             </a:fld>
             <a:endParaRPr lang="en-IN"/>
           </a:p>
@@ -5407,7 +5406,7 @@
           <a:p>
             <a:fld id="{43BAF7D2-47D3-439E-B818-706FF392AEFA}" type="datetimeFigureOut">
               <a:rPr lang="en-IN" smtClean="0"/>
-              <a:t>01-10-2016</a:t>
+              <a:t>05-10-2016</a:t>
             </a:fld>
             <a:endParaRPr lang="en-IN"/>
           </a:p>
@@ -5774,7 +5773,7 @@
           <a:p>
             <a:fld id="{43BAF7D2-47D3-439E-B818-706FF392AEFA}" type="datetimeFigureOut">
               <a:rPr lang="en-IN" smtClean="0"/>
-              <a:t>01-10-2016</a:t>
+              <a:t>05-10-2016</a:t>
             </a:fld>
             <a:endParaRPr lang="en-IN"/>
           </a:p>
@@ -5892,7 +5891,7 @@
           <a:p>
             <a:fld id="{43BAF7D2-47D3-439E-B818-706FF392AEFA}" type="datetimeFigureOut">
               <a:rPr lang="en-IN" smtClean="0"/>
-              <a:t>01-10-2016</a:t>
+              <a:t>05-10-2016</a:t>
             </a:fld>
             <a:endParaRPr lang="en-IN"/>
           </a:p>
@@ -5987,7 +5986,7 @@
           <a:p>
             <a:fld id="{43BAF7D2-47D3-439E-B818-706FF392AEFA}" type="datetimeFigureOut">
               <a:rPr lang="en-IN" smtClean="0"/>
-              <a:t>01-10-2016</a:t>
+              <a:t>05-10-2016</a:t>
             </a:fld>
             <a:endParaRPr lang="en-IN"/>
           </a:p>
@@ -6264,7 +6263,7 @@
           <a:p>
             <a:fld id="{43BAF7D2-47D3-439E-B818-706FF392AEFA}" type="datetimeFigureOut">
               <a:rPr lang="en-IN" smtClean="0"/>
-              <a:t>01-10-2016</a:t>
+              <a:t>05-10-2016</a:t>
             </a:fld>
             <a:endParaRPr lang="en-IN"/>
           </a:p>
@@ -6521,7 +6520,7 @@
           <a:p>
             <a:fld id="{43BAF7D2-47D3-439E-B818-706FF392AEFA}" type="datetimeFigureOut">
               <a:rPr lang="en-IN" smtClean="0"/>
-              <a:t>01-10-2016</a:t>
+              <a:t>05-10-2016</a:t>
             </a:fld>
             <a:endParaRPr lang="en-IN"/>
           </a:p>
@@ -6743,7 +6742,7 @@
           <a:p>
             <a:fld id="{43BAF7D2-47D3-439E-B818-706FF392AEFA}" type="datetimeFigureOut">
               <a:rPr lang="en-IN" smtClean="0"/>
-              <a:t>01-10-2016</a:t>
+              <a:t>05-10-2016</a:t>
             </a:fld>
             <a:endParaRPr lang="en-IN"/>
           </a:p>
@@ -9026,7 +9025,7 @@
               <a:rPr lang="en-IN" dirty="0">
                 <a:latin typeface="Adobe Clean" panose="020B0503020404020204" pitchFamily="34" charset="0"/>
               </a:rPr>
-              <a:t>DEMO</a:t>
+              <a:t>DEMO 2</a:t>
             </a:r>
           </a:p>
         </p:txBody>
@@ -9346,7 +9345,7 @@
             </a:br>
             <a:r>
               <a:rPr lang="en-US" sz="2000" dirty="0"/>
-              <a:t>Removes metadata from your PDF document so that sensitive information is not inadvertently passed along when you publish your PDF.</a:t>
+              <a:t>Removes metadata from your PDF document so that sensitive information is not passed along when you publish your PDF.</a:t>
             </a:r>
             <a:br>
               <a:rPr lang="en-US" sz="2000" dirty="0"/>
@@ -10213,7 +10212,7 @@
               <a:rPr lang="en-IN" dirty="0">
                 <a:latin typeface="Adobe Clean" panose="020B0503020404020204" pitchFamily="34" charset="0"/>
               </a:rPr>
-              <a:t>DEMO</a:t>
+              <a:t>DEMO 3</a:t>
             </a:r>
           </a:p>
         </p:txBody>
@@ -14328,7 +14327,7 @@
           <a:p>
             <a:r>
               <a:rPr lang="en-US" sz="1800" dirty="0"/>
-              <a:t>Used in tracking and marketing. Free to use, flexible in size, has a high fault tolerance, and fast readability. However, they can’t be read with a laser scanner. It supports four different modes of data: numeric, alphanumeric, byte/binary, and Kanji. It is a public domain and free to use.</a:t>
+              <a:t>Used in tracking and marketing. Free to use, flexible in size, has a high fault tolerance, and fast readability. However, it can’t be read with a laser scanner. It supports four different modes of data: numeric, alphanumeric, byte/binary, and Kanji. It is a public domain and free to use.</a:t>
             </a:r>
           </a:p>
         </p:txBody>
@@ -16148,70 +16147,114 @@
       </p:grpSpPr>
       <p:sp>
         <p:nvSpPr>
-          <p:cNvPr id="2" name="Title 1"/>
-          <p:cNvSpPr>
-            <a:spLocks noGrp="1"/>
+          <p:cNvPr id="6" name="Title 1"/>
+          <p:cNvSpPr txBox="1">
+            <a:spLocks/>
           </p:cNvSpPr>
-          <p:nvPr>
-            <p:ph type="title" idx="4294967295"/>
-          </p:nvPr>
+          <p:nvPr/>
         </p:nvSpPr>
         <p:spPr>
           <a:xfrm>
-            <a:off x="757791" y="2835764"/>
-            <a:ext cx="10512862" cy="1325218"/>
+            <a:off x="244634" y="893"/>
+            <a:ext cx="10789459" cy="1363224"/>
           </a:xfrm>
+          <a:prstGeom prst="rect">
+            <a:avLst/>
+          </a:prstGeom>
         </p:spPr>
         <p:txBody>
-          <a:bodyPr/>
-          <a:lstStyle/>
+          <a:bodyPr vert="horz" lIns="91416" tIns="45708" rIns="91416" bIns="45708" rtlCol="0" anchor="ctr">
+            <a:normAutofit/>
+          </a:bodyPr>
+          <a:lstStyle>
+            <a:lvl1pPr algn="ctr" defTabSz="914400" rtl="0" eaLnBrk="1" latinLnBrk="0" hangingPunct="1">
+              <a:lnSpc>
+                <a:spcPct val="90000"/>
+              </a:lnSpc>
+              <a:spcBef>
+                <a:spcPct val="0"/>
+              </a:spcBef>
+              <a:buNone/>
+              <a:defRPr sz="6000" kern="1200">
+                <a:solidFill>
+                  <a:schemeClr val="tx1"/>
+                </a:solidFill>
+                <a:latin typeface="+mj-lt"/>
+                <a:ea typeface="+mj-ea"/>
+                <a:cs typeface="+mj-cs"/>
+              </a:defRPr>
+            </a:lvl1pPr>
+          </a:lstStyle>
           <a:p>
-            <a:pPr algn="ctr"/>
+            <a:pPr algn="l"/>
             <a:r>
-              <a:rPr lang="en-IN" dirty="0">
+              <a:rPr lang="en-IN" sz="4400" b="1" dirty="0">
+                <a:solidFill>
+                  <a:srgbClr val="FFFF00"/>
+                </a:solidFill>
                 <a:latin typeface="Adobe Clean" panose="020B0503020404020204" pitchFamily="34" charset="0"/>
               </a:rPr>
-              <a:t>DEMO</a:t>
+              <a:t>Barcode-2D-PDF417</a:t>
             </a:r>
           </a:p>
         </p:txBody>
       </p:sp>
       <p:sp>
         <p:nvSpPr>
-          <p:cNvPr id="3" name="TextBox 2"/>
-          <p:cNvSpPr txBox="1"/>
+          <p:cNvPr id="7" name="Rectangle 6"/>
+          <p:cNvSpPr/>
           <p:nvPr/>
         </p:nvSpPr>
         <p:spPr>
           <a:xfrm>
-            <a:off x="9447212" y="6248400"/>
-            <a:ext cx="2051524" cy="461665"/>
+            <a:off x="303212" y="1511366"/>
+            <a:ext cx="4454553" cy="461665"/>
           </a:xfrm>
           <a:prstGeom prst="rect">
             <a:avLst/>
           </a:prstGeom>
-          <a:noFill/>
         </p:spPr>
         <p:txBody>
-          <a:bodyPr wrap="none" rtlCol="0">
+          <a:bodyPr wrap="none">
             <a:spAutoFit/>
           </a:bodyPr>
           <a:lstStyle/>
           <a:p>
             <a:r>
-              <a:rPr lang="en-US" dirty="0">
-                <a:hlinkClick r:id="rId2"/>
-              </a:rPr>
-              <a:t>Demo-Barcode</a:t>
+              <a:rPr lang="en-US" b="1" dirty="0"/>
+              <a:t>How to generate PDF417 Barcode</a:t>
             </a:r>
-            <a:endParaRPr lang="en-US" dirty="0"/>
           </a:p>
         </p:txBody>
       </p:sp>
+      <p:pic>
+        <p:nvPicPr>
+          <p:cNvPr id="8" name="Picture 7"/>
+          <p:cNvPicPr>
+            <a:picLocks noChangeAspect="1"/>
+          </p:cNvPicPr>
+          <p:nvPr/>
+        </p:nvPicPr>
+        <p:blipFill>
+          <a:blip r:embed="rId2"/>
+          <a:stretch>
+            <a:fillRect/>
+          </a:stretch>
+        </p:blipFill>
+        <p:spPr>
+          <a:xfrm>
+            <a:off x="244633" y="2057400"/>
+            <a:ext cx="11627497" cy="4419600"/>
+          </a:xfrm>
+          <a:prstGeom prst="rect">
+            <a:avLst/>
+          </a:prstGeom>
+        </p:spPr>
+      </p:pic>
     </p:spTree>
     <p:extLst>
       <p:ext uri="{BB962C8B-B14F-4D97-AF65-F5344CB8AC3E}">
-        <p14:creationId xmlns:p14="http://schemas.microsoft.com/office/powerpoint/2010/main" val="905370532"/>
+        <p14:creationId xmlns:p14="http://schemas.microsoft.com/office/powerpoint/2010/main" val="3185200426"/>
       </p:ext>
     </p:extLst>
   </p:cSld>
@@ -16221,6 +16264,237 @@
   <p:transition spd="slow">
     <p:push dir="u"/>
   </p:transition>
+  <p:timing>
+    <p:tnLst>
+      <p:par>
+        <p:cTn id="1" dur="indefinite" restart="never" nodeType="tmRoot">
+          <p:childTnLst>
+            <p:seq concurrent="1" nextAc="seek">
+              <p:cTn id="2" dur="indefinite" nodeType="mainSeq">
+                <p:childTnLst>
+                  <p:par>
+                    <p:cTn id="3" fill="hold">
+                      <p:stCondLst>
+                        <p:cond delay="indefinite"/>
+                      </p:stCondLst>
+                      <p:childTnLst>
+                        <p:par>
+                          <p:cTn id="4" fill="hold">
+                            <p:stCondLst>
+                              <p:cond delay="0"/>
+                            </p:stCondLst>
+                            <p:childTnLst>
+                              <p:par>
+                                <p:cTn id="5" presetID="42" presetClass="entr" presetSubtype="0" fill="hold" grpId="0" nodeType="clickEffect">
+                                  <p:stCondLst>
+                                    <p:cond delay="0"/>
+                                  </p:stCondLst>
+                                  <p:childTnLst>
+                                    <p:set>
+                                      <p:cBhvr>
+                                        <p:cTn id="6" dur="1" fill="hold">
+                                          <p:stCondLst>
+                                            <p:cond delay="0"/>
+                                          </p:stCondLst>
+                                        </p:cTn>
+                                        <p:tgtEl>
+                                          <p:spTgt spid="7"/>
+                                        </p:tgtEl>
+                                        <p:attrNameLst>
+                                          <p:attrName>style.visibility</p:attrName>
+                                        </p:attrNameLst>
+                                      </p:cBhvr>
+                                      <p:to>
+                                        <p:strVal val="visible"/>
+                                      </p:to>
+                                    </p:set>
+                                    <p:animEffect transition="in" filter="fade">
+                                      <p:cBhvr>
+                                        <p:cTn id="7" dur="1000"/>
+                                        <p:tgtEl>
+                                          <p:spTgt spid="7"/>
+                                        </p:tgtEl>
+                                      </p:cBhvr>
+                                    </p:animEffect>
+                                    <p:anim calcmode="lin" valueType="num">
+                                      <p:cBhvr>
+                                        <p:cTn id="8" dur="1000" fill="hold"/>
+                                        <p:tgtEl>
+                                          <p:spTgt spid="7"/>
+                                        </p:tgtEl>
+                                        <p:attrNameLst>
+                                          <p:attrName>ppt_x</p:attrName>
+                                        </p:attrNameLst>
+                                      </p:cBhvr>
+                                      <p:tavLst>
+                                        <p:tav tm="0">
+                                          <p:val>
+                                            <p:strVal val="#ppt_x"/>
+                                          </p:val>
+                                        </p:tav>
+                                        <p:tav tm="100000">
+                                          <p:val>
+                                            <p:strVal val="#ppt_x"/>
+                                          </p:val>
+                                        </p:tav>
+                                      </p:tavLst>
+                                    </p:anim>
+                                    <p:anim calcmode="lin" valueType="num">
+                                      <p:cBhvr>
+                                        <p:cTn id="9" dur="1000" fill="hold"/>
+                                        <p:tgtEl>
+                                          <p:spTgt spid="7"/>
+                                        </p:tgtEl>
+                                        <p:attrNameLst>
+                                          <p:attrName>ppt_y</p:attrName>
+                                        </p:attrNameLst>
+                                      </p:cBhvr>
+                                      <p:tavLst>
+                                        <p:tav tm="0">
+                                          <p:val>
+                                            <p:strVal val="#ppt_y+.1"/>
+                                          </p:val>
+                                        </p:tav>
+                                        <p:tav tm="100000">
+                                          <p:val>
+                                            <p:strVal val="#ppt_y"/>
+                                          </p:val>
+                                        </p:tav>
+                                      </p:tavLst>
+                                    </p:anim>
+                                  </p:childTnLst>
+                                </p:cTn>
+                              </p:par>
+                            </p:childTnLst>
+                          </p:cTn>
+                        </p:par>
+                      </p:childTnLst>
+                    </p:cTn>
+                  </p:par>
+                  <p:par>
+                    <p:cTn id="10" fill="hold">
+                      <p:stCondLst>
+                        <p:cond delay="indefinite"/>
+                      </p:stCondLst>
+                      <p:childTnLst>
+                        <p:par>
+                          <p:cTn id="11" fill="hold">
+                            <p:stCondLst>
+                              <p:cond delay="0"/>
+                            </p:stCondLst>
+                            <p:childTnLst>
+                              <p:par>
+                                <p:cTn id="12" presetID="53" presetClass="entr" presetSubtype="16" fill="hold" nodeType="clickEffect">
+                                  <p:stCondLst>
+                                    <p:cond delay="0"/>
+                                  </p:stCondLst>
+                                  <p:childTnLst>
+                                    <p:set>
+                                      <p:cBhvr>
+                                        <p:cTn id="13" dur="1" fill="hold">
+                                          <p:stCondLst>
+                                            <p:cond delay="0"/>
+                                          </p:stCondLst>
+                                        </p:cTn>
+                                        <p:tgtEl>
+                                          <p:spTgt spid="8"/>
+                                        </p:tgtEl>
+                                        <p:attrNameLst>
+                                          <p:attrName>style.visibility</p:attrName>
+                                        </p:attrNameLst>
+                                      </p:cBhvr>
+                                      <p:to>
+                                        <p:strVal val="visible"/>
+                                      </p:to>
+                                    </p:set>
+                                    <p:anim calcmode="lin" valueType="num">
+                                      <p:cBhvr>
+                                        <p:cTn id="14" dur="500" fill="hold"/>
+                                        <p:tgtEl>
+                                          <p:spTgt spid="8"/>
+                                        </p:tgtEl>
+                                        <p:attrNameLst>
+                                          <p:attrName>ppt_w</p:attrName>
+                                        </p:attrNameLst>
+                                      </p:cBhvr>
+                                      <p:tavLst>
+                                        <p:tav tm="0">
+                                          <p:val>
+                                            <p:fltVal val="0"/>
+                                          </p:val>
+                                        </p:tav>
+                                        <p:tav tm="100000">
+                                          <p:val>
+                                            <p:strVal val="#ppt_w"/>
+                                          </p:val>
+                                        </p:tav>
+                                      </p:tavLst>
+                                    </p:anim>
+                                    <p:anim calcmode="lin" valueType="num">
+                                      <p:cBhvr>
+                                        <p:cTn id="15" dur="500" fill="hold"/>
+                                        <p:tgtEl>
+                                          <p:spTgt spid="8"/>
+                                        </p:tgtEl>
+                                        <p:attrNameLst>
+                                          <p:attrName>ppt_h</p:attrName>
+                                        </p:attrNameLst>
+                                      </p:cBhvr>
+                                      <p:tavLst>
+                                        <p:tav tm="0">
+                                          <p:val>
+                                            <p:fltVal val="0"/>
+                                          </p:val>
+                                        </p:tav>
+                                        <p:tav tm="100000">
+                                          <p:val>
+                                            <p:strVal val="#ppt_h"/>
+                                          </p:val>
+                                        </p:tav>
+                                      </p:tavLst>
+                                    </p:anim>
+                                    <p:animEffect transition="in" filter="fade">
+                                      <p:cBhvr>
+                                        <p:cTn id="16" dur="500"/>
+                                        <p:tgtEl>
+                                          <p:spTgt spid="8"/>
+                                        </p:tgtEl>
+                                      </p:cBhvr>
+                                    </p:animEffect>
+                                  </p:childTnLst>
+                                </p:cTn>
+                              </p:par>
+                            </p:childTnLst>
+                          </p:cTn>
+                        </p:par>
+                      </p:childTnLst>
+                    </p:cTn>
+                  </p:par>
+                </p:childTnLst>
+              </p:cTn>
+              <p:prevCondLst>
+                <p:cond evt="onPrev" delay="0">
+                  <p:tgtEl>
+                    <p:sldTgt/>
+                  </p:tgtEl>
+                </p:cond>
+              </p:prevCondLst>
+              <p:nextCondLst>
+                <p:cond evt="onNext" delay="0">
+                  <p:tgtEl>
+                    <p:sldTgt/>
+                  </p:tgtEl>
+                </p:cond>
+              </p:nextCondLst>
+            </p:seq>
+          </p:childTnLst>
+        </p:cTn>
+      </p:par>
+    </p:tnLst>
+    <p:bldLst>
+      <p:bldP spid="7" grpId="0"/>
+    </p:bldLst>
+  </p:timing>
 </p:sld>
 </file>
 
@@ -16641,376 +16915,6 @@
       </p:grpSpPr>
       <p:sp>
         <p:nvSpPr>
-          <p:cNvPr id="6" name="Title 1"/>
-          <p:cNvSpPr txBox="1">
-            <a:spLocks/>
-          </p:cNvSpPr>
-          <p:nvPr/>
-        </p:nvSpPr>
-        <p:spPr>
-          <a:xfrm>
-            <a:off x="244634" y="893"/>
-            <a:ext cx="10789459" cy="1363224"/>
-          </a:xfrm>
-          <a:prstGeom prst="rect">
-            <a:avLst/>
-          </a:prstGeom>
-        </p:spPr>
-        <p:txBody>
-          <a:bodyPr vert="horz" lIns="91416" tIns="45708" rIns="91416" bIns="45708" rtlCol="0" anchor="ctr">
-            <a:normAutofit/>
-          </a:bodyPr>
-          <a:lstStyle>
-            <a:lvl1pPr algn="ctr" defTabSz="914400" rtl="0" eaLnBrk="1" latinLnBrk="0" hangingPunct="1">
-              <a:lnSpc>
-                <a:spcPct val="90000"/>
-              </a:lnSpc>
-              <a:spcBef>
-                <a:spcPct val="0"/>
-              </a:spcBef>
-              <a:buNone/>
-              <a:defRPr sz="6000" kern="1200">
-                <a:solidFill>
-                  <a:schemeClr val="tx1"/>
-                </a:solidFill>
-                <a:latin typeface="+mj-lt"/>
-                <a:ea typeface="+mj-ea"/>
-                <a:cs typeface="+mj-cs"/>
-              </a:defRPr>
-            </a:lvl1pPr>
-          </a:lstStyle>
-          <a:p>
-            <a:pPr algn="l"/>
-            <a:r>
-              <a:rPr lang="en-IN" sz="4400" b="1" dirty="0">
-                <a:solidFill>
-                  <a:srgbClr val="FFFF00"/>
-                </a:solidFill>
-                <a:latin typeface="Adobe Clean" panose="020B0503020404020204" pitchFamily="34" charset="0"/>
-              </a:rPr>
-              <a:t>Barcode-2D-PDF417</a:t>
-            </a:r>
-          </a:p>
-        </p:txBody>
-      </p:sp>
-      <p:sp>
-        <p:nvSpPr>
-          <p:cNvPr id="7" name="Rectangle 6"/>
-          <p:cNvSpPr/>
-          <p:nvPr/>
-        </p:nvSpPr>
-        <p:spPr>
-          <a:xfrm>
-            <a:off x="303212" y="1511366"/>
-            <a:ext cx="4454553" cy="461665"/>
-          </a:xfrm>
-          <a:prstGeom prst="rect">
-            <a:avLst/>
-          </a:prstGeom>
-        </p:spPr>
-        <p:txBody>
-          <a:bodyPr wrap="none">
-            <a:spAutoFit/>
-          </a:bodyPr>
-          <a:lstStyle/>
-          <a:p>
-            <a:r>
-              <a:rPr lang="en-US" b="1" dirty="0"/>
-              <a:t>How to generate PDF417 Barcode</a:t>
-            </a:r>
-          </a:p>
-        </p:txBody>
-      </p:sp>
-      <p:pic>
-        <p:nvPicPr>
-          <p:cNvPr id="8" name="Picture 7"/>
-          <p:cNvPicPr>
-            <a:picLocks noChangeAspect="1"/>
-          </p:cNvPicPr>
-          <p:nvPr/>
-        </p:nvPicPr>
-        <p:blipFill>
-          <a:blip r:embed="rId2"/>
-          <a:stretch>
-            <a:fillRect/>
-          </a:stretch>
-        </p:blipFill>
-        <p:spPr>
-          <a:xfrm>
-            <a:off x="244633" y="2057400"/>
-            <a:ext cx="11627497" cy="4419600"/>
-          </a:xfrm>
-          <a:prstGeom prst="rect">
-            <a:avLst/>
-          </a:prstGeom>
-        </p:spPr>
-      </p:pic>
-    </p:spTree>
-    <p:extLst>
-      <p:ext uri="{BB962C8B-B14F-4D97-AF65-F5344CB8AC3E}">
-        <p14:creationId xmlns:p14="http://schemas.microsoft.com/office/powerpoint/2010/main" val="3185200426"/>
-      </p:ext>
-    </p:extLst>
-  </p:cSld>
-  <p:clrMapOvr>
-    <a:masterClrMapping/>
-  </p:clrMapOvr>
-  <p:transition spd="slow">
-    <p:push dir="u"/>
-  </p:transition>
-  <p:timing>
-    <p:tnLst>
-      <p:par>
-        <p:cTn id="1" dur="indefinite" restart="never" nodeType="tmRoot">
-          <p:childTnLst>
-            <p:seq concurrent="1" nextAc="seek">
-              <p:cTn id="2" dur="indefinite" nodeType="mainSeq">
-                <p:childTnLst>
-                  <p:par>
-                    <p:cTn id="3" fill="hold">
-                      <p:stCondLst>
-                        <p:cond delay="indefinite"/>
-                      </p:stCondLst>
-                      <p:childTnLst>
-                        <p:par>
-                          <p:cTn id="4" fill="hold">
-                            <p:stCondLst>
-                              <p:cond delay="0"/>
-                            </p:stCondLst>
-                            <p:childTnLst>
-                              <p:par>
-                                <p:cTn id="5" presetID="42" presetClass="entr" presetSubtype="0" fill="hold" grpId="0" nodeType="clickEffect">
-                                  <p:stCondLst>
-                                    <p:cond delay="0"/>
-                                  </p:stCondLst>
-                                  <p:childTnLst>
-                                    <p:set>
-                                      <p:cBhvr>
-                                        <p:cTn id="6" dur="1" fill="hold">
-                                          <p:stCondLst>
-                                            <p:cond delay="0"/>
-                                          </p:stCondLst>
-                                        </p:cTn>
-                                        <p:tgtEl>
-                                          <p:spTgt spid="7"/>
-                                        </p:tgtEl>
-                                        <p:attrNameLst>
-                                          <p:attrName>style.visibility</p:attrName>
-                                        </p:attrNameLst>
-                                      </p:cBhvr>
-                                      <p:to>
-                                        <p:strVal val="visible"/>
-                                      </p:to>
-                                    </p:set>
-                                    <p:animEffect transition="in" filter="fade">
-                                      <p:cBhvr>
-                                        <p:cTn id="7" dur="1000"/>
-                                        <p:tgtEl>
-                                          <p:spTgt spid="7"/>
-                                        </p:tgtEl>
-                                      </p:cBhvr>
-                                    </p:animEffect>
-                                    <p:anim calcmode="lin" valueType="num">
-                                      <p:cBhvr>
-                                        <p:cTn id="8" dur="1000" fill="hold"/>
-                                        <p:tgtEl>
-                                          <p:spTgt spid="7"/>
-                                        </p:tgtEl>
-                                        <p:attrNameLst>
-                                          <p:attrName>ppt_x</p:attrName>
-                                        </p:attrNameLst>
-                                      </p:cBhvr>
-                                      <p:tavLst>
-                                        <p:tav tm="0">
-                                          <p:val>
-                                            <p:strVal val="#ppt_x"/>
-                                          </p:val>
-                                        </p:tav>
-                                        <p:tav tm="100000">
-                                          <p:val>
-                                            <p:strVal val="#ppt_x"/>
-                                          </p:val>
-                                        </p:tav>
-                                      </p:tavLst>
-                                    </p:anim>
-                                    <p:anim calcmode="lin" valueType="num">
-                                      <p:cBhvr>
-                                        <p:cTn id="9" dur="1000" fill="hold"/>
-                                        <p:tgtEl>
-                                          <p:spTgt spid="7"/>
-                                        </p:tgtEl>
-                                        <p:attrNameLst>
-                                          <p:attrName>ppt_y</p:attrName>
-                                        </p:attrNameLst>
-                                      </p:cBhvr>
-                                      <p:tavLst>
-                                        <p:tav tm="0">
-                                          <p:val>
-                                            <p:strVal val="#ppt_y+.1"/>
-                                          </p:val>
-                                        </p:tav>
-                                        <p:tav tm="100000">
-                                          <p:val>
-                                            <p:strVal val="#ppt_y"/>
-                                          </p:val>
-                                        </p:tav>
-                                      </p:tavLst>
-                                    </p:anim>
-                                  </p:childTnLst>
-                                </p:cTn>
-                              </p:par>
-                            </p:childTnLst>
-                          </p:cTn>
-                        </p:par>
-                      </p:childTnLst>
-                    </p:cTn>
-                  </p:par>
-                  <p:par>
-                    <p:cTn id="10" fill="hold">
-                      <p:stCondLst>
-                        <p:cond delay="indefinite"/>
-                      </p:stCondLst>
-                      <p:childTnLst>
-                        <p:par>
-                          <p:cTn id="11" fill="hold">
-                            <p:stCondLst>
-                              <p:cond delay="0"/>
-                            </p:stCondLst>
-                            <p:childTnLst>
-                              <p:par>
-                                <p:cTn id="12" presetID="53" presetClass="entr" presetSubtype="16" fill="hold" nodeType="clickEffect">
-                                  <p:stCondLst>
-                                    <p:cond delay="0"/>
-                                  </p:stCondLst>
-                                  <p:childTnLst>
-                                    <p:set>
-                                      <p:cBhvr>
-                                        <p:cTn id="13" dur="1" fill="hold">
-                                          <p:stCondLst>
-                                            <p:cond delay="0"/>
-                                          </p:stCondLst>
-                                        </p:cTn>
-                                        <p:tgtEl>
-                                          <p:spTgt spid="8"/>
-                                        </p:tgtEl>
-                                        <p:attrNameLst>
-                                          <p:attrName>style.visibility</p:attrName>
-                                        </p:attrNameLst>
-                                      </p:cBhvr>
-                                      <p:to>
-                                        <p:strVal val="visible"/>
-                                      </p:to>
-                                    </p:set>
-                                    <p:anim calcmode="lin" valueType="num">
-                                      <p:cBhvr>
-                                        <p:cTn id="14" dur="500" fill="hold"/>
-                                        <p:tgtEl>
-                                          <p:spTgt spid="8"/>
-                                        </p:tgtEl>
-                                        <p:attrNameLst>
-                                          <p:attrName>ppt_w</p:attrName>
-                                        </p:attrNameLst>
-                                      </p:cBhvr>
-                                      <p:tavLst>
-                                        <p:tav tm="0">
-                                          <p:val>
-                                            <p:fltVal val="0"/>
-                                          </p:val>
-                                        </p:tav>
-                                        <p:tav tm="100000">
-                                          <p:val>
-                                            <p:strVal val="#ppt_w"/>
-                                          </p:val>
-                                        </p:tav>
-                                      </p:tavLst>
-                                    </p:anim>
-                                    <p:anim calcmode="lin" valueType="num">
-                                      <p:cBhvr>
-                                        <p:cTn id="15" dur="500" fill="hold"/>
-                                        <p:tgtEl>
-                                          <p:spTgt spid="8"/>
-                                        </p:tgtEl>
-                                        <p:attrNameLst>
-                                          <p:attrName>ppt_h</p:attrName>
-                                        </p:attrNameLst>
-                                      </p:cBhvr>
-                                      <p:tavLst>
-                                        <p:tav tm="0">
-                                          <p:val>
-                                            <p:fltVal val="0"/>
-                                          </p:val>
-                                        </p:tav>
-                                        <p:tav tm="100000">
-                                          <p:val>
-                                            <p:strVal val="#ppt_h"/>
-                                          </p:val>
-                                        </p:tav>
-                                      </p:tavLst>
-                                    </p:anim>
-                                    <p:animEffect transition="in" filter="fade">
-                                      <p:cBhvr>
-                                        <p:cTn id="16" dur="500"/>
-                                        <p:tgtEl>
-                                          <p:spTgt spid="8"/>
-                                        </p:tgtEl>
-                                      </p:cBhvr>
-                                    </p:animEffect>
-                                  </p:childTnLst>
-                                </p:cTn>
-                              </p:par>
-                            </p:childTnLst>
-                          </p:cTn>
-                        </p:par>
-                      </p:childTnLst>
-                    </p:cTn>
-                  </p:par>
-                </p:childTnLst>
-              </p:cTn>
-              <p:prevCondLst>
-                <p:cond evt="onPrev" delay="0">
-                  <p:tgtEl>
-                    <p:sldTgt/>
-                  </p:tgtEl>
-                </p:cond>
-              </p:prevCondLst>
-              <p:nextCondLst>
-                <p:cond evt="onNext" delay="0">
-                  <p:tgtEl>
-                    <p:sldTgt/>
-                  </p:tgtEl>
-                </p:cond>
-              </p:nextCondLst>
-            </p:seq>
-          </p:childTnLst>
-        </p:cTn>
-      </p:par>
-    </p:tnLst>
-    <p:bldLst>
-      <p:bldP spid="7" grpId="0"/>
-    </p:bldLst>
-  </p:timing>
-</p:sld>
-</file>
-
-<file path=ppt/slides/slide21.xml><?xml version="1.0" encoding="utf-8"?>
-<p:sld xmlns:a="http://schemas.openxmlformats.org/drawingml/2006/main" xmlns:r="http://schemas.openxmlformats.org/officeDocument/2006/relationships" xmlns:p="http://schemas.openxmlformats.org/presentationml/2006/main">
-  <p:cSld>
-    <p:spTree>
-      <p:nvGrpSpPr>
-        <p:cNvPr id="1" name=""/>
-        <p:cNvGrpSpPr/>
-        <p:nvPr/>
-      </p:nvGrpSpPr>
-      <p:grpSpPr>
-        <a:xfrm>
-          <a:off x="0" y="0"/>
-          <a:ext cx="0" cy="0"/>
-          <a:chOff x="0" y="0"/>
-          <a:chExt cx="0" cy="0"/>
-        </a:xfrm>
-      </p:grpSpPr>
-      <p:sp>
-        <p:nvSpPr>
           <p:cNvPr id="2" name="Title 1"/>
           <p:cNvSpPr>
             <a:spLocks noGrp="1"/>
@@ -17034,7 +16938,7 @@
               <a:rPr lang="en-IN" dirty="0">
                 <a:latin typeface="Adobe Clean" panose="020B0503020404020204" pitchFamily="34" charset="0"/>
               </a:rPr>
-              <a:t>DEMO</a:t>
+              <a:t>DEMO 4</a:t>
             </a:r>
           </a:p>
         </p:txBody>
@@ -17074,7 +16978,7 @@
     </p:spTree>
     <p:extLst>
       <p:ext uri="{BB962C8B-B14F-4D97-AF65-F5344CB8AC3E}">
-        <p14:creationId xmlns:p14="http://schemas.microsoft.com/office/powerpoint/2010/main" val="3340815881"/>
+        <p14:creationId xmlns:p14="http://schemas.microsoft.com/office/powerpoint/2010/main" val="905370532"/>
       </p:ext>
     </p:extLst>
   </p:cSld>
@@ -17087,7 +16991,7 @@
 </p:sld>
 </file>
 
-<file path=ppt/slides/slide22.xml><?xml version="1.0" encoding="utf-8"?>
+<file path=ppt/slides/slide21.xml><?xml version="1.0" encoding="utf-8"?>
 <p:sld xmlns:a="http://schemas.openxmlformats.org/drawingml/2006/main" xmlns:r="http://schemas.openxmlformats.org/officeDocument/2006/relationships" xmlns:p="http://schemas.openxmlformats.org/presentationml/2006/main">
   <p:cSld>
     <p:spTree>
@@ -17330,7 +17234,7 @@
 </p:sld>
 </file>
 
-<file path=ppt/slides/slide23.xml><?xml version="1.0" encoding="utf-8"?>
+<file path=ppt/slides/slide22.xml><?xml version="1.0" encoding="utf-8"?>
 <p:sld xmlns:a="http://schemas.openxmlformats.org/drawingml/2006/main" xmlns:r="http://schemas.openxmlformats.org/officeDocument/2006/relationships" xmlns:p="http://schemas.openxmlformats.org/presentationml/2006/main">
   <p:cSld>
     <p:spTree>
@@ -17567,7 +17471,7 @@
         <p:spPr>
           <a:xfrm>
             <a:off x="6475412" y="1941932"/>
-            <a:ext cx="4495800" cy="4401205"/>
+            <a:ext cx="4495800" cy="1631216"/>
           </a:xfrm>
           <a:prstGeom prst="rect">
             <a:avLst/>
@@ -17609,46 +17513,6 @@
           </a:p>
           <a:p>
             <a:endParaRPr lang="en-US" sz="2000" dirty="0"/>
-          </a:p>
-          <a:p>
-            <a:pPr marL="285750" indent="-285750">
-              <a:buFont typeface="Arial" panose="020B0604020202020204" pitchFamily="34" charset="0"/>
-              <a:buChar char="•"/>
-            </a:pPr>
-            <a:r>
-              <a:rPr lang="en-US" sz="2000" dirty="0"/>
-              <a:t>Create separate drive for your filing system and make sure to tighten your security by only allowing CF account to manage the drive</a:t>
-            </a:r>
-          </a:p>
-          <a:p>
-            <a:endParaRPr lang="en-US" sz="2000" dirty="0"/>
-          </a:p>
-          <a:p>
-            <a:pPr marL="285750" indent="-285750">
-              <a:buFont typeface="Arial" panose="020B0604020202020204" pitchFamily="34" charset="0"/>
-              <a:buChar char="•"/>
-            </a:pPr>
-            <a:r>
-              <a:rPr lang="en-US" sz="2000" dirty="0"/>
-              <a:t>Run schedule jobs to follow up with file statuses and disk space</a:t>
-            </a:r>
-          </a:p>
-          <a:p>
-            <a:pPr marL="285750" indent="-285750">
-              <a:buFont typeface="Arial" panose="020B0604020202020204" pitchFamily="34" charset="0"/>
-              <a:buChar char="•"/>
-            </a:pPr>
-            <a:endParaRPr lang="en-US" sz="2000" dirty="0"/>
-          </a:p>
-          <a:p>
-            <a:pPr marL="285750" indent="-285750">
-              <a:buFont typeface="Arial" panose="020B0604020202020204" pitchFamily="34" charset="0"/>
-              <a:buChar char="•"/>
-            </a:pPr>
-            <a:r>
-              <a:rPr lang="en-US" sz="2000" dirty="0"/>
-              <a:t>Use threads when processing PDFs</a:t>
-            </a:r>
           </a:p>
         </p:txBody>
       </p:sp>
@@ -18428,351 +18292,6 @@
                       </p:childTnLst>
                     </p:cTn>
                   </p:par>
-                  <p:par>
-                    <p:cTn id="50" fill="hold">
-                      <p:stCondLst>
-                        <p:cond delay="indefinite"/>
-                      </p:stCondLst>
-                      <p:childTnLst>
-                        <p:par>
-                          <p:cTn id="51" fill="hold">
-                            <p:stCondLst>
-                              <p:cond delay="0"/>
-                            </p:stCondLst>
-                            <p:childTnLst>
-                              <p:par>
-                                <p:cTn id="52" presetID="42" presetClass="entr" presetSubtype="0" fill="hold" nodeType="clickEffect">
-                                  <p:stCondLst>
-                                    <p:cond delay="0"/>
-                                  </p:stCondLst>
-                                  <p:childTnLst>
-                                    <p:set>
-                                      <p:cBhvr>
-                                        <p:cTn id="53" dur="1" fill="hold">
-                                          <p:stCondLst>
-                                            <p:cond delay="0"/>
-                                          </p:stCondLst>
-                                        </p:cTn>
-                                        <p:tgtEl>
-                                          <p:spTgt spid="12">
-                                            <p:txEl>
-                                              <p:pRg st="3" end="3"/>
-                                            </p:txEl>
-                                          </p:spTgt>
-                                        </p:tgtEl>
-                                        <p:attrNameLst>
-                                          <p:attrName>style.visibility</p:attrName>
-                                        </p:attrNameLst>
-                                      </p:cBhvr>
-                                      <p:to>
-                                        <p:strVal val="visible"/>
-                                      </p:to>
-                                    </p:set>
-                                    <p:animEffect transition="in" filter="fade">
-                                      <p:cBhvr>
-                                        <p:cTn id="54" dur="1000"/>
-                                        <p:tgtEl>
-                                          <p:spTgt spid="12">
-                                            <p:txEl>
-                                              <p:pRg st="3" end="3"/>
-                                            </p:txEl>
-                                          </p:spTgt>
-                                        </p:tgtEl>
-                                      </p:cBhvr>
-                                    </p:animEffect>
-                                    <p:anim calcmode="lin" valueType="num">
-                                      <p:cBhvr>
-                                        <p:cTn id="55" dur="1000" fill="hold"/>
-                                        <p:tgtEl>
-                                          <p:spTgt spid="12">
-                                            <p:txEl>
-                                              <p:pRg st="3" end="3"/>
-                                            </p:txEl>
-                                          </p:spTgt>
-                                        </p:tgtEl>
-                                        <p:attrNameLst>
-                                          <p:attrName>ppt_x</p:attrName>
-                                        </p:attrNameLst>
-                                      </p:cBhvr>
-                                      <p:tavLst>
-                                        <p:tav tm="0">
-                                          <p:val>
-                                            <p:strVal val="#ppt_x"/>
-                                          </p:val>
-                                        </p:tav>
-                                        <p:tav tm="100000">
-                                          <p:val>
-                                            <p:strVal val="#ppt_x"/>
-                                          </p:val>
-                                        </p:tav>
-                                      </p:tavLst>
-                                    </p:anim>
-                                    <p:anim calcmode="lin" valueType="num">
-                                      <p:cBhvr>
-                                        <p:cTn id="56" dur="1000" fill="hold"/>
-                                        <p:tgtEl>
-                                          <p:spTgt spid="12">
-                                            <p:txEl>
-                                              <p:pRg st="3" end="3"/>
-                                            </p:txEl>
-                                          </p:spTgt>
-                                        </p:tgtEl>
-                                        <p:attrNameLst>
-                                          <p:attrName>ppt_y</p:attrName>
-                                        </p:attrNameLst>
-                                      </p:cBhvr>
-                                      <p:tavLst>
-                                        <p:tav tm="0">
-                                          <p:val>
-                                            <p:strVal val="#ppt_y+.1"/>
-                                          </p:val>
-                                        </p:tav>
-                                        <p:tav tm="100000">
-                                          <p:val>
-                                            <p:strVal val="#ppt_y"/>
-                                          </p:val>
-                                        </p:tav>
-                                      </p:tavLst>
-                                    </p:anim>
-                                  </p:childTnLst>
-                                </p:cTn>
-                              </p:par>
-                            </p:childTnLst>
-                          </p:cTn>
-                        </p:par>
-                      </p:childTnLst>
-                    </p:cTn>
-                  </p:par>
-                  <p:par>
-                    <p:cTn id="57" fill="hold">
-                      <p:stCondLst>
-                        <p:cond delay="indefinite"/>
-                      </p:stCondLst>
-                      <p:childTnLst>
-                        <p:par>
-                          <p:cTn id="58" fill="hold">
-                            <p:stCondLst>
-                              <p:cond delay="0"/>
-                            </p:stCondLst>
-                            <p:childTnLst>
-                              <p:par>
-                                <p:cTn id="59" presetID="42" presetClass="entr" presetSubtype="0" fill="hold" nodeType="clickEffect">
-                                  <p:stCondLst>
-                                    <p:cond delay="0"/>
-                                  </p:stCondLst>
-                                  <p:childTnLst>
-                                    <p:set>
-                                      <p:cBhvr>
-                                        <p:cTn id="60" dur="1" fill="hold">
-                                          <p:stCondLst>
-                                            <p:cond delay="0"/>
-                                          </p:stCondLst>
-                                        </p:cTn>
-                                        <p:tgtEl>
-                                          <p:spTgt spid="12">
-                                            <p:txEl>
-                                              <p:pRg st="5" end="5"/>
-                                            </p:txEl>
-                                          </p:spTgt>
-                                        </p:tgtEl>
-                                        <p:attrNameLst>
-                                          <p:attrName>style.visibility</p:attrName>
-                                        </p:attrNameLst>
-                                      </p:cBhvr>
-                                      <p:to>
-                                        <p:strVal val="visible"/>
-                                      </p:to>
-                                    </p:set>
-                                    <p:animEffect transition="in" filter="fade">
-                                      <p:cBhvr>
-                                        <p:cTn id="61" dur="1000"/>
-                                        <p:tgtEl>
-                                          <p:spTgt spid="12">
-                                            <p:txEl>
-                                              <p:pRg st="5" end="5"/>
-                                            </p:txEl>
-                                          </p:spTgt>
-                                        </p:tgtEl>
-                                      </p:cBhvr>
-                                    </p:animEffect>
-                                    <p:anim calcmode="lin" valueType="num">
-                                      <p:cBhvr>
-                                        <p:cTn id="62" dur="1000" fill="hold"/>
-                                        <p:tgtEl>
-                                          <p:spTgt spid="12">
-                                            <p:txEl>
-                                              <p:pRg st="5" end="5"/>
-                                            </p:txEl>
-                                          </p:spTgt>
-                                        </p:tgtEl>
-                                        <p:attrNameLst>
-                                          <p:attrName>ppt_x</p:attrName>
-                                        </p:attrNameLst>
-                                      </p:cBhvr>
-                                      <p:tavLst>
-                                        <p:tav tm="0">
-                                          <p:val>
-                                            <p:strVal val="#ppt_x"/>
-                                          </p:val>
-                                        </p:tav>
-                                        <p:tav tm="100000">
-                                          <p:val>
-                                            <p:strVal val="#ppt_x"/>
-                                          </p:val>
-                                        </p:tav>
-                                      </p:tavLst>
-                                    </p:anim>
-                                    <p:anim calcmode="lin" valueType="num">
-                                      <p:cBhvr>
-                                        <p:cTn id="63" dur="1000" fill="hold"/>
-                                        <p:tgtEl>
-                                          <p:spTgt spid="12">
-                                            <p:txEl>
-                                              <p:pRg st="5" end="5"/>
-                                            </p:txEl>
-                                          </p:spTgt>
-                                        </p:tgtEl>
-                                        <p:attrNameLst>
-                                          <p:attrName>ppt_y</p:attrName>
-                                        </p:attrNameLst>
-                                      </p:cBhvr>
-                                      <p:tavLst>
-                                        <p:tav tm="0">
-                                          <p:val>
-                                            <p:strVal val="#ppt_y+.1"/>
-                                          </p:val>
-                                        </p:tav>
-                                        <p:tav tm="100000">
-                                          <p:val>
-                                            <p:strVal val="#ppt_y"/>
-                                          </p:val>
-                                        </p:tav>
-                                      </p:tavLst>
-                                    </p:anim>
-                                  </p:childTnLst>
-                                </p:cTn>
-                              </p:par>
-                            </p:childTnLst>
-                          </p:cTn>
-                        </p:par>
-                      </p:childTnLst>
-                    </p:cTn>
-                  </p:par>
-                  <p:par>
-                    <p:cTn id="64" fill="hold">
-                      <p:stCondLst>
-                        <p:cond delay="indefinite"/>
-                      </p:stCondLst>
-                      <p:childTnLst>
-                        <p:par>
-                          <p:cTn id="65" fill="hold">
-                            <p:stCondLst>
-                              <p:cond delay="0"/>
-                            </p:stCondLst>
-                            <p:childTnLst>
-                              <p:par>
-                                <p:cTn id="66" presetID="42" presetClass="entr" presetSubtype="0" fill="hold" nodeType="clickEffect">
-                                  <p:stCondLst>
-                                    <p:cond delay="0"/>
-                                  </p:stCondLst>
-                                  <p:childTnLst>
-                                    <p:set>
-                                      <p:cBhvr>
-                                        <p:cTn id="67" dur="1" fill="hold">
-                                          <p:stCondLst>
-                                            <p:cond delay="0"/>
-                                          </p:stCondLst>
-                                        </p:cTn>
-                                        <p:tgtEl>
-                                          <p:spTgt spid="12">
-                                            <p:txEl>
-                                              <p:pRg st="7" end="7"/>
-                                            </p:txEl>
-                                          </p:spTgt>
-                                        </p:tgtEl>
-                                        <p:attrNameLst>
-                                          <p:attrName>style.visibility</p:attrName>
-                                        </p:attrNameLst>
-                                      </p:cBhvr>
-                                      <p:to>
-                                        <p:strVal val="visible"/>
-                                      </p:to>
-                                    </p:set>
-                                    <p:animEffect transition="in" filter="fade">
-                                      <p:cBhvr>
-                                        <p:cTn id="68" dur="1000"/>
-                                        <p:tgtEl>
-                                          <p:spTgt spid="12">
-                                            <p:txEl>
-                                              <p:pRg st="7" end="7"/>
-                                            </p:txEl>
-                                          </p:spTgt>
-                                        </p:tgtEl>
-                                      </p:cBhvr>
-                                    </p:animEffect>
-                                    <p:anim calcmode="lin" valueType="num">
-                                      <p:cBhvr>
-                                        <p:cTn id="69" dur="1000" fill="hold"/>
-                                        <p:tgtEl>
-                                          <p:spTgt spid="12">
-                                            <p:txEl>
-                                              <p:pRg st="7" end="7"/>
-                                            </p:txEl>
-                                          </p:spTgt>
-                                        </p:tgtEl>
-                                        <p:attrNameLst>
-                                          <p:attrName>ppt_x</p:attrName>
-                                        </p:attrNameLst>
-                                      </p:cBhvr>
-                                      <p:tavLst>
-                                        <p:tav tm="0">
-                                          <p:val>
-                                            <p:strVal val="#ppt_x"/>
-                                          </p:val>
-                                        </p:tav>
-                                        <p:tav tm="100000">
-                                          <p:val>
-                                            <p:strVal val="#ppt_x"/>
-                                          </p:val>
-                                        </p:tav>
-                                      </p:tavLst>
-                                    </p:anim>
-                                    <p:anim calcmode="lin" valueType="num">
-                                      <p:cBhvr>
-                                        <p:cTn id="70" dur="1000" fill="hold"/>
-                                        <p:tgtEl>
-                                          <p:spTgt spid="12">
-                                            <p:txEl>
-                                              <p:pRg st="7" end="7"/>
-                                            </p:txEl>
-                                          </p:spTgt>
-                                        </p:tgtEl>
-                                        <p:attrNameLst>
-                                          <p:attrName>ppt_y</p:attrName>
-                                        </p:attrNameLst>
-                                      </p:cBhvr>
-                                      <p:tavLst>
-                                        <p:tav tm="0">
-                                          <p:val>
-                                            <p:strVal val="#ppt_y+.1"/>
-                                          </p:val>
-                                        </p:tav>
-                                        <p:tav tm="100000">
-                                          <p:val>
-                                            <p:strVal val="#ppt_y"/>
-                                          </p:val>
-                                        </p:tav>
-                                      </p:tavLst>
-                                    </p:anim>
-                                  </p:childTnLst>
-                                </p:cTn>
-                              </p:par>
-                            </p:childTnLst>
-                          </p:cTn>
-                        </p:par>
-                      </p:childTnLst>
-                    </p:cTn>
-                  </p:par>
                 </p:childTnLst>
               </p:cTn>
               <p:prevCondLst>
@@ -18802,7 +18321,7 @@
 </p:sld>
 </file>
 
-<file path=ppt/slides/slide24.xml><?xml version="1.0" encoding="utf-8"?>
+<file path=ppt/slides/slide23.xml><?xml version="1.0" encoding="utf-8"?>
 <p:sld xmlns:a="http://schemas.openxmlformats.org/drawingml/2006/main" xmlns:r="http://schemas.openxmlformats.org/officeDocument/2006/relationships" xmlns:p="http://schemas.openxmlformats.org/presentationml/2006/main">
   <p:cSld>
     <p:spTree>
@@ -18844,7 +18363,7 @@
               <a:rPr lang="en-IN" dirty="0">
                 <a:latin typeface="Adobe Clean" panose="020B0503020404020204" pitchFamily="34" charset="0"/>
               </a:rPr>
-              <a:t>DEMO</a:t>
+              <a:t>DEMO 5</a:t>
             </a:r>
           </a:p>
         </p:txBody>
@@ -18897,7 +18416,7 @@
 </p:sld>
 </file>
 
-<file path=ppt/slides/slide25.xml><?xml version="1.0" encoding="utf-8"?>
+<file path=ppt/slides/slide24.xml><?xml version="1.0" encoding="utf-8"?>
 <p:sld xmlns:a="http://schemas.openxmlformats.org/drawingml/2006/main" xmlns:r="http://schemas.openxmlformats.org/officeDocument/2006/relationships" xmlns:p="http://schemas.openxmlformats.org/presentationml/2006/main">
   <p:cSld>
     <p:spTree>
@@ -19424,13 +18943,7 @@
             </a:pPr>
             <a:r>
               <a:rPr lang="en-US" sz="2000" dirty="0"/>
-              <a:t>Open standard maintained by the International Organization for </a:t>
-            </a:r>
-          </a:p>
-          <a:p>
-            <a:r>
-              <a:rPr lang="en-US" sz="2000" dirty="0"/>
-              <a:t>      Standardization (ISO). </a:t>
+              <a:t>Open standard maintained by ISO ( International Standards Organization).</a:t>
             </a:r>
           </a:p>
           <a:p>
@@ -19873,7 +19386,7 @@
                             </p:stCondLst>
                             <p:childTnLst>
                               <p:par>
-                                <p:cTn id="26" presetID="2" presetClass="entr" presetSubtype="4" fill="hold" nodeType="clickEffect">
+                                <p:cTn id="26" presetID="2" presetClass="entr" presetSubtype="4" fill="hold" grpId="0" nodeType="clickEffect">
                                   <p:stCondLst>
                                     <p:cond delay="0"/>
                                   </p:stCondLst>
@@ -19886,11 +19399,7 @@
                                           </p:stCondLst>
                                         </p:cTn>
                                         <p:tgtEl>
-                                          <p:spTgt spid="8">
-                                            <p:txEl>
-                                              <p:pRg st="0" end="0"/>
-                                            </p:txEl>
-                                          </p:spTgt>
+                                          <p:spTgt spid="8"/>
                                         </p:tgtEl>
                                         <p:attrNameLst>
                                           <p:attrName>style.visibility</p:attrName>
@@ -19904,11 +19413,7 @@
                                       <p:cBhvr additive="base">
                                         <p:cTn id="28" dur="500" fill="hold"/>
                                         <p:tgtEl>
-                                          <p:spTgt spid="8">
-                                            <p:txEl>
-                                              <p:pRg st="0" end="0"/>
-                                            </p:txEl>
-                                          </p:spTgt>
+                                          <p:spTgt spid="8"/>
                                         </p:tgtEl>
                                         <p:attrNameLst>
                                           <p:attrName>ppt_x</p:attrName>
@@ -19931,490 +19436,7 @@
                                       <p:cBhvr additive="base">
                                         <p:cTn id="29" dur="500" fill="hold"/>
                                         <p:tgtEl>
-                                          <p:spTgt spid="8">
-                                            <p:txEl>
-                                              <p:pRg st="0" end="0"/>
-                                            </p:txEl>
-                                          </p:spTgt>
-                                        </p:tgtEl>
-                                        <p:attrNameLst>
-                                          <p:attrName>ppt_y</p:attrName>
-                                        </p:attrNameLst>
-                                      </p:cBhvr>
-                                      <p:tavLst>
-                                        <p:tav tm="0">
-                                          <p:val>
-                                            <p:strVal val="1+#ppt_h/2"/>
-                                          </p:val>
-                                        </p:tav>
-                                        <p:tav tm="100000">
-                                          <p:val>
-                                            <p:strVal val="#ppt_y"/>
-                                          </p:val>
-                                        </p:tav>
-                                      </p:tavLst>
-                                    </p:anim>
-                                  </p:childTnLst>
-                                </p:cTn>
-                              </p:par>
-                            </p:childTnLst>
-                          </p:cTn>
-                        </p:par>
-                      </p:childTnLst>
-                    </p:cTn>
-                  </p:par>
-                  <p:par>
-                    <p:cTn id="30" fill="hold">
-                      <p:stCondLst>
-                        <p:cond delay="indefinite"/>
-                      </p:stCondLst>
-                      <p:childTnLst>
-                        <p:par>
-                          <p:cTn id="31" fill="hold">
-                            <p:stCondLst>
-                              <p:cond delay="0"/>
-                            </p:stCondLst>
-                            <p:childTnLst>
-                              <p:par>
-                                <p:cTn id="32" presetID="2" presetClass="entr" presetSubtype="4" fill="hold" nodeType="clickEffect">
-                                  <p:stCondLst>
-                                    <p:cond delay="0"/>
-                                  </p:stCondLst>
-                                  <p:childTnLst>
-                                    <p:set>
-                                      <p:cBhvr>
-                                        <p:cTn id="33" dur="1" fill="hold">
-                                          <p:stCondLst>
-                                            <p:cond delay="0"/>
-                                          </p:stCondLst>
-                                        </p:cTn>
-                                        <p:tgtEl>
-                                          <p:spTgt spid="8">
-                                            <p:txEl>
-                                              <p:pRg st="1" end="1"/>
-                                            </p:txEl>
-                                          </p:spTgt>
-                                        </p:tgtEl>
-                                        <p:attrNameLst>
-                                          <p:attrName>style.visibility</p:attrName>
-                                        </p:attrNameLst>
-                                      </p:cBhvr>
-                                      <p:to>
-                                        <p:strVal val="visible"/>
-                                      </p:to>
-                                    </p:set>
-                                    <p:anim calcmode="lin" valueType="num">
-                                      <p:cBhvr additive="base">
-                                        <p:cTn id="34" dur="500" fill="hold"/>
-                                        <p:tgtEl>
-                                          <p:spTgt spid="8">
-                                            <p:txEl>
-                                              <p:pRg st="1" end="1"/>
-                                            </p:txEl>
-                                          </p:spTgt>
-                                        </p:tgtEl>
-                                        <p:attrNameLst>
-                                          <p:attrName>ppt_x</p:attrName>
-                                        </p:attrNameLst>
-                                      </p:cBhvr>
-                                      <p:tavLst>
-                                        <p:tav tm="0">
-                                          <p:val>
-                                            <p:strVal val="#ppt_x"/>
-                                          </p:val>
-                                        </p:tav>
-                                        <p:tav tm="100000">
-                                          <p:val>
-                                            <p:strVal val="#ppt_x"/>
-                                          </p:val>
-                                        </p:tav>
-                                      </p:tavLst>
-                                    </p:anim>
-                                    <p:anim calcmode="lin" valueType="num">
-                                      <p:cBhvr additive="base">
-                                        <p:cTn id="35" dur="500" fill="hold"/>
-                                        <p:tgtEl>
-                                          <p:spTgt spid="8">
-                                            <p:txEl>
-                                              <p:pRg st="1" end="1"/>
-                                            </p:txEl>
-                                          </p:spTgt>
-                                        </p:tgtEl>
-                                        <p:attrNameLst>
-                                          <p:attrName>ppt_y</p:attrName>
-                                        </p:attrNameLst>
-                                      </p:cBhvr>
-                                      <p:tavLst>
-                                        <p:tav tm="0">
-                                          <p:val>
-                                            <p:strVal val="1+#ppt_h/2"/>
-                                          </p:val>
-                                        </p:tav>
-                                        <p:tav tm="100000">
-                                          <p:val>
-                                            <p:strVal val="#ppt_y"/>
-                                          </p:val>
-                                        </p:tav>
-                                      </p:tavLst>
-                                    </p:anim>
-                                  </p:childTnLst>
-                                </p:cTn>
-                              </p:par>
-                              <p:par>
-                                <p:cTn id="36" presetID="2" presetClass="entr" presetSubtype="4" fill="hold" nodeType="withEffect">
-                                  <p:stCondLst>
-                                    <p:cond delay="0"/>
-                                  </p:stCondLst>
-                                  <p:childTnLst>
-                                    <p:set>
-                                      <p:cBhvr>
-                                        <p:cTn id="37" dur="1" fill="hold">
-                                          <p:stCondLst>
-                                            <p:cond delay="0"/>
-                                          </p:stCondLst>
-                                        </p:cTn>
-                                        <p:tgtEl>
-                                          <p:spTgt spid="8">
-                                            <p:txEl>
-                                              <p:pRg st="2" end="2"/>
-                                            </p:txEl>
-                                          </p:spTgt>
-                                        </p:tgtEl>
-                                        <p:attrNameLst>
-                                          <p:attrName>style.visibility</p:attrName>
-                                        </p:attrNameLst>
-                                      </p:cBhvr>
-                                      <p:to>
-                                        <p:strVal val="visible"/>
-                                      </p:to>
-                                    </p:set>
-                                    <p:anim calcmode="lin" valueType="num">
-                                      <p:cBhvr additive="base">
-                                        <p:cTn id="38" dur="500" fill="hold"/>
-                                        <p:tgtEl>
-                                          <p:spTgt spid="8">
-                                            <p:txEl>
-                                              <p:pRg st="2" end="2"/>
-                                            </p:txEl>
-                                          </p:spTgt>
-                                        </p:tgtEl>
-                                        <p:attrNameLst>
-                                          <p:attrName>ppt_x</p:attrName>
-                                        </p:attrNameLst>
-                                      </p:cBhvr>
-                                      <p:tavLst>
-                                        <p:tav tm="0">
-                                          <p:val>
-                                            <p:strVal val="#ppt_x"/>
-                                          </p:val>
-                                        </p:tav>
-                                        <p:tav tm="100000">
-                                          <p:val>
-                                            <p:strVal val="#ppt_x"/>
-                                          </p:val>
-                                        </p:tav>
-                                      </p:tavLst>
-                                    </p:anim>
-                                    <p:anim calcmode="lin" valueType="num">
-                                      <p:cBhvr additive="base">
-                                        <p:cTn id="39" dur="500" fill="hold"/>
-                                        <p:tgtEl>
-                                          <p:spTgt spid="8">
-                                            <p:txEl>
-                                              <p:pRg st="2" end="2"/>
-                                            </p:txEl>
-                                          </p:spTgt>
-                                        </p:tgtEl>
-                                        <p:attrNameLst>
-                                          <p:attrName>ppt_y</p:attrName>
-                                        </p:attrNameLst>
-                                      </p:cBhvr>
-                                      <p:tavLst>
-                                        <p:tav tm="0">
-                                          <p:val>
-                                            <p:strVal val="1+#ppt_h/2"/>
-                                          </p:val>
-                                        </p:tav>
-                                        <p:tav tm="100000">
-                                          <p:val>
-                                            <p:strVal val="#ppt_y"/>
-                                          </p:val>
-                                        </p:tav>
-                                      </p:tavLst>
-                                    </p:anim>
-                                  </p:childTnLst>
-                                </p:cTn>
-                              </p:par>
-                            </p:childTnLst>
-                          </p:cTn>
-                        </p:par>
-                      </p:childTnLst>
-                    </p:cTn>
-                  </p:par>
-                  <p:par>
-                    <p:cTn id="40" fill="hold">
-                      <p:stCondLst>
-                        <p:cond delay="indefinite"/>
-                      </p:stCondLst>
-                      <p:childTnLst>
-                        <p:par>
-                          <p:cTn id="41" fill="hold">
-                            <p:stCondLst>
-                              <p:cond delay="0"/>
-                            </p:stCondLst>
-                            <p:childTnLst>
-                              <p:par>
-                                <p:cTn id="42" presetID="2" presetClass="entr" presetSubtype="4" fill="hold" nodeType="clickEffect">
-                                  <p:stCondLst>
-                                    <p:cond delay="0"/>
-                                  </p:stCondLst>
-                                  <p:childTnLst>
-                                    <p:set>
-                                      <p:cBhvr>
-                                        <p:cTn id="43" dur="1" fill="hold">
-                                          <p:stCondLst>
-                                            <p:cond delay="0"/>
-                                          </p:stCondLst>
-                                        </p:cTn>
-                                        <p:tgtEl>
-                                          <p:spTgt spid="8">
-                                            <p:txEl>
-                                              <p:pRg st="3" end="3"/>
-                                            </p:txEl>
-                                          </p:spTgt>
-                                        </p:tgtEl>
-                                        <p:attrNameLst>
-                                          <p:attrName>style.visibility</p:attrName>
-                                        </p:attrNameLst>
-                                      </p:cBhvr>
-                                      <p:to>
-                                        <p:strVal val="visible"/>
-                                      </p:to>
-                                    </p:set>
-                                    <p:anim calcmode="lin" valueType="num">
-                                      <p:cBhvr additive="base">
-                                        <p:cTn id="44" dur="500" fill="hold"/>
-                                        <p:tgtEl>
-                                          <p:spTgt spid="8">
-                                            <p:txEl>
-                                              <p:pRg st="3" end="3"/>
-                                            </p:txEl>
-                                          </p:spTgt>
-                                        </p:tgtEl>
-                                        <p:attrNameLst>
-                                          <p:attrName>ppt_x</p:attrName>
-                                        </p:attrNameLst>
-                                      </p:cBhvr>
-                                      <p:tavLst>
-                                        <p:tav tm="0">
-                                          <p:val>
-                                            <p:strVal val="#ppt_x"/>
-                                          </p:val>
-                                        </p:tav>
-                                        <p:tav tm="100000">
-                                          <p:val>
-                                            <p:strVal val="#ppt_x"/>
-                                          </p:val>
-                                        </p:tav>
-                                      </p:tavLst>
-                                    </p:anim>
-                                    <p:anim calcmode="lin" valueType="num">
-                                      <p:cBhvr additive="base">
-                                        <p:cTn id="45" dur="500" fill="hold"/>
-                                        <p:tgtEl>
-                                          <p:spTgt spid="8">
-                                            <p:txEl>
-                                              <p:pRg st="3" end="3"/>
-                                            </p:txEl>
-                                          </p:spTgt>
-                                        </p:tgtEl>
-                                        <p:attrNameLst>
-                                          <p:attrName>ppt_y</p:attrName>
-                                        </p:attrNameLst>
-                                      </p:cBhvr>
-                                      <p:tavLst>
-                                        <p:tav tm="0">
-                                          <p:val>
-                                            <p:strVal val="1+#ppt_h/2"/>
-                                          </p:val>
-                                        </p:tav>
-                                        <p:tav tm="100000">
-                                          <p:val>
-                                            <p:strVal val="#ppt_y"/>
-                                          </p:val>
-                                        </p:tav>
-                                      </p:tavLst>
-                                    </p:anim>
-                                  </p:childTnLst>
-                                </p:cTn>
-                              </p:par>
-                              <p:par>
-                                <p:cTn id="46" presetID="2" presetClass="entr" presetSubtype="4" fill="hold" nodeType="withEffect">
-                                  <p:stCondLst>
-                                    <p:cond delay="0"/>
-                                  </p:stCondLst>
-                                  <p:childTnLst>
-                                    <p:set>
-                                      <p:cBhvr>
-                                        <p:cTn id="47" dur="1" fill="hold">
-                                          <p:stCondLst>
-                                            <p:cond delay="0"/>
-                                          </p:stCondLst>
-                                        </p:cTn>
-                                        <p:tgtEl>
-                                          <p:spTgt spid="8">
-                                            <p:txEl>
-                                              <p:pRg st="4" end="4"/>
-                                            </p:txEl>
-                                          </p:spTgt>
-                                        </p:tgtEl>
-                                        <p:attrNameLst>
-                                          <p:attrName>style.visibility</p:attrName>
-                                        </p:attrNameLst>
-                                      </p:cBhvr>
-                                      <p:to>
-                                        <p:strVal val="visible"/>
-                                      </p:to>
-                                    </p:set>
-                                    <p:anim calcmode="lin" valueType="num">
-                                      <p:cBhvr additive="base">
-                                        <p:cTn id="48" dur="500" fill="hold"/>
-                                        <p:tgtEl>
-                                          <p:spTgt spid="8">
-                                            <p:txEl>
-                                              <p:pRg st="4" end="4"/>
-                                            </p:txEl>
-                                          </p:spTgt>
-                                        </p:tgtEl>
-                                        <p:attrNameLst>
-                                          <p:attrName>ppt_x</p:attrName>
-                                        </p:attrNameLst>
-                                      </p:cBhvr>
-                                      <p:tavLst>
-                                        <p:tav tm="0">
-                                          <p:val>
-                                            <p:strVal val="#ppt_x"/>
-                                          </p:val>
-                                        </p:tav>
-                                        <p:tav tm="100000">
-                                          <p:val>
-                                            <p:strVal val="#ppt_x"/>
-                                          </p:val>
-                                        </p:tav>
-                                      </p:tavLst>
-                                    </p:anim>
-                                    <p:anim calcmode="lin" valueType="num">
-                                      <p:cBhvr additive="base">
-                                        <p:cTn id="49" dur="500" fill="hold"/>
-                                        <p:tgtEl>
-                                          <p:spTgt spid="8">
-                                            <p:txEl>
-                                              <p:pRg st="4" end="4"/>
-                                            </p:txEl>
-                                          </p:spTgt>
-                                        </p:tgtEl>
-                                        <p:attrNameLst>
-                                          <p:attrName>ppt_y</p:attrName>
-                                        </p:attrNameLst>
-                                      </p:cBhvr>
-                                      <p:tavLst>
-                                        <p:tav tm="0">
-                                          <p:val>
-                                            <p:strVal val="1+#ppt_h/2"/>
-                                          </p:val>
-                                        </p:tav>
-                                        <p:tav tm="100000">
-                                          <p:val>
-                                            <p:strVal val="#ppt_y"/>
-                                          </p:val>
-                                        </p:tav>
-                                      </p:tavLst>
-                                    </p:anim>
-                                  </p:childTnLst>
-                                </p:cTn>
-                              </p:par>
-                            </p:childTnLst>
-                          </p:cTn>
-                        </p:par>
-                      </p:childTnLst>
-                    </p:cTn>
-                  </p:par>
-                  <p:par>
-                    <p:cTn id="50" fill="hold">
-                      <p:stCondLst>
-                        <p:cond delay="indefinite"/>
-                      </p:stCondLst>
-                      <p:childTnLst>
-                        <p:par>
-                          <p:cTn id="51" fill="hold">
-                            <p:stCondLst>
-                              <p:cond delay="0"/>
-                            </p:stCondLst>
-                            <p:childTnLst>
-                              <p:par>
-                                <p:cTn id="52" presetID="2" presetClass="entr" presetSubtype="4" fill="hold" nodeType="clickEffect">
-                                  <p:stCondLst>
-                                    <p:cond delay="0"/>
-                                  </p:stCondLst>
-                                  <p:childTnLst>
-                                    <p:set>
-                                      <p:cBhvr>
-                                        <p:cTn id="53" dur="1" fill="hold">
-                                          <p:stCondLst>
-                                            <p:cond delay="0"/>
-                                          </p:stCondLst>
-                                        </p:cTn>
-                                        <p:tgtEl>
-                                          <p:spTgt spid="8">
-                                            <p:txEl>
-                                              <p:pRg st="5" end="5"/>
-                                            </p:txEl>
-                                          </p:spTgt>
-                                        </p:tgtEl>
-                                        <p:attrNameLst>
-                                          <p:attrName>style.visibility</p:attrName>
-                                        </p:attrNameLst>
-                                      </p:cBhvr>
-                                      <p:to>
-                                        <p:strVal val="visible"/>
-                                      </p:to>
-                                    </p:set>
-                                    <p:anim calcmode="lin" valueType="num">
-                                      <p:cBhvr additive="base">
-                                        <p:cTn id="54" dur="500" fill="hold"/>
-                                        <p:tgtEl>
-                                          <p:spTgt spid="8">
-                                            <p:txEl>
-                                              <p:pRg st="5" end="5"/>
-                                            </p:txEl>
-                                          </p:spTgt>
-                                        </p:tgtEl>
-                                        <p:attrNameLst>
-                                          <p:attrName>ppt_x</p:attrName>
-                                        </p:attrNameLst>
-                                      </p:cBhvr>
-                                      <p:tavLst>
-                                        <p:tav tm="0">
-                                          <p:val>
-                                            <p:strVal val="#ppt_x"/>
-                                          </p:val>
-                                        </p:tav>
-                                        <p:tav tm="100000">
-                                          <p:val>
-                                            <p:strVal val="#ppt_x"/>
-                                          </p:val>
-                                        </p:tav>
-                                      </p:tavLst>
-                                    </p:anim>
-                                    <p:anim calcmode="lin" valueType="num">
-                                      <p:cBhvr additive="base">
-                                        <p:cTn id="55" dur="500" fill="hold"/>
-                                        <p:tgtEl>
-                                          <p:spTgt spid="8">
-                                            <p:txEl>
-                                              <p:pRg st="5" end="5"/>
-                                            </p:txEl>
-                                          </p:spTgt>
+                                          <p:spTgt spid="8"/>
                                         </p:tgtEl>
                                         <p:attrNameLst>
                                           <p:attrName>ppt_y</p:attrName>
@@ -20466,6 +19488,7 @@
     <p:bldLst>
       <p:bldP spid="5" grpId="0"/>
       <p:bldP spid="7" grpId="0"/>
+      <p:bldP spid="8" grpId="0"/>
       <p:bldP spid="11" grpId="0"/>
     </p:bldLst>
   </p:timing>
@@ -21590,7 +20613,7 @@
             </a:pPr>
             <a:r>
               <a:rPr lang="en-US" sz="2000" dirty="0"/>
-              <a:t>Sanitization—Remove hidden data from PDF</a:t>
+              <a:t>Sanitization—Remove hidden data from a PDF</a:t>
             </a:r>
           </a:p>
           <a:p>
@@ -22553,7 +21576,7 @@
             </a:pPr>
             <a:r>
               <a:rPr lang="en-US" sz="2000" dirty="0"/>
-              <a:t>If you can sign, edit, comment, stamp PDF.</a:t>
+              <a:t>If you can sign, edit, comment, stamp a PDF.</a:t>
             </a:r>
           </a:p>
           <a:p>
@@ -25369,7 +24392,7 @@
               <a:rPr lang="en-IN" dirty="0">
                 <a:latin typeface="Adobe Clean" panose="020B0503020404020204" pitchFamily="34" charset="0"/>
               </a:rPr>
-              <a:t>DEMO</a:t>
+              <a:t>DEMO1</a:t>
             </a:r>
           </a:p>
         </p:txBody>

</xml_diff>